<commit_message>
derivations begun + new diagrams
</commit_message>
<xml_diff>
--- a/ClareDiagrams.pptx
+++ b/ClareDiagrams.pptx
@@ -115,10 +115,6 @@
     </p:ext>
   </p:extLst>
 </p:presentation>
-</file>
-
-<file path=ppt/revisionInfo.xml><?xml version="1.0" encoding="utf-8"?>
-<p1510:revInfo xmlns:a="http://schemas.openxmlformats.org/drawingml/2006/main" xmlns:r="http://schemas.openxmlformats.org/officeDocument/2006/relationships" xmlns:p1510="http://schemas.microsoft.com/office/powerpoint/2015/10/main"/>
 </file>
 
 <file path=ppt/slideLayouts/slideLayout1.xml><?xml version="1.0" encoding="utf-8"?>
@@ -268,7 +264,7 @@
           <a:p>
             <a:fld id="{3721CA93-E140-4E2A-A30C-04BF0C6AAEA4}" type="datetimeFigureOut">
               <a:rPr lang="en-US" smtClean="0"/>
-              <a:t>7/12/2018</a:t>
+              <a:t>7/16/2018</a:t>
             </a:fld>
             <a:endParaRPr lang="en-US"/>
           </a:p>
@@ -466,7 +462,7 @@
           <a:p>
             <a:fld id="{3721CA93-E140-4E2A-A30C-04BF0C6AAEA4}" type="datetimeFigureOut">
               <a:rPr lang="en-US" smtClean="0"/>
-              <a:t>7/12/2018</a:t>
+              <a:t>7/16/2018</a:t>
             </a:fld>
             <a:endParaRPr lang="en-US"/>
           </a:p>
@@ -674,7 +670,7 @@
           <a:p>
             <a:fld id="{3721CA93-E140-4E2A-A30C-04BF0C6AAEA4}" type="datetimeFigureOut">
               <a:rPr lang="en-US" smtClean="0"/>
-              <a:t>7/12/2018</a:t>
+              <a:t>7/16/2018</a:t>
             </a:fld>
             <a:endParaRPr lang="en-US"/>
           </a:p>
@@ -872,7 +868,7 @@
           <a:p>
             <a:fld id="{3721CA93-E140-4E2A-A30C-04BF0C6AAEA4}" type="datetimeFigureOut">
               <a:rPr lang="en-US" smtClean="0"/>
-              <a:t>7/12/2018</a:t>
+              <a:t>7/16/2018</a:t>
             </a:fld>
             <a:endParaRPr lang="en-US"/>
           </a:p>
@@ -1147,7 +1143,7 @@
           <a:p>
             <a:fld id="{3721CA93-E140-4E2A-A30C-04BF0C6AAEA4}" type="datetimeFigureOut">
               <a:rPr lang="en-US" smtClean="0"/>
-              <a:t>7/12/2018</a:t>
+              <a:t>7/16/2018</a:t>
             </a:fld>
             <a:endParaRPr lang="en-US"/>
           </a:p>
@@ -1412,7 +1408,7 @@
           <a:p>
             <a:fld id="{3721CA93-E140-4E2A-A30C-04BF0C6AAEA4}" type="datetimeFigureOut">
               <a:rPr lang="en-US" smtClean="0"/>
-              <a:t>7/12/2018</a:t>
+              <a:t>7/16/2018</a:t>
             </a:fld>
             <a:endParaRPr lang="en-US"/>
           </a:p>
@@ -1824,7 +1820,7 @@
           <a:p>
             <a:fld id="{3721CA93-E140-4E2A-A30C-04BF0C6AAEA4}" type="datetimeFigureOut">
               <a:rPr lang="en-US" smtClean="0"/>
-              <a:t>7/12/2018</a:t>
+              <a:t>7/16/2018</a:t>
             </a:fld>
             <a:endParaRPr lang="en-US"/>
           </a:p>
@@ -1965,7 +1961,7 @@
           <a:p>
             <a:fld id="{3721CA93-E140-4E2A-A30C-04BF0C6AAEA4}" type="datetimeFigureOut">
               <a:rPr lang="en-US" smtClean="0"/>
-              <a:t>7/12/2018</a:t>
+              <a:t>7/16/2018</a:t>
             </a:fld>
             <a:endParaRPr lang="en-US"/>
           </a:p>
@@ -2078,7 +2074,7 @@
           <a:p>
             <a:fld id="{3721CA93-E140-4E2A-A30C-04BF0C6AAEA4}" type="datetimeFigureOut">
               <a:rPr lang="en-US" smtClean="0"/>
-              <a:t>7/12/2018</a:t>
+              <a:t>7/16/2018</a:t>
             </a:fld>
             <a:endParaRPr lang="en-US"/>
           </a:p>
@@ -2389,7 +2385,7 @@
           <a:p>
             <a:fld id="{3721CA93-E140-4E2A-A30C-04BF0C6AAEA4}" type="datetimeFigureOut">
               <a:rPr lang="en-US" smtClean="0"/>
-              <a:t>7/12/2018</a:t>
+              <a:t>7/16/2018</a:t>
             </a:fld>
             <a:endParaRPr lang="en-US"/>
           </a:p>
@@ -2677,7 +2673,7 @@
           <a:p>
             <a:fld id="{3721CA93-E140-4E2A-A30C-04BF0C6AAEA4}" type="datetimeFigureOut">
               <a:rPr lang="en-US" smtClean="0"/>
-              <a:t>7/12/2018</a:t>
+              <a:t>7/16/2018</a:t>
             </a:fld>
             <a:endParaRPr lang="en-US"/>
           </a:p>
@@ -2918,7 +2914,7 @@
           <a:p>
             <a:fld id="{3721CA93-E140-4E2A-A30C-04BF0C6AAEA4}" type="datetimeFigureOut">
               <a:rPr lang="en-US" smtClean="0"/>
-              <a:t>7/12/2018</a:t>
+              <a:t>7/16/2018</a:t>
             </a:fld>
             <a:endParaRPr lang="en-US"/>
           </a:p>
@@ -26979,56 +26975,1323 @@
           <a:chExt cx="0" cy="0"/>
         </a:xfrm>
       </p:grpSpPr>
-      <p:sp>
-        <p:nvSpPr>
-          <p:cNvPr id="2" name="Title 1">
+      <p:grpSp>
+        <p:nvGrpSpPr>
+          <p:cNvPr id="31" name="Group 30">
             <a:extLst>
               <a:ext uri="{FF2B5EF4-FFF2-40B4-BE49-F238E27FC236}">
-                <a16:creationId xmlns:a16="http://schemas.microsoft.com/office/drawing/2014/main" id="{0A31107F-5B9F-4125-8D90-2684D9B6DC7E}"/>
+                <a16:creationId xmlns:a16="http://schemas.microsoft.com/office/drawing/2014/main" id="{3BA78616-F710-4043-B30E-C92502C5D264}"/>
               </a:ext>
             </a:extLst>
           </p:cNvPr>
-          <p:cNvSpPr>
-            <a:spLocks noGrp="1"/>
-          </p:cNvSpPr>
-          <p:nvPr>
-            <p:ph type="title"/>
-          </p:nvPr>
-        </p:nvSpPr>
-        <p:spPr/>
-        <p:txBody>
-          <a:bodyPr/>
-          <a:lstStyle/>
-          <a:p>
-            <a:endParaRPr lang="en-US"/>
-          </a:p>
-        </p:txBody>
-      </p:sp>
-      <p:sp>
-        <p:nvSpPr>
-          <p:cNvPr id="3" name="Content Placeholder 2">
-            <a:extLst>
-              <a:ext uri="{FF2B5EF4-FFF2-40B4-BE49-F238E27FC236}">
-                <a16:creationId xmlns:a16="http://schemas.microsoft.com/office/drawing/2014/main" id="{84173664-4AC8-419B-AB5A-32AE9A877A01}"/>
-              </a:ext>
-            </a:extLst>
-          </p:cNvPr>
-          <p:cNvSpPr>
-            <a:spLocks noGrp="1"/>
-          </p:cNvSpPr>
-          <p:nvPr>
-            <p:ph idx="1"/>
-          </p:nvPr>
-        </p:nvSpPr>
-        <p:spPr/>
-        <p:txBody>
-          <a:bodyPr/>
-          <a:lstStyle/>
-          <a:p>
-            <a:endParaRPr lang="en-US"/>
-          </a:p>
-        </p:txBody>
-      </p:sp>
+          <p:cNvGrpSpPr/>
+          <p:nvPr/>
+        </p:nvGrpSpPr>
+        <p:grpSpPr>
+          <a:xfrm>
+            <a:off x="4797106" y="1073904"/>
+            <a:ext cx="4343940" cy="3774035"/>
+            <a:chOff x="4797106" y="1073904"/>
+            <a:chExt cx="4343940" cy="3774035"/>
+          </a:xfrm>
+        </p:grpSpPr>
+        <p:grpSp>
+          <p:nvGrpSpPr>
+            <p:cNvPr id="29" name="Group 28">
+              <a:extLst>
+                <a:ext uri="{FF2B5EF4-FFF2-40B4-BE49-F238E27FC236}">
+                  <a16:creationId xmlns:a16="http://schemas.microsoft.com/office/drawing/2014/main" id="{8D3EBB6D-DD9B-4932-A64E-4E209FE627C4}"/>
+                </a:ext>
+              </a:extLst>
+            </p:cNvPr>
+            <p:cNvGrpSpPr/>
+            <p:nvPr/>
+          </p:nvGrpSpPr>
+          <p:grpSpPr>
+            <a:xfrm>
+              <a:off x="5268770" y="1073904"/>
+              <a:ext cx="3872276" cy="3774035"/>
+              <a:chOff x="5147673" y="2917371"/>
+              <a:chExt cx="3872276" cy="3774035"/>
+            </a:xfrm>
+          </p:grpSpPr>
+          <p:sp>
+            <p:nvSpPr>
+              <p:cNvPr id="4" name="Rectangle 5 1" descr="Cork">
+                <a:extLst>
+                  <a:ext uri="{FF2B5EF4-FFF2-40B4-BE49-F238E27FC236}">
+                    <a16:creationId xmlns:a16="http://schemas.microsoft.com/office/drawing/2014/main" id="{946543E4-0760-44EA-8DD6-BA13E6C8F4B7}"/>
+                  </a:ext>
+                </a:extLst>
+              </p:cNvPr>
+              <p:cNvSpPr>
+                <a:spLocks noChangeArrowheads="1"/>
+              </p:cNvSpPr>
+              <p:nvPr/>
+            </p:nvSpPr>
+            <p:spPr bwMode="auto">
+              <a:xfrm>
+                <a:off x="7525445" y="4339908"/>
+                <a:ext cx="1494503" cy="2330245"/>
+              </a:xfrm>
+              <a:prstGeom prst="rect">
+                <a:avLst/>
+              </a:prstGeom>
+              <a:solidFill>
+                <a:srgbClr val="00B0F0"/>
+              </a:solidFill>
+              <a:ln w="12700">
+                <a:solidFill>
+                  <a:schemeClr val="bg2"/>
+                </a:solidFill>
+                <a:miter lim="800000"/>
+                <a:headEnd type="none" w="sm" len="sm"/>
+                <a:tailEnd type="none" w="med" len="sm"/>
+              </a:ln>
+              <a:effectLst/>
+            </p:spPr>
+            <p:txBody>
+              <a:bodyPr wrap="none" anchor="ctr"/>
+              <a:lstStyle/>
+              <a:p>
+                <a:pPr algn="ctr"/>
+                <a:endParaRPr lang="en-US" b="0" dirty="0">
+                  <a:solidFill>
+                    <a:schemeClr val="bg2"/>
+                  </a:solidFill>
+                  <a:latin typeface="Book Antiqua" pitchFamily="18" charset="0"/>
+                </a:endParaRPr>
+              </a:p>
+            </p:txBody>
+          </p:sp>
+          <p:sp>
+            <p:nvSpPr>
+              <p:cNvPr id="5" name="Arc 4">
+                <a:extLst>
+                  <a:ext uri="{FF2B5EF4-FFF2-40B4-BE49-F238E27FC236}">
+                    <a16:creationId xmlns:a16="http://schemas.microsoft.com/office/drawing/2014/main" id="{30286772-2D00-4E26-901F-B4C73FCF30B2}"/>
+                  </a:ext>
+                </a:extLst>
+              </p:cNvPr>
+              <p:cNvSpPr/>
+              <p:nvPr/>
+            </p:nvSpPr>
+            <p:spPr bwMode="auto">
+              <a:xfrm flipV="1">
+                <a:off x="7987561" y="4113773"/>
+                <a:ext cx="629265" cy="629265"/>
+              </a:xfrm>
+              <a:prstGeom prst="arc">
+                <a:avLst>
+                  <a:gd name="adj1" fmla="val 10799995"/>
+                  <a:gd name="adj2" fmla="val 0"/>
+                </a:avLst>
+              </a:prstGeom>
+              <a:noFill/>
+              <a:ln w="38100" cap="flat" cmpd="sng" algn="ctr">
+                <a:solidFill>
+                  <a:schemeClr val="tx1"/>
+                </a:solidFill>
+                <a:prstDash val="solid"/>
+                <a:round/>
+                <a:headEnd type="none" w="lg" len="med"/>
+                <a:tailEnd type="none" w="lg" len="med"/>
+              </a:ln>
+              <a:effectLst/>
+            </p:spPr>
+            <p:txBody>
+              <a:bodyPr vert="horz" wrap="square" lIns="91440" tIns="45720" rIns="91440" bIns="45720" numCol="1" rtlCol="0" anchor="t" anchorCtr="0" compatLnSpc="1">
+                <a:prstTxWarp prst="textNoShape">
+                  <a:avLst/>
+                </a:prstTxWarp>
+                <a:spAutoFit/>
+              </a:bodyPr>
+              <a:lstStyle/>
+              <a:p>
+                <a:pPr marL="0" marR="0" indent="0" algn="l" defTabSz="914400" rtl="0" eaLnBrk="0" fontAlgn="base" latinLnBrk="0" hangingPunct="0">
+                  <a:lnSpc>
+                    <a:spcPct val="100000"/>
+                  </a:lnSpc>
+                  <a:spcBef>
+                    <a:spcPct val="50000"/>
+                  </a:spcBef>
+                  <a:spcAft>
+                    <a:spcPct val="0"/>
+                  </a:spcAft>
+                  <a:buClrTx/>
+                  <a:buSzTx/>
+                  <a:buFontTx/>
+                  <a:buNone/>
+                  <a:tabLst/>
+                </a:pPr>
+                <a:endParaRPr kumimoji="0" lang="en-US" sz="2800" b="0" i="0" u="none" strike="noStrike" cap="none" normalizeH="0" baseline="0">
+                  <a:ln>
+                    <a:noFill/>
+                  </a:ln>
+                  <a:solidFill>
+                    <a:schemeClr val="tx1"/>
+                  </a:solidFill>
+                  <a:effectLst/>
+                  <a:latin typeface="Times New Roman" pitchFamily="18" charset="0"/>
+                </a:endParaRPr>
+              </a:p>
+            </p:txBody>
+          </p:sp>
+          <p:sp>
+            <p:nvSpPr>
+              <p:cNvPr id="6" name="Rectangle 5 2" descr="Cork">
+                <a:extLst>
+                  <a:ext uri="{FF2B5EF4-FFF2-40B4-BE49-F238E27FC236}">
+                    <a16:creationId xmlns:a16="http://schemas.microsoft.com/office/drawing/2014/main" id="{1DC5233B-1A43-464D-B252-6DB4BB5D7B87}"/>
+                  </a:ext>
+                </a:extLst>
+              </p:cNvPr>
+              <p:cNvSpPr>
+                <a:spLocks noChangeArrowheads="1"/>
+              </p:cNvSpPr>
+              <p:nvPr/>
+            </p:nvSpPr>
+            <p:spPr bwMode="auto">
+              <a:xfrm>
+                <a:off x="6591379" y="3175819"/>
+                <a:ext cx="139287" cy="3499251"/>
+              </a:xfrm>
+              <a:prstGeom prst="rect">
+                <a:avLst/>
+              </a:prstGeom>
+              <a:solidFill>
+                <a:srgbClr val="00B0F0"/>
+              </a:solidFill>
+              <a:ln w="12700">
+                <a:noFill/>
+                <a:miter lim="800000"/>
+                <a:headEnd type="none" w="sm" len="sm"/>
+                <a:tailEnd type="none" w="med" len="sm"/>
+              </a:ln>
+              <a:effectLst/>
+            </p:spPr>
+            <p:txBody>
+              <a:bodyPr wrap="none" anchor="ctr"/>
+              <a:lstStyle/>
+              <a:p>
+                <a:pPr algn="ctr"/>
+                <a:endParaRPr lang="en-US" b="0" dirty="0">
+                  <a:solidFill>
+                    <a:schemeClr val="bg2"/>
+                  </a:solidFill>
+                  <a:latin typeface="Book Antiqua" pitchFamily="18" charset="0"/>
+                </a:endParaRPr>
+              </a:p>
+            </p:txBody>
+          </p:sp>
+          <p:sp>
+            <p:nvSpPr>
+              <p:cNvPr id="7" name="Freeform 6">
+                <a:extLst>
+                  <a:ext uri="{FF2B5EF4-FFF2-40B4-BE49-F238E27FC236}">
+                    <a16:creationId xmlns:a16="http://schemas.microsoft.com/office/drawing/2014/main" id="{C71F17AF-D678-498F-9117-EDC33B51F897}"/>
+                  </a:ext>
+                </a:extLst>
+              </p:cNvPr>
+              <p:cNvSpPr/>
+              <p:nvPr/>
+            </p:nvSpPr>
+            <p:spPr bwMode="auto">
+              <a:xfrm>
+                <a:off x="6581548" y="2917371"/>
+                <a:ext cx="136419" cy="3772447"/>
+              </a:xfrm>
+              <a:custGeom>
+                <a:avLst/>
+                <a:gdLst>
+                  <a:gd name="connsiteX0" fmla="*/ 429341 w 3501922"/>
+                  <a:gd name="connsiteY0" fmla="*/ 19665 h 3796891"/>
+                  <a:gd name="connsiteX1" fmla="*/ 439174 w 3501922"/>
+                  <a:gd name="connsiteY1" fmla="*/ 3254478 h 3796891"/>
+                  <a:gd name="connsiteX2" fmla="*/ 3064387 w 3501922"/>
+                  <a:gd name="connsiteY2" fmla="*/ 3254478 h 3796891"/>
+                  <a:gd name="connsiteX3" fmla="*/ 3064387 w 3501922"/>
+                  <a:gd name="connsiteY3" fmla="*/ 0 h 3796891"/>
+                  <a:gd name="connsiteX0" fmla="*/ 429341 w 3501922"/>
+                  <a:gd name="connsiteY0" fmla="*/ 19665 h 3796891"/>
+                  <a:gd name="connsiteX1" fmla="*/ 439174 w 3501922"/>
+                  <a:gd name="connsiteY1" fmla="*/ 3254478 h 3796891"/>
+                  <a:gd name="connsiteX2" fmla="*/ 3064387 w 3501922"/>
+                  <a:gd name="connsiteY2" fmla="*/ 3254478 h 3796891"/>
+                  <a:gd name="connsiteX3" fmla="*/ 3064387 w 3501922"/>
+                  <a:gd name="connsiteY3" fmla="*/ 0 h 3796891"/>
+                  <a:gd name="connsiteX0" fmla="*/ 0 w 3072581"/>
+                  <a:gd name="connsiteY0" fmla="*/ 19665 h 3796891"/>
+                  <a:gd name="connsiteX1" fmla="*/ 9833 w 3072581"/>
+                  <a:gd name="connsiteY1" fmla="*/ 3254478 h 3796891"/>
+                  <a:gd name="connsiteX2" fmla="*/ 2635046 w 3072581"/>
+                  <a:gd name="connsiteY2" fmla="*/ 3254478 h 3796891"/>
+                  <a:gd name="connsiteX3" fmla="*/ 2635046 w 3072581"/>
+                  <a:gd name="connsiteY3" fmla="*/ 0 h 3796891"/>
+                  <a:gd name="connsiteX0" fmla="*/ 0 w 3072581"/>
+                  <a:gd name="connsiteY0" fmla="*/ 19665 h 3254478"/>
+                  <a:gd name="connsiteX1" fmla="*/ 9833 w 3072581"/>
+                  <a:gd name="connsiteY1" fmla="*/ 3254478 h 3254478"/>
+                  <a:gd name="connsiteX2" fmla="*/ 2635046 w 3072581"/>
+                  <a:gd name="connsiteY2" fmla="*/ 3254478 h 3254478"/>
+                  <a:gd name="connsiteX3" fmla="*/ 2635046 w 3072581"/>
+                  <a:gd name="connsiteY3" fmla="*/ 0 h 3254478"/>
+                  <a:gd name="connsiteX0" fmla="*/ 0 w 2635046"/>
+                  <a:gd name="connsiteY0" fmla="*/ 19665 h 3254478"/>
+                  <a:gd name="connsiteX1" fmla="*/ 9833 w 2635046"/>
+                  <a:gd name="connsiteY1" fmla="*/ 3254478 h 3254478"/>
+                  <a:gd name="connsiteX2" fmla="*/ 2635046 w 2635046"/>
+                  <a:gd name="connsiteY2" fmla="*/ 3254478 h 3254478"/>
+                  <a:gd name="connsiteX3" fmla="*/ 2635046 w 2635046"/>
+                  <a:gd name="connsiteY3" fmla="*/ 0 h 3254478"/>
+                </a:gdLst>
+                <a:ahLst/>
+                <a:cxnLst>
+                  <a:cxn ang="0">
+                    <a:pos x="connsiteX0" y="connsiteY0"/>
+                  </a:cxn>
+                  <a:cxn ang="0">
+                    <a:pos x="connsiteX1" y="connsiteY1"/>
+                  </a:cxn>
+                  <a:cxn ang="0">
+                    <a:pos x="connsiteX2" y="connsiteY2"/>
+                  </a:cxn>
+                  <a:cxn ang="0">
+                    <a:pos x="connsiteX3" y="connsiteY3"/>
+                  </a:cxn>
+                </a:cxnLst>
+                <a:rect l="l" t="t" r="r" b="b"/>
+                <a:pathLst>
+                  <a:path w="2635046" h="3254478">
+                    <a:moveTo>
+                      <a:pt x="0" y="19665"/>
+                    </a:moveTo>
+                    <a:cubicBezTo>
+                      <a:pt x="3278" y="1097936"/>
+                      <a:pt x="6555" y="2176207"/>
+                      <a:pt x="9833" y="3254478"/>
+                    </a:cubicBezTo>
+                    <a:lnTo>
+                      <a:pt x="2635046" y="3254478"/>
+                    </a:lnTo>
+                    <a:lnTo>
+                      <a:pt x="2635046" y="0"/>
+                    </a:lnTo>
+                  </a:path>
+                </a:pathLst>
+              </a:custGeom>
+              <a:noFill/>
+              <a:ln w="38100" cap="flat" cmpd="sng" algn="ctr">
+                <a:solidFill>
+                  <a:schemeClr val="tx1"/>
+                </a:solidFill>
+                <a:prstDash val="solid"/>
+                <a:round/>
+                <a:headEnd type="none" w="lg" len="med"/>
+                <a:tailEnd type="none" w="lg" len="med"/>
+              </a:ln>
+              <a:effectLst/>
+            </p:spPr>
+            <p:txBody>
+              <a:bodyPr vert="horz" wrap="square" lIns="91440" tIns="45720" rIns="91440" bIns="45720" numCol="1" rtlCol="0" anchor="t" anchorCtr="0" compatLnSpc="1">
+                <a:prstTxWarp prst="textNoShape">
+                  <a:avLst/>
+                </a:prstTxWarp>
+                <a:noAutofit/>
+              </a:bodyPr>
+              <a:lstStyle/>
+              <a:p>
+                <a:pPr marL="0" marR="0" indent="0" algn="l" defTabSz="914400" rtl="0" eaLnBrk="0" fontAlgn="base" latinLnBrk="0" hangingPunct="0">
+                  <a:lnSpc>
+                    <a:spcPct val="100000"/>
+                  </a:lnSpc>
+                  <a:spcBef>
+                    <a:spcPct val="50000"/>
+                  </a:spcBef>
+                  <a:spcAft>
+                    <a:spcPct val="0"/>
+                  </a:spcAft>
+                  <a:buClrTx/>
+                  <a:buSzTx/>
+                  <a:buFontTx/>
+                  <a:buNone/>
+                  <a:tabLst/>
+                </a:pPr>
+                <a:endParaRPr kumimoji="0" lang="en-US" sz="2800" b="0" i="0" u="none" strike="noStrike" cap="none" normalizeH="0" baseline="0">
+                  <a:ln>
+                    <a:noFill/>
+                  </a:ln>
+                  <a:solidFill>
+                    <a:schemeClr val="tx1"/>
+                  </a:solidFill>
+                  <a:effectLst/>
+                  <a:latin typeface="Times New Roman" pitchFamily="18" charset="0"/>
+                </a:endParaRPr>
+              </a:p>
+            </p:txBody>
+          </p:sp>
+          <p:grpSp>
+            <p:nvGrpSpPr>
+              <p:cNvPr id="8" name="Group 7">
+                <a:extLst>
+                  <a:ext uri="{FF2B5EF4-FFF2-40B4-BE49-F238E27FC236}">
+                    <a16:creationId xmlns:a16="http://schemas.microsoft.com/office/drawing/2014/main" id="{FD7B6D1F-0FE2-4593-B29E-9A5644449C04}"/>
+                  </a:ext>
+                </a:extLst>
+              </p:cNvPr>
+              <p:cNvGrpSpPr/>
+              <p:nvPr/>
+            </p:nvGrpSpPr>
+            <p:grpSpPr>
+              <a:xfrm>
+                <a:off x="6709366" y="6522669"/>
+                <a:ext cx="835743" cy="167149"/>
+                <a:chOff x="1179871" y="5447071"/>
+                <a:chExt cx="2168013" cy="270387"/>
+              </a:xfrm>
+            </p:grpSpPr>
+            <p:sp>
+              <p:nvSpPr>
+                <p:cNvPr id="9" name="Rectangle 5 3" descr="Cork">
+                  <a:extLst>
+                    <a:ext uri="{FF2B5EF4-FFF2-40B4-BE49-F238E27FC236}">
+                      <a16:creationId xmlns:a16="http://schemas.microsoft.com/office/drawing/2014/main" id="{46BC1A79-F79F-4E7E-8D31-FE9088C02568}"/>
+                    </a:ext>
+                  </a:extLst>
+                </p:cNvPr>
+                <p:cNvSpPr>
+                  <a:spLocks noChangeArrowheads="1"/>
+                </p:cNvSpPr>
+                <p:nvPr/>
+              </p:nvSpPr>
+              <p:spPr bwMode="auto">
+                <a:xfrm>
+                  <a:off x="1179872" y="5466735"/>
+                  <a:ext cx="2163096" cy="245806"/>
+                </a:xfrm>
+                <a:prstGeom prst="rect">
+                  <a:avLst/>
+                </a:prstGeom>
+                <a:solidFill>
+                  <a:srgbClr val="00B0F0"/>
+                </a:solidFill>
+                <a:ln w="12700">
+                  <a:noFill/>
+                  <a:miter lim="800000"/>
+                  <a:headEnd type="none" w="sm" len="sm"/>
+                  <a:tailEnd type="none" w="med" len="sm"/>
+                </a:ln>
+                <a:effectLst/>
+              </p:spPr>
+              <p:txBody>
+                <a:bodyPr wrap="none" anchor="ctr"/>
+                <a:lstStyle/>
+                <a:p>
+                  <a:pPr algn="ctr"/>
+                  <a:endParaRPr lang="en-US" b="0" dirty="0">
+                    <a:solidFill>
+                      <a:schemeClr val="bg2"/>
+                    </a:solidFill>
+                    <a:latin typeface="Book Antiqua" pitchFamily="18" charset="0"/>
+                  </a:endParaRPr>
+                </a:p>
+              </p:txBody>
+            </p:sp>
+            <p:cxnSp>
+              <p:nvCxnSpPr>
+                <p:cNvPr id="10" name="Straight Connector 9">
+                  <a:extLst>
+                    <a:ext uri="{FF2B5EF4-FFF2-40B4-BE49-F238E27FC236}">
+                      <a16:creationId xmlns:a16="http://schemas.microsoft.com/office/drawing/2014/main" id="{A2C9EB9C-D55C-4101-B719-1BF84393D586}"/>
+                    </a:ext>
+                  </a:extLst>
+                </p:cNvPr>
+                <p:cNvCxnSpPr/>
+                <p:nvPr/>
+              </p:nvCxnSpPr>
+              <p:spPr bwMode="auto">
+                <a:xfrm>
+                  <a:off x="1179871" y="5447071"/>
+                  <a:ext cx="2163097" cy="0"/>
+                </a:xfrm>
+                <a:prstGeom prst="line">
+                  <a:avLst/>
+                </a:prstGeom>
+                <a:noFill/>
+                <a:ln w="38100" cap="flat" cmpd="sng" algn="ctr">
+                  <a:solidFill>
+                    <a:schemeClr val="tx1"/>
+                  </a:solidFill>
+                  <a:prstDash val="solid"/>
+                  <a:round/>
+                  <a:headEnd type="none" w="lg" len="med"/>
+                  <a:tailEnd type="none" w="lg" len="med"/>
+                </a:ln>
+                <a:effectLst/>
+              </p:spPr>
+            </p:cxnSp>
+            <p:cxnSp>
+              <p:nvCxnSpPr>
+                <p:cNvPr id="11" name="Straight Connector 10">
+                  <a:extLst>
+                    <a:ext uri="{FF2B5EF4-FFF2-40B4-BE49-F238E27FC236}">
+                      <a16:creationId xmlns:a16="http://schemas.microsoft.com/office/drawing/2014/main" id="{D898106A-3A1C-4576-90CC-8FA1370DC5C4}"/>
+                    </a:ext>
+                  </a:extLst>
+                </p:cNvPr>
+                <p:cNvCxnSpPr/>
+                <p:nvPr/>
+              </p:nvCxnSpPr>
+              <p:spPr bwMode="auto">
+                <a:xfrm>
+                  <a:off x="1184787" y="5717458"/>
+                  <a:ext cx="2163097" cy="0"/>
+                </a:xfrm>
+                <a:prstGeom prst="line">
+                  <a:avLst/>
+                </a:prstGeom>
+                <a:noFill/>
+                <a:ln w="38100" cap="flat" cmpd="sng" algn="ctr">
+                  <a:solidFill>
+                    <a:schemeClr val="tx1"/>
+                  </a:solidFill>
+                  <a:prstDash val="solid"/>
+                  <a:round/>
+                  <a:headEnd type="none" w="lg" len="med"/>
+                  <a:tailEnd type="none" w="lg" len="med"/>
+                </a:ln>
+                <a:effectLst/>
+              </p:spPr>
+            </p:cxnSp>
+          </p:grpSp>
+          <p:cxnSp>
+            <p:nvCxnSpPr>
+              <p:cNvPr id="12" name="Straight Connector 11">
+                <a:extLst>
+                  <a:ext uri="{FF2B5EF4-FFF2-40B4-BE49-F238E27FC236}">
+                    <a16:creationId xmlns:a16="http://schemas.microsoft.com/office/drawing/2014/main" id="{E7B3A868-2392-4F3F-BE5E-C89DC5548903}"/>
+                  </a:ext>
+                </a:extLst>
+              </p:cNvPr>
+              <p:cNvCxnSpPr>
+                <a:stCxn id="7" idx="1"/>
+              </p:cNvCxnSpPr>
+              <p:nvPr/>
+            </p:nvCxnSpPr>
+            <p:spPr bwMode="auto">
+              <a:xfrm flipH="1">
+                <a:off x="5147673" y="6689818"/>
+                <a:ext cx="1434384" cy="1"/>
+              </a:xfrm>
+              <a:prstGeom prst="line">
+                <a:avLst/>
+              </a:prstGeom>
+              <a:noFill/>
+              <a:ln w="12700" cap="flat" cmpd="sng" algn="ctr">
+                <a:solidFill>
+                  <a:schemeClr val="tx1"/>
+                </a:solidFill>
+                <a:prstDash val="sysDot"/>
+                <a:round/>
+                <a:headEnd type="none" w="lg" len="med"/>
+                <a:tailEnd type="none" w="lg" len="med"/>
+              </a:ln>
+              <a:effectLst/>
+            </p:spPr>
+          </p:cxnSp>
+          <p:cxnSp>
+            <p:nvCxnSpPr>
+              <p:cNvPr id="13" name="Straight Connector 12">
+                <a:extLst>
+                  <a:ext uri="{FF2B5EF4-FFF2-40B4-BE49-F238E27FC236}">
+                    <a16:creationId xmlns:a16="http://schemas.microsoft.com/office/drawing/2014/main" id="{3A1D3286-20DC-4FF7-9AC5-65F1CC5F9B82}"/>
+                  </a:ext>
+                </a:extLst>
+              </p:cNvPr>
+              <p:cNvCxnSpPr/>
+              <p:nvPr/>
+            </p:nvCxnSpPr>
+            <p:spPr bwMode="auto">
+              <a:xfrm rot="10800000">
+                <a:off x="5167338" y="3174770"/>
+                <a:ext cx="1380331" cy="0"/>
+              </a:xfrm>
+              <a:prstGeom prst="line">
+                <a:avLst/>
+              </a:prstGeom>
+              <a:noFill/>
+              <a:ln w="12700" cap="flat" cmpd="sng" algn="ctr">
+                <a:solidFill>
+                  <a:schemeClr val="tx1"/>
+                </a:solidFill>
+                <a:prstDash val="sysDot"/>
+                <a:round/>
+                <a:headEnd type="none" w="lg" len="med"/>
+                <a:tailEnd type="none" w="lg" len="med"/>
+              </a:ln>
+              <a:effectLst/>
+            </p:spPr>
+          </p:cxnSp>
+          <p:cxnSp>
+            <p:nvCxnSpPr>
+              <p:cNvPr id="14" name="Straight Connector 13">
+                <a:extLst>
+                  <a:ext uri="{FF2B5EF4-FFF2-40B4-BE49-F238E27FC236}">
+                    <a16:creationId xmlns:a16="http://schemas.microsoft.com/office/drawing/2014/main" id="{520809D3-6F7C-4514-A70A-D0DFDBB29900}"/>
+                  </a:ext>
+                </a:extLst>
+              </p:cNvPr>
+              <p:cNvCxnSpPr/>
+              <p:nvPr/>
+            </p:nvCxnSpPr>
+            <p:spPr bwMode="auto">
+              <a:xfrm rot="10800000">
+                <a:off x="5836716" y="4359575"/>
+                <a:ext cx="1728596" cy="0"/>
+              </a:xfrm>
+              <a:prstGeom prst="line">
+                <a:avLst/>
+              </a:prstGeom>
+              <a:noFill/>
+              <a:ln w="12700" cap="flat" cmpd="sng" algn="ctr">
+                <a:solidFill>
+                  <a:schemeClr val="tx1"/>
+                </a:solidFill>
+                <a:prstDash val="sysDot"/>
+                <a:round/>
+                <a:headEnd type="none" w="lg" len="med"/>
+                <a:tailEnd type="none" w="lg" len="med"/>
+              </a:ln>
+              <a:effectLst/>
+            </p:spPr>
+          </p:cxnSp>
+          <p:cxnSp>
+            <p:nvCxnSpPr>
+              <p:cNvPr id="15" name="Straight Connector 14">
+                <a:extLst>
+                  <a:ext uri="{FF2B5EF4-FFF2-40B4-BE49-F238E27FC236}">
+                    <a16:creationId xmlns:a16="http://schemas.microsoft.com/office/drawing/2014/main" id="{D1508192-B663-47CF-8CB8-C01CD71971E1}"/>
+                  </a:ext>
+                </a:extLst>
+              </p:cNvPr>
+              <p:cNvCxnSpPr/>
+              <p:nvPr/>
+            </p:nvCxnSpPr>
+            <p:spPr bwMode="auto">
+              <a:xfrm rot="10800000">
+                <a:off x="5862505" y="5308375"/>
+                <a:ext cx="1631884" cy="0"/>
+              </a:xfrm>
+              <a:prstGeom prst="line">
+                <a:avLst/>
+              </a:prstGeom>
+              <a:noFill/>
+              <a:ln w="12700" cap="flat" cmpd="sng" algn="ctr">
+                <a:solidFill>
+                  <a:schemeClr val="tx1"/>
+                </a:solidFill>
+                <a:prstDash val="sysDot"/>
+                <a:round/>
+                <a:headEnd type="none" w="lg" len="med"/>
+                <a:tailEnd type="none" w="lg" len="med"/>
+              </a:ln>
+              <a:effectLst/>
+            </p:spPr>
+          </p:cxnSp>
+          <p:cxnSp>
+            <p:nvCxnSpPr>
+              <p:cNvPr id="16" name="Straight Connector 15">
+                <a:extLst>
+                  <a:ext uri="{FF2B5EF4-FFF2-40B4-BE49-F238E27FC236}">
+                    <a16:creationId xmlns:a16="http://schemas.microsoft.com/office/drawing/2014/main" id="{9A2A8765-CF52-4F9C-B65D-C6BF88D0A8F4}"/>
+                  </a:ext>
+                </a:extLst>
+              </p:cNvPr>
+              <p:cNvCxnSpPr/>
+              <p:nvPr/>
+            </p:nvCxnSpPr>
+            <p:spPr bwMode="auto">
+              <a:xfrm rot="10800000">
+                <a:off x="5785136" y="6463679"/>
+                <a:ext cx="1741489" cy="0"/>
+              </a:xfrm>
+              <a:prstGeom prst="line">
+                <a:avLst/>
+              </a:prstGeom>
+              <a:noFill/>
+              <a:ln w="12700" cap="flat" cmpd="sng" algn="ctr">
+                <a:solidFill>
+                  <a:schemeClr val="tx1"/>
+                </a:solidFill>
+                <a:prstDash val="sysDot"/>
+                <a:round/>
+                <a:headEnd type="none" w="lg" len="med"/>
+                <a:tailEnd type="none" w="lg" len="med"/>
+              </a:ln>
+              <a:effectLst/>
+            </p:spPr>
+          </p:cxnSp>
+          <p:cxnSp>
+            <p:nvCxnSpPr>
+              <p:cNvPr id="17" name="Straight Arrow Connector 16">
+                <a:extLst>
+                  <a:ext uri="{FF2B5EF4-FFF2-40B4-BE49-F238E27FC236}">
+                    <a16:creationId xmlns:a16="http://schemas.microsoft.com/office/drawing/2014/main" id="{5095254E-6106-40E6-A983-0F2BFB993DB8}"/>
+                  </a:ext>
+                </a:extLst>
+              </p:cNvPr>
+              <p:cNvCxnSpPr/>
+              <p:nvPr/>
+            </p:nvCxnSpPr>
+            <p:spPr bwMode="auto">
+              <a:xfrm rot="5400000">
+                <a:off x="3692657" y="4933217"/>
+                <a:ext cx="3514790" cy="1588"/>
+              </a:xfrm>
+              <a:prstGeom prst="straightConnector1">
+                <a:avLst/>
+              </a:prstGeom>
+              <a:noFill/>
+              <a:ln w="12700" cap="flat" cmpd="sng" algn="ctr">
+                <a:solidFill>
+                  <a:schemeClr val="tx1"/>
+                </a:solidFill>
+                <a:prstDash val="solid"/>
+                <a:round/>
+                <a:headEnd type="triangle" w="lg" len="med"/>
+                <a:tailEnd type="triangle" w="lg" len="med"/>
+              </a:ln>
+              <a:effectLst/>
+            </p:spPr>
+          </p:cxnSp>
+          <p:cxnSp>
+            <p:nvCxnSpPr>
+              <p:cNvPr id="18" name="Straight Arrow Connector 17">
+                <a:extLst>
+                  <a:ext uri="{FF2B5EF4-FFF2-40B4-BE49-F238E27FC236}">
+                    <a16:creationId xmlns:a16="http://schemas.microsoft.com/office/drawing/2014/main" id="{27EB1ABF-F290-45F1-9395-14314F9CE4B3}"/>
+                  </a:ext>
+                </a:extLst>
+              </p:cNvPr>
+              <p:cNvCxnSpPr/>
+              <p:nvPr/>
+            </p:nvCxnSpPr>
+            <p:spPr bwMode="auto">
+              <a:xfrm rot="5400000">
+                <a:off x="5511334" y="3763178"/>
+                <a:ext cx="1174719" cy="1588"/>
+              </a:xfrm>
+              <a:prstGeom prst="straightConnector1">
+                <a:avLst/>
+              </a:prstGeom>
+              <a:noFill/>
+              <a:ln w="12700" cap="flat" cmpd="sng" algn="ctr">
+                <a:solidFill>
+                  <a:schemeClr val="tx1"/>
+                </a:solidFill>
+                <a:prstDash val="solid"/>
+                <a:round/>
+                <a:headEnd type="triangle" w="lg" len="med"/>
+                <a:tailEnd type="triangle" w="lg" len="med"/>
+              </a:ln>
+              <a:effectLst/>
+            </p:spPr>
+          </p:cxnSp>
+          <p:cxnSp>
+            <p:nvCxnSpPr>
+              <p:cNvPr id="19" name="Straight Arrow Connector 18">
+                <a:extLst>
+                  <a:ext uri="{FF2B5EF4-FFF2-40B4-BE49-F238E27FC236}">
+                    <a16:creationId xmlns:a16="http://schemas.microsoft.com/office/drawing/2014/main" id="{B0E6F841-897E-41F5-9FBE-F451C7878CCF}"/>
+                  </a:ext>
+                </a:extLst>
+              </p:cNvPr>
+              <p:cNvCxnSpPr/>
+              <p:nvPr/>
+            </p:nvCxnSpPr>
+            <p:spPr bwMode="auto">
+              <a:xfrm rot="5400000">
+                <a:off x="5519977" y="5907006"/>
+                <a:ext cx="1155845" cy="1588"/>
+              </a:xfrm>
+              <a:prstGeom prst="straightConnector1">
+                <a:avLst/>
+              </a:prstGeom>
+              <a:noFill/>
+              <a:ln w="12700" cap="flat" cmpd="sng" algn="ctr">
+                <a:solidFill>
+                  <a:schemeClr val="tx1"/>
+                </a:solidFill>
+                <a:prstDash val="solid"/>
+                <a:round/>
+                <a:headEnd type="triangle" w="lg" len="med"/>
+                <a:tailEnd type="triangle" w="lg" len="med"/>
+              </a:ln>
+              <a:effectLst/>
+            </p:spPr>
+          </p:cxnSp>
+          <p:sp>
+            <p:nvSpPr>
+              <p:cNvPr id="20" name="Rectangle 5 4" descr="Cork">
+                <a:extLst>
+                  <a:ext uri="{FF2B5EF4-FFF2-40B4-BE49-F238E27FC236}">
+                    <a16:creationId xmlns:a16="http://schemas.microsoft.com/office/drawing/2014/main" id="{7D4A7DFA-13DD-48CB-8B6D-DF76E4C3655A}"/>
+                  </a:ext>
+                </a:extLst>
+              </p:cNvPr>
+              <p:cNvSpPr>
+                <a:spLocks noChangeArrowheads="1"/>
+              </p:cNvSpPr>
+              <p:nvPr/>
+            </p:nvSpPr>
+            <p:spPr bwMode="auto">
+              <a:xfrm>
+                <a:off x="7525446" y="4821691"/>
+                <a:ext cx="1494503" cy="609600"/>
+              </a:xfrm>
+              <a:prstGeom prst="rect">
+                <a:avLst/>
+              </a:prstGeom>
+              <a:blipFill dpi="0" rotWithShape="1">
+                <a:blip r:embed="rId7" cstate="print">
+                  <a:alphaModFix amt="50000"/>
+                </a:blip>
+                <a:srcRect/>
+                <a:tile tx="0" ty="0" sx="100000" sy="100000" flip="none" algn="tl"/>
+              </a:blipFill>
+              <a:ln w="12700">
+                <a:noFill/>
+                <a:miter lim="800000"/>
+                <a:headEnd type="none" w="sm" len="sm"/>
+                <a:tailEnd type="none" w="med" len="sm"/>
+              </a:ln>
+              <a:effectLst/>
+            </p:spPr>
+            <p:txBody>
+              <a:bodyPr wrap="none" anchor="ctr"/>
+              <a:lstStyle/>
+              <a:p>
+                <a:pPr algn="ctr"/>
+                <a:endParaRPr lang="en-US" b="0" dirty="0">
+                  <a:solidFill>
+                    <a:schemeClr val="bg2"/>
+                  </a:solidFill>
+                  <a:latin typeface="Book Antiqua" pitchFamily="18" charset="0"/>
+                </a:endParaRPr>
+              </a:p>
+            </p:txBody>
+          </p:sp>
+          <p:cxnSp>
+            <p:nvCxnSpPr>
+              <p:cNvPr id="21" name="Straight Arrow Connector 20">
+                <a:extLst>
+                  <a:ext uri="{FF2B5EF4-FFF2-40B4-BE49-F238E27FC236}">
+                    <a16:creationId xmlns:a16="http://schemas.microsoft.com/office/drawing/2014/main" id="{C4CFDE4E-B9E9-4FF3-9A57-15816872EBA5}"/>
+                  </a:ext>
+                </a:extLst>
+              </p:cNvPr>
+              <p:cNvCxnSpPr/>
+              <p:nvPr/>
+            </p:nvCxnSpPr>
+            <p:spPr bwMode="auto">
+              <a:xfrm rot="5400000">
+                <a:off x="5623692" y="4837750"/>
+                <a:ext cx="963010" cy="1588"/>
+              </a:xfrm>
+              <a:prstGeom prst="straightConnector1">
+                <a:avLst/>
+              </a:prstGeom>
+              <a:noFill/>
+              <a:ln w="12700" cap="flat" cmpd="sng" algn="ctr">
+                <a:solidFill>
+                  <a:schemeClr val="tx1"/>
+                </a:solidFill>
+                <a:prstDash val="solid"/>
+                <a:round/>
+                <a:headEnd type="triangle" w="lg" len="med"/>
+                <a:tailEnd type="triangle" w="lg" len="med"/>
+              </a:ln>
+              <a:effectLst/>
+            </p:spPr>
+          </p:cxnSp>
+          <p:sp>
+            <p:nvSpPr>
+              <p:cNvPr id="22" name="Rectangle 5 5" descr="Cork">
+                <a:extLst>
+                  <a:ext uri="{FF2B5EF4-FFF2-40B4-BE49-F238E27FC236}">
+                    <a16:creationId xmlns:a16="http://schemas.microsoft.com/office/drawing/2014/main" id="{073202D2-8044-42DE-983E-8583043EE623}"/>
+                  </a:ext>
+                </a:extLst>
+              </p:cNvPr>
+              <p:cNvSpPr>
+                <a:spLocks noChangeArrowheads="1"/>
+              </p:cNvSpPr>
+              <p:nvPr/>
+            </p:nvSpPr>
+            <p:spPr bwMode="auto">
+              <a:xfrm>
+                <a:off x="7525446" y="5289755"/>
+                <a:ext cx="1494503" cy="1173921"/>
+              </a:xfrm>
+              <a:prstGeom prst="rect">
+                <a:avLst/>
+              </a:prstGeom>
+              <a:blipFill>
+                <a:blip r:embed="rId7" cstate="print"/>
+                <a:tile tx="0" ty="0" sx="100000" sy="100000" flip="none" algn="tl"/>
+              </a:blipFill>
+              <a:ln w="12700">
+                <a:noFill/>
+                <a:miter lim="800000"/>
+                <a:headEnd type="none" w="sm" len="sm"/>
+                <a:tailEnd type="none" w="med" len="sm"/>
+              </a:ln>
+              <a:effectLst/>
+            </p:spPr>
+            <p:txBody>
+              <a:bodyPr wrap="none" anchor="ctr"/>
+              <a:lstStyle/>
+              <a:p>
+                <a:pPr algn="ctr"/>
+                <a:endParaRPr lang="en-US" b="0" dirty="0">
+                  <a:solidFill>
+                    <a:schemeClr val="bg2"/>
+                  </a:solidFill>
+                  <a:latin typeface="Book Antiqua" pitchFamily="18" charset="0"/>
+                </a:endParaRPr>
+              </a:p>
+            </p:txBody>
+          </p:sp>
+          <p:sp>
+            <p:nvSpPr>
+              <p:cNvPr id="23" name="Freeform 5">
+                <a:extLst>
+                  <a:ext uri="{FF2B5EF4-FFF2-40B4-BE49-F238E27FC236}">
+                    <a16:creationId xmlns:a16="http://schemas.microsoft.com/office/drawing/2014/main" id="{9CF901DC-981E-4D62-B773-17659FA92DF3}"/>
+                  </a:ext>
+                </a:extLst>
+              </p:cNvPr>
+              <p:cNvSpPr/>
+              <p:nvPr/>
+            </p:nvSpPr>
+            <p:spPr bwMode="auto">
+              <a:xfrm>
+                <a:off x="7515612" y="3435341"/>
+                <a:ext cx="1494504" cy="3254478"/>
+              </a:xfrm>
+              <a:custGeom>
+                <a:avLst/>
+                <a:gdLst>
+                  <a:gd name="connsiteX0" fmla="*/ 429341 w 3501922"/>
+                  <a:gd name="connsiteY0" fmla="*/ 19665 h 3796891"/>
+                  <a:gd name="connsiteX1" fmla="*/ 439174 w 3501922"/>
+                  <a:gd name="connsiteY1" fmla="*/ 3254478 h 3796891"/>
+                  <a:gd name="connsiteX2" fmla="*/ 3064387 w 3501922"/>
+                  <a:gd name="connsiteY2" fmla="*/ 3254478 h 3796891"/>
+                  <a:gd name="connsiteX3" fmla="*/ 3064387 w 3501922"/>
+                  <a:gd name="connsiteY3" fmla="*/ 0 h 3796891"/>
+                  <a:gd name="connsiteX0" fmla="*/ 429341 w 3501922"/>
+                  <a:gd name="connsiteY0" fmla="*/ 19665 h 3796891"/>
+                  <a:gd name="connsiteX1" fmla="*/ 439174 w 3501922"/>
+                  <a:gd name="connsiteY1" fmla="*/ 3254478 h 3796891"/>
+                  <a:gd name="connsiteX2" fmla="*/ 3064387 w 3501922"/>
+                  <a:gd name="connsiteY2" fmla="*/ 3254478 h 3796891"/>
+                  <a:gd name="connsiteX3" fmla="*/ 3064387 w 3501922"/>
+                  <a:gd name="connsiteY3" fmla="*/ 0 h 3796891"/>
+                  <a:gd name="connsiteX0" fmla="*/ 0 w 3072581"/>
+                  <a:gd name="connsiteY0" fmla="*/ 19665 h 3796891"/>
+                  <a:gd name="connsiteX1" fmla="*/ 9833 w 3072581"/>
+                  <a:gd name="connsiteY1" fmla="*/ 3254478 h 3796891"/>
+                  <a:gd name="connsiteX2" fmla="*/ 2635046 w 3072581"/>
+                  <a:gd name="connsiteY2" fmla="*/ 3254478 h 3796891"/>
+                  <a:gd name="connsiteX3" fmla="*/ 2635046 w 3072581"/>
+                  <a:gd name="connsiteY3" fmla="*/ 0 h 3796891"/>
+                  <a:gd name="connsiteX0" fmla="*/ 0 w 3072581"/>
+                  <a:gd name="connsiteY0" fmla="*/ 19665 h 3254478"/>
+                  <a:gd name="connsiteX1" fmla="*/ 9833 w 3072581"/>
+                  <a:gd name="connsiteY1" fmla="*/ 3254478 h 3254478"/>
+                  <a:gd name="connsiteX2" fmla="*/ 2635046 w 3072581"/>
+                  <a:gd name="connsiteY2" fmla="*/ 3254478 h 3254478"/>
+                  <a:gd name="connsiteX3" fmla="*/ 2635046 w 3072581"/>
+                  <a:gd name="connsiteY3" fmla="*/ 0 h 3254478"/>
+                  <a:gd name="connsiteX0" fmla="*/ 0 w 2635046"/>
+                  <a:gd name="connsiteY0" fmla="*/ 19665 h 3254478"/>
+                  <a:gd name="connsiteX1" fmla="*/ 9833 w 2635046"/>
+                  <a:gd name="connsiteY1" fmla="*/ 3254478 h 3254478"/>
+                  <a:gd name="connsiteX2" fmla="*/ 2635046 w 2635046"/>
+                  <a:gd name="connsiteY2" fmla="*/ 3254478 h 3254478"/>
+                  <a:gd name="connsiteX3" fmla="*/ 2635046 w 2635046"/>
+                  <a:gd name="connsiteY3" fmla="*/ 0 h 3254478"/>
+                </a:gdLst>
+                <a:ahLst/>
+                <a:cxnLst>
+                  <a:cxn ang="0">
+                    <a:pos x="connsiteX0" y="connsiteY0"/>
+                  </a:cxn>
+                  <a:cxn ang="0">
+                    <a:pos x="connsiteX1" y="connsiteY1"/>
+                  </a:cxn>
+                  <a:cxn ang="0">
+                    <a:pos x="connsiteX2" y="connsiteY2"/>
+                  </a:cxn>
+                  <a:cxn ang="0">
+                    <a:pos x="connsiteX3" y="connsiteY3"/>
+                  </a:cxn>
+                </a:cxnLst>
+                <a:rect l="l" t="t" r="r" b="b"/>
+                <a:pathLst>
+                  <a:path w="2635046" h="3254478">
+                    <a:moveTo>
+                      <a:pt x="0" y="19665"/>
+                    </a:moveTo>
+                    <a:cubicBezTo>
+                      <a:pt x="3278" y="1097936"/>
+                      <a:pt x="6555" y="2176207"/>
+                      <a:pt x="9833" y="3254478"/>
+                    </a:cubicBezTo>
+                    <a:lnTo>
+                      <a:pt x="2635046" y="3254478"/>
+                    </a:lnTo>
+                    <a:lnTo>
+                      <a:pt x="2635046" y="0"/>
+                    </a:lnTo>
+                  </a:path>
+                </a:pathLst>
+              </a:custGeom>
+              <a:noFill/>
+              <a:ln w="38100" cap="flat" cmpd="sng" algn="ctr">
+                <a:solidFill>
+                  <a:schemeClr val="tx1"/>
+                </a:solidFill>
+                <a:prstDash val="solid"/>
+                <a:round/>
+                <a:headEnd type="none" w="lg" len="med"/>
+                <a:tailEnd type="none" w="lg" len="med"/>
+              </a:ln>
+              <a:effectLst/>
+            </p:spPr>
+            <p:txBody>
+              <a:bodyPr vert="horz" wrap="square" lIns="91440" tIns="45720" rIns="91440" bIns="45720" numCol="1" rtlCol="0" anchor="t" anchorCtr="0" compatLnSpc="1">
+                <a:prstTxWarp prst="textNoShape">
+                  <a:avLst/>
+                </a:prstTxWarp>
+                <a:noAutofit/>
+              </a:bodyPr>
+              <a:lstStyle/>
+              <a:p>
+                <a:pPr marL="0" marR="0" indent="0" algn="l" defTabSz="914400" rtl="0" eaLnBrk="0" fontAlgn="base" latinLnBrk="0" hangingPunct="0">
+                  <a:lnSpc>
+                    <a:spcPct val="100000"/>
+                  </a:lnSpc>
+                  <a:spcBef>
+                    <a:spcPct val="50000"/>
+                  </a:spcBef>
+                  <a:spcAft>
+                    <a:spcPct val="0"/>
+                  </a:spcAft>
+                  <a:buClrTx/>
+                  <a:buSzTx/>
+                  <a:buFontTx/>
+                  <a:buNone/>
+                  <a:tabLst/>
+                </a:pPr>
+                <a:endParaRPr kumimoji="0" lang="en-US" sz="2800" b="0" i="0" u="none" strike="noStrike" cap="none" normalizeH="0" baseline="0">
+                  <a:ln>
+                    <a:noFill/>
+                  </a:ln>
+                  <a:solidFill>
+                    <a:schemeClr val="tx1"/>
+                  </a:solidFill>
+                  <a:effectLst/>
+                  <a:latin typeface="Times New Roman" pitchFamily="18" charset="0"/>
+                </a:endParaRPr>
+              </a:p>
+            </p:txBody>
+          </p:sp>
+          <p:sp>
+            <p:nvSpPr>
+              <p:cNvPr id="24" name="Rectangle 23">
+                <a:extLst>
+                  <a:ext uri="{FF2B5EF4-FFF2-40B4-BE49-F238E27FC236}">
+                    <a16:creationId xmlns:a16="http://schemas.microsoft.com/office/drawing/2014/main" id="{1CCEC53E-AF3F-4357-93AA-84A35C2AAAEC}"/>
+                  </a:ext>
+                </a:extLst>
+              </p:cNvPr>
+              <p:cNvSpPr/>
+              <p:nvPr/>
+            </p:nvSpPr>
+            <p:spPr bwMode="auto">
+              <a:xfrm>
+                <a:off x="7369763" y="6548284"/>
+                <a:ext cx="255638" cy="88490"/>
+              </a:xfrm>
+              <a:prstGeom prst="rect">
+                <a:avLst/>
+              </a:prstGeom>
+              <a:solidFill>
+                <a:srgbClr val="00B0F0"/>
+              </a:solidFill>
+              <a:ln w="12700" cap="flat" cmpd="sng" algn="ctr">
+                <a:noFill/>
+                <a:prstDash val="solid"/>
+                <a:round/>
+                <a:headEnd type="none" w="lg" len="med"/>
+                <a:tailEnd type="none" w="lg" len="med"/>
+              </a:ln>
+              <a:effectLst/>
+            </p:spPr>
+            <p:txBody>
+              <a:bodyPr vert="horz" wrap="square" lIns="91440" tIns="45720" rIns="91440" bIns="45720" numCol="1" rtlCol="0" anchor="t" anchorCtr="0" compatLnSpc="1">
+                <a:prstTxWarp prst="textNoShape">
+                  <a:avLst/>
+                </a:prstTxWarp>
+                <a:spAutoFit/>
+              </a:bodyPr>
+              <a:lstStyle/>
+              <a:p>
+                <a:pPr marL="0" marR="0" indent="0" algn="l" defTabSz="914400" rtl="0" eaLnBrk="0" fontAlgn="base" latinLnBrk="0" hangingPunct="0">
+                  <a:lnSpc>
+                    <a:spcPct val="100000"/>
+                  </a:lnSpc>
+                  <a:spcBef>
+                    <a:spcPct val="50000"/>
+                  </a:spcBef>
+                  <a:spcAft>
+                    <a:spcPct val="0"/>
+                  </a:spcAft>
+                  <a:buClrTx/>
+                  <a:buSzTx/>
+                  <a:buFontTx/>
+                  <a:buNone/>
+                  <a:tabLst/>
+                </a:pPr>
+                <a:endParaRPr kumimoji="0" lang="en-US" sz="2800" b="0" i="0" u="none" strike="noStrike" cap="none" normalizeH="0" baseline="0">
+                  <a:ln>
+                    <a:noFill/>
+                  </a:ln>
+                  <a:solidFill>
+                    <a:schemeClr val="tx1"/>
+                  </a:solidFill>
+                  <a:effectLst/>
+                  <a:latin typeface="Times New Roman" pitchFamily="18" charset="0"/>
+                </a:endParaRPr>
+              </a:p>
+            </p:txBody>
+          </p:sp>
+          <p:pic>
+            <p:nvPicPr>
+              <p:cNvPr id="25" name="Picture 24">
+                <a:extLst>
+                  <a:ext uri="{FF2B5EF4-FFF2-40B4-BE49-F238E27FC236}">
+                    <a16:creationId xmlns:a16="http://schemas.microsoft.com/office/drawing/2014/main" id="{2B457F84-0D06-4BC8-8A15-63F1CF250330}"/>
+                  </a:ext>
+                </a:extLst>
+              </p:cNvPr>
+              <p:cNvPicPr>
+                <a:picLocks noChangeAspect="1"/>
+              </p:cNvPicPr>
+              <p:nvPr>
+                <p:custDataLst>
+                  <p:tags r:id="rId2"/>
+                </p:custDataLst>
+              </p:nvPr>
+            </p:nvPicPr>
+            <p:blipFill>
+              <a:blip r:embed="rId8" cstate="print">
+                <a:extLst>
+                  <a:ext uri="{28A0092B-C50C-407E-A947-70E740481C1C}">
+                    <a14:useLocalDpi xmlns:a14="http://schemas.microsoft.com/office/drawing/2010/main" val="0"/>
+                  </a:ext>
+                </a:extLst>
+              </a:blip>
+              <a:stretch>
+                <a:fillRect/>
+              </a:stretch>
+            </p:blipFill>
+            <p:spPr>
+              <a:xfrm>
+                <a:off x="5803179" y="3633919"/>
+                <a:ext cx="527930" cy="195805"/>
+              </a:xfrm>
+              <a:prstGeom prst="rect">
+                <a:avLst/>
+              </a:prstGeom>
+              <a:solidFill>
+                <a:schemeClr val="bg1"/>
+              </a:solidFill>
+            </p:spPr>
+          </p:pic>
+          <p:pic>
+            <p:nvPicPr>
+              <p:cNvPr id="26" name="Picture 25">
+                <a:extLst>
+                  <a:ext uri="{FF2B5EF4-FFF2-40B4-BE49-F238E27FC236}">
+                    <a16:creationId xmlns:a16="http://schemas.microsoft.com/office/drawing/2014/main" id="{2BCB02E4-6304-4589-B491-5C3919F1FCD3}"/>
+                  </a:ext>
+                </a:extLst>
+              </p:cNvPr>
+              <p:cNvPicPr>
+                <a:picLocks noChangeAspect="1"/>
+              </p:cNvPicPr>
+              <p:nvPr>
+                <p:custDataLst>
+                  <p:tags r:id="rId3"/>
+                </p:custDataLst>
+              </p:nvPr>
+            </p:nvPicPr>
+            <p:blipFill>
+              <a:blip r:embed="rId9" cstate="print">
+                <a:extLst>
+                  <a:ext uri="{28A0092B-C50C-407E-A947-70E740481C1C}">
+                    <a14:useLocalDpi xmlns:a14="http://schemas.microsoft.com/office/drawing/2010/main" val="0"/>
+                  </a:ext>
+                </a:extLst>
+              </a:blip>
+              <a:stretch>
+                <a:fillRect/>
+              </a:stretch>
+            </p:blipFill>
+            <p:spPr>
+              <a:xfrm>
+                <a:off x="5964622" y="4823098"/>
+                <a:ext cx="375499" cy="190848"/>
+              </a:xfrm>
+              <a:prstGeom prst="rect">
+                <a:avLst/>
+              </a:prstGeom>
+              <a:solidFill>
+                <a:schemeClr val="bg1"/>
+              </a:solidFill>
+            </p:spPr>
+          </p:pic>
+          <p:pic>
+            <p:nvPicPr>
+              <p:cNvPr id="27" name="Picture 26">
+                <a:extLst>
+                  <a:ext uri="{FF2B5EF4-FFF2-40B4-BE49-F238E27FC236}">
+                    <a16:creationId xmlns:a16="http://schemas.microsoft.com/office/drawing/2014/main" id="{D1FE2E43-5860-4279-B325-EFDBEAD3F880}"/>
+                  </a:ext>
+                </a:extLst>
+              </p:cNvPr>
+              <p:cNvPicPr>
+                <a:picLocks noChangeAspect="1"/>
+              </p:cNvPicPr>
+              <p:nvPr>
+                <p:custDataLst>
+                  <p:tags r:id="rId4"/>
+                </p:custDataLst>
+              </p:nvPr>
+            </p:nvPicPr>
+            <p:blipFill>
+              <a:blip r:embed="rId10" cstate="print">
+                <a:extLst>
+                  <a:ext uri="{28A0092B-C50C-407E-A947-70E740481C1C}">
+                    <a14:useLocalDpi xmlns:a14="http://schemas.microsoft.com/office/drawing/2010/main" val="0"/>
+                  </a:ext>
+                </a:extLst>
+              </a:blip>
+              <a:stretch>
+                <a:fillRect/>
+              </a:stretch>
+            </p:blipFill>
+            <p:spPr>
+              <a:xfrm>
+                <a:off x="5745458" y="5818325"/>
+                <a:ext cx="731170" cy="172259"/>
+              </a:xfrm>
+              <a:prstGeom prst="rect">
+                <a:avLst/>
+              </a:prstGeom>
+              <a:solidFill>
+                <a:schemeClr val="bg1"/>
+              </a:solidFill>
+            </p:spPr>
+          </p:pic>
+          <p:pic>
+            <p:nvPicPr>
+              <p:cNvPr id="28" name="Picture 27">
+                <a:extLst>
+                  <a:ext uri="{FF2B5EF4-FFF2-40B4-BE49-F238E27FC236}">
+                    <a16:creationId xmlns:a16="http://schemas.microsoft.com/office/drawing/2014/main" id="{5A7F0BAE-286C-4468-B21F-D271C8C22B08}"/>
+                  </a:ext>
+                </a:extLst>
+              </p:cNvPr>
+              <p:cNvPicPr>
+                <a:picLocks noChangeAspect="1"/>
+              </p:cNvPicPr>
+              <p:nvPr>
+                <p:custDataLst>
+                  <p:tags r:id="rId5"/>
+                </p:custDataLst>
+              </p:nvPr>
+            </p:nvPicPr>
+            <p:blipFill>
+              <a:blip r:embed="rId11" cstate="print">
+                <a:extLst>
+                  <a:ext uri="{28A0092B-C50C-407E-A947-70E740481C1C}">
+                    <a14:useLocalDpi xmlns:a14="http://schemas.microsoft.com/office/drawing/2010/main" val="0"/>
+                  </a:ext>
+                </a:extLst>
+              </a:blip>
+              <a:stretch>
+                <a:fillRect/>
+              </a:stretch>
+            </p:blipFill>
+            <p:spPr>
+              <a:xfrm>
+                <a:off x="5966984" y="6514505"/>
+                <a:ext cx="300450" cy="150225"/>
+              </a:xfrm>
+              <a:prstGeom prst="rect">
+                <a:avLst/>
+              </a:prstGeom>
+            </p:spPr>
+          </p:pic>
+        </p:grpSp>
+        <p:pic>
+          <p:nvPicPr>
+            <p:cNvPr id="30" name="Picture 29">
+              <a:extLst>
+                <a:ext uri="{FF2B5EF4-FFF2-40B4-BE49-F238E27FC236}">
+                  <a16:creationId xmlns:a16="http://schemas.microsoft.com/office/drawing/2014/main" id="{C4F91C69-2FF7-45D6-A4B0-AC4A8B450F6B}"/>
+                </a:ext>
+              </a:extLst>
+            </p:cNvPr>
+            <p:cNvPicPr>
+              <a:picLocks noChangeAspect="1"/>
+            </p:cNvPicPr>
+            <p:nvPr>
+              <p:custDataLst>
+                <p:tags r:id="rId1"/>
+              </p:custDataLst>
+            </p:nvPr>
+          </p:nvPicPr>
+          <p:blipFill>
+            <a:blip r:embed="rId12" cstate="print">
+              <a:extLst>
+                <a:ext uri="{28A0092B-C50C-407E-A947-70E740481C1C}">
+                  <a14:useLocalDpi xmlns:a14="http://schemas.microsoft.com/office/drawing/2010/main" val="0"/>
+                </a:ext>
+              </a:extLst>
+            </a:blip>
+            <a:stretch>
+              <a:fillRect/>
+            </a:stretch>
+          </p:blipFill>
+          <p:spPr>
+            <a:xfrm>
+              <a:off x="4797106" y="2892714"/>
+              <a:ext cx="1047186" cy="171020"/>
+            </a:xfrm>
+            <a:prstGeom prst="rect">
+              <a:avLst/>
+            </a:prstGeom>
+            <a:solidFill>
+              <a:schemeClr val="bg1"/>
+            </a:solidFill>
+          </p:spPr>
+        </p:pic>
+      </p:grpSp>
     </p:spTree>
     <p:extLst>
       <p:ext uri="{BB962C8B-B14F-4D97-AF65-F5344CB8AC3E}">
@@ -27187,6 +28450,101 @@
   <p:tag name="LATEXADDIN" val="\documentclass{article}&#10;\usepackage{amsmath}&#10;\usepackage{xcolor}&#10;\usepackage{ragged2e}&#10;\pagestyle{empty}&#10;\begin{document}&#10;&#10;\definecolor{Monred}{RGB}{172,0,0}&#10;&#10;&#10;Siphon Valve&#10;&#10;&#10;\end{document}"/>
   <p:tag name="IGUANATEXSIZE" val="20"/>
   <p:tag name="IGUANATEXCURSOR" val="172"/>
+  <p:tag name="TRANSPARENCY" val="True"/>
+  <p:tag name="FILENAME" val=""/>
+  <p:tag name="LATEXENGINEID" val="0"/>
+  <p:tag name="TEMPFOLDER" val="c:\temp\"/>
+  <p:tag name="LATEXFORMHEIGHT" val="312"/>
+  <p:tag name="LATEXFORMWIDTH" val="384"/>
+  <p:tag name="LATEXFORMWRAP" val="True"/>
+  <p:tag name="BITMAPVECTOR" val="0"/>
+</p:tagLst>
+</file>
+
+<file path=ppt/tags/tag5.xml><?xml version="1.0" encoding="utf-8"?>
+<p:tagLst xmlns:a="http://schemas.openxmlformats.org/drawingml/2006/main" xmlns:r="http://schemas.openxmlformats.org/officeDocument/2006/relationships" xmlns:p="http://schemas.openxmlformats.org/presentationml/2006/main">
+  <p:tag name="OUTPUTDPI" val="1200"/>
+  <p:tag name="ORIGINALHEIGHT" val="103.4871"/>
+  <p:tag name="ORIGINALWIDTH" val="633.6708"/>
+  <p:tag name="LATEXADDIN" val="\documentclass{article}&#10;\usepackage{amsmath}&#10;\usepackage{xcolor}&#10;\pagestyle{empty}&#10;\begin{document}&#10;&#10;\definecolor{Monred}{RGB}{172,0,0}&#10;&#10;$$H_{Manometer}$$&#10;&#10;&#10;\end{document}"/>
+  <p:tag name="IGUANATEXSIZE" val="20"/>
+  <p:tag name="IGUANATEXCURSOR" val="154"/>
+  <p:tag name="TRANSPARENCY" val="True"/>
+  <p:tag name="FILENAME" val=""/>
+  <p:tag name="LATEXENGINEID" val="0"/>
+  <p:tag name="TEMPFOLDER" val="c:\temp\"/>
+  <p:tag name="LATEXFORMHEIGHT" val="312"/>
+  <p:tag name="LATEXFORMWIDTH" val="384"/>
+  <p:tag name="LATEXFORMWRAP" val="True"/>
+  <p:tag name="BITMAPVECTOR" val="0"/>
+</p:tagLst>
+</file>
+
+<file path=ppt/tags/tag6.xml><?xml version="1.0" encoding="utf-8"?>
+<p:tagLst xmlns:a="http://schemas.openxmlformats.org/drawingml/2006/main" xmlns:r="http://schemas.openxmlformats.org/officeDocument/2006/relationships" xmlns:p="http://schemas.openxmlformats.org/presentationml/2006/main">
+  <p:tag name="OUTPUTDPI" val="1200"/>
+  <p:tag name="ORIGINALHEIGHT" val="118.4852"/>
+  <p:tag name="ORIGINALWIDTH" val="319.4601"/>
+  <p:tag name="LATEXADDIN" val="\documentclass{article}&#10;\usepackage{amsmath}&#10;\usepackage{xcolor}&#10;\pagestyle{empty}&#10;\begin{document}&#10;&#10;\definecolor{Monred}{RGB}{172,0,0}&#10;&#10;$$h_{l_{FiBw}}$$&#10;&#10;&#10;\end{document}"/>
+  <p:tag name="IGUANATEXSIZE" val="20"/>
+  <p:tag name="IGUANATEXCURSOR" val="153"/>
+  <p:tag name="TRANSPARENCY" val="True"/>
+  <p:tag name="FILENAME" val=""/>
+  <p:tag name="LATEXENGINEID" val="0"/>
+  <p:tag name="TEMPFOLDER" val="c:\temp\"/>
+  <p:tag name="LATEXFORMHEIGHT" val="312"/>
+  <p:tag name="LATEXFORMWIDTH" val="384"/>
+  <p:tag name="LATEXFORMWRAP" val="True"/>
+  <p:tag name="BITMAPVECTOR" val="0"/>
+</p:tagLst>
+</file>
+
+<file path=ppt/tags/tag7.xml><?xml version="1.0" encoding="utf-8"?>
+<p:tagLst xmlns:a="http://schemas.openxmlformats.org/drawingml/2006/main" xmlns:r="http://schemas.openxmlformats.org/officeDocument/2006/relationships" xmlns:p="http://schemas.openxmlformats.org/presentationml/2006/main">
+  <p:tag name="OUTPUTDPI" val="1200"/>
+  <p:tag name="ORIGINALHEIGHT" val="115.4856"/>
+  <p:tag name="ORIGINALWIDTH" val="227.2216"/>
+  <p:tag name="LATEXADDIN" val="\documentclass{article}&#10;\usepackage{amsmath}&#10;\usepackage{xcolor}&#10;\pagestyle{empty}&#10;\begin{document}&#10;&#10;\definecolor{Monred}{RGB}{172,0,0}&#10;&#10;$$H_{W_1}$$&#10;&#10;&#10;\end{document}"/>
+  <p:tag name="IGUANATEXSIZE" val="20"/>
+  <p:tag name="IGUANATEXCURSOR" val="148"/>
+  <p:tag name="TRANSPARENCY" val="True"/>
+  <p:tag name="FILENAME" val=""/>
+  <p:tag name="LATEXENGINEID" val="0"/>
+  <p:tag name="TEMPFOLDER" val="c:\temp\"/>
+  <p:tag name="LATEXFORMHEIGHT" val="312"/>
+  <p:tag name="LATEXFORMWIDTH" val="384"/>
+  <p:tag name="LATEXFORMWRAP" val="True"/>
+  <p:tag name="BITMAPVECTOR" val="0"/>
+</p:tagLst>
+</file>
+
+<file path=ppt/tags/tag8.xml><?xml version="1.0" encoding="utf-8"?>
+<p:tagLst xmlns:a="http://schemas.openxmlformats.org/drawingml/2006/main" xmlns:r="http://schemas.openxmlformats.org/officeDocument/2006/relationships" xmlns:p="http://schemas.openxmlformats.org/presentationml/2006/main">
+  <p:tag name="OUTPUTDPI" val="1200"/>
+  <p:tag name="ORIGINALHEIGHT" val="104.237"/>
+  <p:tag name="ORIGINALWIDTH" val="442.4447"/>
+  <p:tag name="LATEXADDIN" val="\documentclass{article}&#10;\usepackage{amsmath}&#10;\usepackage{xcolor}&#10;\pagestyle{empty}&#10;\begin{document}&#10;&#10;\definecolor{Monred}{RGB}{172,0,0}&#10;&#10;$$H_{FiSand}$$&#10;&#10;&#10;\end{document}"/>
+  <p:tag name="IGUANATEXSIZE" val="20"/>
+  <p:tag name="IGUANATEXCURSOR" val="151"/>
+  <p:tag name="TRANSPARENCY" val="True"/>
+  <p:tag name="FILENAME" val=""/>
+  <p:tag name="LATEXENGINEID" val="0"/>
+  <p:tag name="TEMPFOLDER" val="c:\temp\"/>
+  <p:tag name="LATEXFORMHEIGHT" val="312"/>
+  <p:tag name="LATEXFORMWIDTH" val="384"/>
+  <p:tag name="LATEXFORMWRAP" val="True"/>
+  <p:tag name="BITMAPVECTOR" val="0"/>
+</p:tagLst>
+</file>
+
+<file path=ppt/tags/tag9.xml><?xml version="1.0" encoding="utf-8"?>
+<p:tagLst xmlns:a="http://schemas.openxmlformats.org/drawingml/2006/main" xmlns:r="http://schemas.openxmlformats.org/officeDocument/2006/relationships" xmlns:p="http://schemas.openxmlformats.org/presentationml/2006/main">
+  <p:tag name="OUTPUTDPI" val="1200"/>
+  <p:tag name="ORIGINALHEIGHT" val="114.7357"/>
+  <p:tag name="ORIGINALWIDTH" val="229.4713"/>
+  <p:tag name="LATEXADDIN" val="\documentclass{article}&#10;\usepackage{amsmath}&#10;\usepackage{xcolor}&#10;\pagestyle{empty}&#10;\begin{document}&#10;&#10;\definecolor{Monred}{RGB}{172,0,0}&#10;&#10;$$H_{W_2}$$&#10;&#10;&#10;\end{document}"/>
+  <p:tag name="IGUANATEXSIZE" val="20"/>
+  <p:tag name="IGUANATEXCURSOR" val="148"/>
   <p:tag name="TRANSPARENCY" val="True"/>
   <p:tag name="FILENAME" val=""/>
   <p:tag name="LATEXENGINEID" val="0"/>

</xml_diff>

<commit_message>
just a commit to commit
</commit_message>
<xml_diff>
--- a/ClareDiagrams.pptx
+++ b/ClareDiagrams.pptx
@@ -11,6 +11,16 @@
     <p:sldId id="259" r:id="rId5"/>
     <p:sldId id="260" r:id="rId6"/>
     <p:sldId id="261" r:id="rId7"/>
+    <p:sldId id="262" r:id="rId8"/>
+    <p:sldId id="263" r:id="rId9"/>
+    <p:sldId id="264" r:id="rId10"/>
+    <p:sldId id="265" r:id="rId11"/>
+    <p:sldId id="266" r:id="rId12"/>
+    <p:sldId id="267" r:id="rId13"/>
+    <p:sldId id="268" r:id="rId14"/>
+    <p:sldId id="269" r:id="rId15"/>
+    <p:sldId id="270" r:id="rId16"/>
+    <p:sldId id="271" r:id="rId17"/>
   </p:sldIdLst>
   <p:sldSz cx="12192000" cy="6858000"/>
   <p:notesSz cx="6858000" cy="9144000"/>
@@ -264,7 +274,7 @@
           <a:p>
             <a:fld id="{3721CA93-E140-4E2A-A30C-04BF0C6AAEA4}" type="datetimeFigureOut">
               <a:rPr lang="en-US" smtClean="0"/>
-              <a:t>7/24/2018</a:t>
+              <a:t>7/31/2018</a:t>
             </a:fld>
             <a:endParaRPr lang="en-US"/>
           </a:p>
@@ -462,7 +472,7 @@
           <a:p>
             <a:fld id="{3721CA93-E140-4E2A-A30C-04BF0C6AAEA4}" type="datetimeFigureOut">
               <a:rPr lang="en-US" smtClean="0"/>
-              <a:t>7/24/2018</a:t>
+              <a:t>7/31/2018</a:t>
             </a:fld>
             <a:endParaRPr lang="en-US"/>
           </a:p>
@@ -670,7 +680,7 @@
           <a:p>
             <a:fld id="{3721CA93-E140-4E2A-A30C-04BF0C6AAEA4}" type="datetimeFigureOut">
               <a:rPr lang="en-US" smtClean="0"/>
-              <a:t>7/24/2018</a:t>
+              <a:t>7/31/2018</a:t>
             </a:fld>
             <a:endParaRPr lang="en-US"/>
           </a:p>
@@ -868,7 +878,7 @@
           <a:p>
             <a:fld id="{3721CA93-E140-4E2A-A30C-04BF0C6AAEA4}" type="datetimeFigureOut">
               <a:rPr lang="en-US" smtClean="0"/>
-              <a:t>7/24/2018</a:t>
+              <a:t>7/31/2018</a:t>
             </a:fld>
             <a:endParaRPr lang="en-US"/>
           </a:p>
@@ -1143,7 +1153,7 @@
           <a:p>
             <a:fld id="{3721CA93-E140-4E2A-A30C-04BF0C6AAEA4}" type="datetimeFigureOut">
               <a:rPr lang="en-US" smtClean="0"/>
-              <a:t>7/24/2018</a:t>
+              <a:t>7/31/2018</a:t>
             </a:fld>
             <a:endParaRPr lang="en-US"/>
           </a:p>
@@ -1408,7 +1418,7 @@
           <a:p>
             <a:fld id="{3721CA93-E140-4E2A-A30C-04BF0C6AAEA4}" type="datetimeFigureOut">
               <a:rPr lang="en-US" smtClean="0"/>
-              <a:t>7/24/2018</a:t>
+              <a:t>7/31/2018</a:t>
             </a:fld>
             <a:endParaRPr lang="en-US"/>
           </a:p>
@@ -1820,7 +1830,7 @@
           <a:p>
             <a:fld id="{3721CA93-E140-4E2A-A30C-04BF0C6AAEA4}" type="datetimeFigureOut">
               <a:rPr lang="en-US" smtClean="0"/>
-              <a:t>7/24/2018</a:t>
+              <a:t>7/31/2018</a:t>
             </a:fld>
             <a:endParaRPr lang="en-US"/>
           </a:p>
@@ -1961,7 +1971,7 @@
           <a:p>
             <a:fld id="{3721CA93-E140-4E2A-A30C-04BF0C6AAEA4}" type="datetimeFigureOut">
               <a:rPr lang="en-US" smtClean="0"/>
-              <a:t>7/24/2018</a:t>
+              <a:t>7/31/2018</a:t>
             </a:fld>
             <a:endParaRPr lang="en-US"/>
           </a:p>
@@ -2074,7 +2084,7 @@
           <a:p>
             <a:fld id="{3721CA93-E140-4E2A-A30C-04BF0C6AAEA4}" type="datetimeFigureOut">
               <a:rPr lang="en-US" smtClean="0"/>
-              <a:t>7/24/2018</a:t>
+              <a:t>7/31/2018</a:t>
             </a:fld>
             <a:endParaRPr lang="en-US"/>
           </a:p>
@@ -2385,7 +2395,7 @@
           <a:p>
             <a:fld id="{3721CA93-E140-4E2A-A30C-04BF0C6AAEA4}" type="datetimeFigureOut">
               <a:rPr lang="en-US" smtClean="0"/>
-              <a:t>7/24/2018</a:t>
+              <a:t>7/31/2018</a:t>
             </a:fld>
             <a:endParaRPr lang="en-US"/>
           </a:p>
@@ -2673,7 +2683,7 @@
           <a:p>
             <a:fld id="{3721CA93-E140-4E2A-A30C-04BF0C6AAEA4}" type="datetimeFigureOut">
               <a:rPr lang="en-US" smtClean="0"/>
-              <a:t>7/24/2018</a:t>
+              <a:t>7/31/2018</a:t>
             </a:fld>
             <a:endParaRPr lang="en-US"/>
           </a:p>
@@ -2914,7 +2924,7 @@
           <a:p>
             <a:fld id="{3721CA93-E140-4E2A-A30C-04BF0C6AAEA4}" type="datetimeFigureOut">
               <a:rPr lang="en-US" smtClean="0"/>
-              <a:t>7/24/2018</a:t>
+              <a:t>7/31/2018</a:t>
             </a:fld>
             <a:endParaRPr lang="en-US"/>
           </a:p>
@@ -10677,6 +10687,566 @@
     <p:extLst>
       <p:ext uri="{BB962C8B-B14F-4D97-AF65-F5344CB8AC3E}">
         <p14:creationId xmlns:p14="http://schemas.microsoft.com/office/powerpoint/2010/main" val="2180411738"/>
+      </p:ext>
+    </p:extLst>
+  </p:cSld>
+  <p:clrMapOvr>
+    <a:masterClrMapping/>
+  </p:clrMapOvr>
+</p:sld>
+</file>
+
+<file path=ppt/slides/slide10.xml><?xml version="1.0" encoding="utf-8"?>
+<p:sld xmlns:a="http://schemas.openxmlformats.org/drawingml/2006/main" xmlns:r="http://schemas.openxmlformats.org/officeDocument/2006/relationships" xmlns:p="http://schemas.openxmlformats.org/presentationml/2006/main">
+  <p:cSld>
+    <p:spTree>
+      <p:nvGrpSpPr>
+        <p:cNvPr id="1" name=""/>
+        <p:cNvGrpSpPr/>
+        <p:nvPr/>
+      </p:nvGrpSpPr>
+      <p:grpSpPr>
+        <a:xfrm>
+          <a:off x="0" y="0"/>
+          <a:ext cx="0" cy="0"/>
+          <a:chOff x="0" y="0"/>
+          <a:chExt cx="0" cy="0"/>
+        </a:xfrm>
+      </p:grpSpPr>
+      <p:sp>
+        <p:nvSpPr>
+          <p:cNvPr id="2" name="Title 1">
+            <a:extLst>
+              <a:ext uri="{FF2B5EF4-FFF2-40B4-BE49-F238E27FC236}">
+                <a16:creationId xmlns:a16="http://schemas.microsoft.com/office/drawing/2014/main" id="{A785B32D-6303-4DF1-B389-1A9E38E62C1D}"/>
+              </a:ext>
+            </a:extLst>
+          </p:cNvPr>
+          <p:cNvSpPr>
+            <a:spLocks noGrp="1"/>
+          </p:cNvSpPr>
+          <p:nvPr>
+            <p:ph type="title"/>
+          </p:nvPr>
+        </p:nvSpPr>
+        <p:spPr/>
+        <p:txBody>
+          <a:bodyPr/>
+          <a:lstStyle/>
+          <a:p>
+            <a:endParaRPr lang="en-US"/>
+          </a:p>
+        </p:txBody>
+      </p:sp>
+      <p:sp>
+        <p:nvSpPr>
+          <p:cNvPr id="3" name="Content Placeholder 2">
+            <a:extLst>
+              <a:ext uri="{FF2B5EF4-FFF2-40B4-BE49-F238E27FC236}">
+                <a16:creationId xmlns:a16="http://schemas.microsoft.com/office/drawing/2014/main" id="{08B6CC0E-1631-41B6-9DA8-12A503DD15B6}"/>
+              </a:ext>
+            </a:extLst>
+          </p:cNvPr>
+          <p:cNvSpPr>
+            <a:spLocks noGrp="1"/>
+          </p:cNvSpPr>
+          <p:nvPr>
+            <p:ph idx="1"/>
+          </p:nvPr>
+        </p:nvSpPr>
+        <p:spPr/>
+        <p:txBody>
+          <a:bodyPr/>
+          <a:lstStyle/>
+          <a:p>
+            <a:endParaRPr lang="en-US"/>
+          </a:p>
+        </p:txBody>
+      </p:sp>
+    </p:spTree>
+    <p:extLst>
+      <p:ext uri="{BB962C8B-B14F-4D97-AF65-F5344CB8AC3E}">
+        <p14:creationId xmlns:p14="http://schemas.microsoft.com/office/powerpoint/2010/main" val="393174569"/>
+      </p:ext>
+    </p:extLst>
+  </p:cSld>
+  <p:clrMapOvr>
+    <a:masterClrMapping/>
+  </p:clrMapOvr>
+</p:sld>
+</file>
+
+<file path=ppt/slides/slide11.xml><?xml version="1.0" encoding="utf-8"?>
+<p:sld xmlns:a="http://schemas.openxmlformats.org/drawingml/2006/main" xmlns:r="http://schemas.openxmlformats.org/officeDocument/2006/relationships" xmlns:p="http://schemas.openxmlformats.org/presentationml/2006/main">
+  <p:cSld>
+    <p:spTree>
+      <p:nvGrpSpPr>
+        <p:cNvPr id="1" name=""/>
+        <p:cNvGrpSpPr/>
+        <p:nvPr/>
+      </p:nvGrpSpPr>
+      <p:grpSpPr>
+        <a:xfrm>
+          <a:off x="0" y="0"/>
+          <a:ext cx="0" cy="0"/>
+          <a:chOff x="0" y="0"/>
+          <a:chExt cx="0" cy="0"/>
+        </a:xfrm>
+      </p:grpSpPr>
+      <p:sp>
+        <p:nvSpPr>
+          <p:cNvPr id="2" name="Title 1">
+            <a:extLst>
+              <a:ext uri="{FF2B5EF4-FFF2-40B4-BE49-F238E27FC236}">
+                <a16:creationId xmlns:a16="http://schemas.microsoft.com/office/drawing/2014/main" id="{959ACE67-159D-48E0-8FBC-FA522F3571E1}"/>
+              </a:ext>
+            </a:extLst>
+          </p:cNvPr>
+          <p:cNvSpPr>
+            <a:spLocks noGrp="1"/>
+          </p:cNvSpPr>
+          <p:nvPr>
+            <p:ph type="title"/>
+          </p:nvPr>
+        </p:nvSpPr>
+        <p:spPr/>
+        <p:txBody>
+          <a:bodyPr/>
+          <a:lstStyle/>
+          <a:p>
+            <a:endParaRPr lang="en-US"/>
+          </a:p>
+        </p:txBody>
+      </p:sp>
+      <p:sp>
+        <p:nvSpPr>
+          <p:cNvPr id="3" name="Content Placeholder 2">
+            <a:extLst>
+              <a:ext uri="{FF2B5EF4-FFF2-40B4-BE49-F238E27FC236}">
+                <a16:creationId xmlns:a16="http://schemas.microsoft.com/office/drawing/2014/main" id="{6E5507AE-7525-439C-B79D-61171418EE60}"/>
+              </a:ext>
+            </a:extLst>
+          </p:cNvPr>
+          <p:cNvSpPr>
+            <a:spLocks noGrp="1"/>
+          </p:cNvSpPr>
+          <p:nvPr>
+            <p:ph idx="1"/>
+          </p:nvPr>
+        </p:nvSpPr>
+        <p:spPr/>
+        <p:txBody>
+          <a:bodyPr/>
+          <a:lstStyle/>
+          <a:p>
+            <a:endParaRPr lang="en-US"/>
+          </a:p>
+        </p:txBody>
+      </p:sp>
+    </p:spTree>
+    <p:extLst>
+      <p:ext uri="{BB962C8B-B14F-4D97-AF65-F5344CB8AC3E}">
+        <p14:creationId xmlns:p14="http://schemas.microsoft.com/office/powerpoint/2010/main" val="1893194331"/>
+      </p:ext>
+    </p:extLst>
+  </p:cSld>
+  <p:clrMapOvr>
+    <a:masterClrMapping/>
+  </p:clrMapOvr>
+</p:sld>
+</file>
+
+<file path=ppt/slides/slide12.xml><?xml version="1.0" encoding="utf-8"?>
+<p:sld xmlns:a="http://schemas.openxmlformats.org/drawingml/2006/main" xmlns:r="http://schemas.openxmlformats.org/officeDocument/2006/relationships" xmlns:p="http://schemas.openxmlformats.org/presentationml/2006/main">
+  <p:cSld>
+    <p:spTree>
+      <p:nvGrpSpPr>
+        <p:cNvPr id="1" name=""/>
+        <p:cNvGrpSpPr/>
+        <p:nvPr/>
+      </p:nvGrpSpPr>
+      <p:grpSpPr>
+        <a:xfrm>
+          <a:off x="0" y="0"/>
+          <a:ext cx="0" cy="0"/>
+          <a:chOff x="0" y="0"/>
+          <a:chExt cx="0" cy="0"/>
+        </a:xfrm>
+      </p:grpSpPr>
+      <p:sp>
+        <p:nvSpPr>
+          <p:cNvPr id="2" name="Title 1">
+            <a:extLst>
+              <a:ext uri="{FF2B5EF4-FFF2-40B4-BE49-F238E27FC236}">
+                <a16:creationId xmlns:a16="http://schemas.microsoft.com/office/drawing/2014/main" id="{3C2B3C3F-9994-4698-A0F8-0FB7298024B4}"/>
+              </a:ext>
+            </a:extLst>
+          </p:cNvPr>
+          <p:cNvSpPr>
+            <a:spLocks noGrp="1"/>
+          </p:cNvSpPr>
+          <p:nvPr>
+            <p:ph type="title"/>
+          </p:nvPr>
+        </p:nvSpPr>
+        <p:spPr/>
+        <p:txBody>
+          <a:bodyPr/>
+          <a:lstStyle/>
+          <a:p>
+            <a:endParaRPr lang="en-US"/>
+          </a:p>
+        </p:txBody>
+      </p:sp>
+      <p:sp>
+        <p:nvSpPr>
+          <p:cNvPr id="3" name="Content Placeholder 2">
+            <a:extLst>
+              <a:ext uri="{FF2B5EF4-FFF2-40B4-BE49-F238E27FC236}">
+                <a16:creationId xmlns:a16="http://schemas.microsoft.com/office/drawing/2014/main" id="{4543A4B2-24B2-4B5A-B28F-DFEC6F7157C9}"/>
+              </a:ext>
+            </a:extLst>
+          </p:cNvPr>
+          <p:cNvSpPr>
+            <a:spLocks noGrp="1"/>
+          </p:cNvSpPr>
+          <p:nvPr>
+            <p:ph idx="1"/>
+          </p:nvPr>
+        </p:nvSpPr>
+        <p:spPr/>
+        <p:txBody>
+          <a:bodyPr/>
+          <a:lstStyle/>
+          <a:p>
+            <a:endParaRPr lang="en-US"/>
+          </a:p>
+        </p:txBody>
+      </p:sp>
+    </p:spTree>
+    <p:extLst>
+      <p:ext uri="{BB962C8B-B14F-4D97-AF65-F5344CB8AC3E}">
+        <p14:creationId xmlns:p14="http://schemas.microsoft.com/office/powerpoint/2010/main" val="4219892731"/>
+      </p:ext>
+    </p:extLst>
+  </p:cSld>
+  <p:clrMapOvr>
+    <a:masterClrMapping/>
+  </p:clrMapOvr>
+</p:sld>
+</file>
+
+<file path=ppt/slides/slide13.xml><?xml version="1.0" encoding="utf-8"?>
+<p:sld xmlns:a="http://schemas.openxmlformats.org/drawingml/2006/main" xmlns:r="http://schemas.openxmlformats.org/officeDocument/2006/relationships" xmlns:p="http://schemas.openxmlformats.org/presentationml/2006/main">
+  <p:cSld>
+    <p:spTree>
+      <p:nvGrpSpPr>
+        <p:cNvPr id="1" name=""/>
+        <p:cNvGrpSpPr/>
+        <p:nvPr/>
+      </p:nvGrpSpPr>
+      <p:grpSpPr>
+        <a:xfrm>
+          <a:off x="0" y="0"/>
+          <a:ext cx="0" cy="0"/>
+          <a:chOff x="0" y="0"/>
+          <a:chExt cx="0" cy="0"/>
+        </a:xfrm>
+      </p:grpSpPr>
+      <p:sp>
+        <p:nvSpPr>
+          <p:cNvPr id="2" name="Title 1">
+            <a:extLst>
+              <a:ext uri="{FF2B5EF4-FFF2-40B4-BE49-F238E27FC236}">
+                <a16:creationId xmlns:a16="http://schemas.microsoft.com/office/drawing/2014/main" id="{BD5BB5E1-9A9A-43B3-B5C3-F9D77A9B941B}"/>
+              </a:ext>
+            </a:extLst>
+          </p:cNvPr>
+          <p:cNvSpPr>
+            <a:spLocks noGrp="1"/>
+          </p:cNvSpPr>
+          <p:nvPr>
+            <p:ph type="title"/>
+          </p:nvPr>
+        </p:nvSpPr>
+        <p:spPr/>
+        <p:txBody>
+          <a:bodyPr/>
+          <a:lstStyle/>
+          <a:p>
+            <a:endParaRPr lang="en-US"/>
+          </a:p>
+        </p:txBody>
+      </p:sp>
+      <p:sp>
+        <p:nvSpPr>
+          <p:cNvPr id="3" name="Content Placeholder 2">
+            <a:extLst>
+              <a:ext uri="{FF2B5EF4-FFF2-40B4-BE49-F238E27FC236}">
+                <a16:creationId xmlns:a16="http://schemas.microsoft.com/office/drawing/2014/main" id="{33EB1C9F-7A9D-4433-9BB1-E52F3F542BC2}"/>
+              </a:ext>
+            </a:extLst>
+          </p:cNvPr>
+          <p:cNvSpPr>
+            <a:spLocks noGrp="1"/>
+          </p:cNvSpPr>
+          <p:nvPr>
+            <p:ph idx="1"/>
+          </p:nvPr>
+        </p:nvSpPr>
+        <p:spPr/>
+        <p:txBody>
+          <a:bodyPr/>
+          <a:lstStyle/>
+          <a:p>
+            <a:endParaRPr lang="en-US"/>
+          </a:p>
+        </p:txBody>
+      </p:sp>
+    </p:spTree>
+    <p:extLst>
+      <p:ext uri="{BB962C8B-B14F-4D97-AF65-F5344CB8AC3E}">
+        <p14:creationId xmlns:p14="http://schemas.microsoft.com/office/powerpoint/2010/main" val="2192616699"/>
+      </p:ext>
+    </p:extLst>
+  </p:cSld>
+  <p:clrMapOvr>
+    <a:masterClrMapping/>
+  </p:clrMapOvr>
+</p:sld>
+</file>
+
+<file path=ppt/slides/slide14.xml><?xml version="1.0" encoding="utf-8"?>
+<p:sld xmlns:a="http://schemas.openxmlformats.org/drawingml/2006/main" xmlns:r="http://schemas.openxmlformats.org/officeDocument/2006/relationships" xmlns:p="http://schemas.openxmlformats.org/presentationml/2006/main">
+  <p:cSld>
+    <p:spTree>
+      <p:nvGrpSpPr>
+        <p:cNvPr id="1" name=""/>
+        <p:cNvGrpSpPr/>
+        <p:nvPr/>
+      </p:nvGrpSpPr>
+      <p:grpSpPr>
+        <a:xfrm>
+          <a:off x="0" y="0"/>
+          <a:ext cx="0" cy="0"/>
+          <a:chOff x="0" y="0"/>
+          <a:chExt cx="0" cy="0"/>
+        </a:xfrm>
+      </p:grpSpPr>
+      <p:sp>
+        <p:nvSpPr>
+          <p:cNvPr id="2" name="Title 1">
+            <a:extLst>
+              <a:ext uri="{FF2B5EF4-FFF2-40B4-BE49-F238E27FC236}">
+                <a16:creationId xmlns:a16="http://schemas.microsoft.com/office/drawing/2014/main" id="{85E3CD81-ECFD-44F7-BCAB-904C93F8174B}"/>
+              </a:ext>
+            </a:extLst>
+          </p:cNvPr>
+          <p:cNvSpPr>
+            <a:spLocks noGrp="1"/>
+          </p:cNvSpPr>
+          <p:nvPr>
+            <p:ph type="title"/>
+          </p:nvPr>
+        </p:nvSpPr>
+        <p:spPr/>
+        <p:txBody>
+          <a:bodyPr/>
+          <a:lstStyle/>
+          <a:p>
+            <a:endParaRPr lang="en-US"/>
+          </a:p>
+        </p:txBody>
+      </p:sp>
+      <p:sp>
+        <p:nvSpPr>
+          <p:cNvPr id="3" name="Content Placeholder 2">
+            <a:extLst>
+              <a:ext uri="{FF2B5EF4-FFF2-40B4-BE49-F238E27FC236}">
+                <a16:creationId xmlns:a16="http://schemas.microsoft.com/office/drawing/2014/main" id="{C88DF3AD-E8BE-4E5F-B58E-C6994DE1AB69}"/>
+              </a:ext>
+            </a:extLst>
+          </p:cNvPr>
+          <p:cNvSpPr>
+            <a:spLocks noGrp="1"/>
+          </p:cNvSpPr>
+          <p:nvPr>
+            <p:ph idx="1"/>
+          </p:nvPr>
+        </p:nvSpPr>
+        <p:spPr/>
+        <p:txBody>
+          <a:bodyPr/>
+          <a:lstStyle/>
+          <a:p>
+            <a:endParaRPr lang="en-US"/>
+          </a:p>
+        </p:txBody>
+      </p:sp>
+    </p:spTree>
+    <p:extLst>
+      <p:ext uri="{BB962C8B-B14F-4D97-AF65-F5344CB8AC3E}">
+        <p14:creationId xmlns:p14="http://schemas.microsoft.com/office/powerpoint/2010/main" val="1393278675"/>
+      </p:ext>
+    </p:extLst>
+  </p:cSld>
+  <p:clrMapOvr>
+    <a:masterClrMapping/>
+  </p:clrMapOvr>
+</p:sld>
+</file>
+
+<file path=ppt/slides/slide15.xml><?xml version="1.0" encoding="utf-8"?>
+<p:sld xmlns:a="http://schemas.openxmlformats.org/drawingml/2006/main" xmlns:r="http://schemas.openxmlformats.org/officeDocument/2006/relationships" xmlns:p="http://schemas.openxmlformats.org/presentationml/2006/main">
+  <p:cSld>
+    <p:spTree>
+      <p:nvGrpSpPr>
+        <p:cNvPr id="1" name=""/>
+        <p:cNvGrpSpPr/>
+        <p:nvPr/>
+      </p:nvGrpSpPr>
+      <p:grpSpPr>
+        <a:xfrm>
+          <a:off x="0" y="0"/>
+          <a:ext cx="0" cy="0"/>
+          <a:chOff x="0" y="0"/>
+          <a:chExt cx="0" cy="0"/>
+        </a:xfrm>
+      </p:grpSpPr>
+      <p:sp>
+        <p:nvSpPr>
+          <p:cNvPr id="2" name="Title 1">
+            <a:extLst>
+              <a:ext uri="{FF2B5EF4-FFF2-40B4-BE49-F238E27FC236}">
+                <a16:creationId xmlns:a16="http://schemas.microsoft.com/office/drawing/2014/main" id="{B53ACEA0-6109-4D7E-85C1-591058E46D0E}"/>
+              </a:ext>
+            </a:extLst>
+          </p:cNvPr>
+          <p:cNvSpPr>
+            <a:spLocks noGrp="1"/>
+          </p:cNvSpPr>
+          <p:nvPr>
+            <p:ph type="title"/>
+          </p:nvPr>
+        </p:nvSpPr>
+        <p:spPr/>
+        <p:txBody>
+          <a:bodyPr/>
+          <a:lstStyle/>
+          <a:p>
+            <a:endParaRPr lang="en-US"/>
+          </a:p>
+        </p:txBody>
+      </p:sp>
+      <p:sp>
+        <p:nvSpPr>
+          <p:cNvPr id="3" name="Content Placeholder 2">
+            <a:extLst>
+              <a:ext uri="{FF2B5EF4-FFF2-40B4-BE49-F238E27FC236}">
+                <a16:creationId xmlns:a16="http://schemas.microsoft.com/office/drawing/2014/main" id="{0B116EDE-9029-45B7-809A-6EB6D8E807A7}"/>
+              </a:ext>
+            </a:extLst>
+          </p:cNvPr>
+          <p:cNvSpPr>
+            <a:spLocks noGrp="1"/>
+          </p:cNvSpPr>
+          <p:nvPr>
+            <p:ph idx="1"/>
+          </p:nvPr>
+        </p:nvSpPr>
+        <p:spPr/>
+        <p:txBody>
+          <a:bodyPr/>
+          <a:lstStyle/>
+          <a:p>
+            <a:endParaRPr lang="en-US"/>
+          </a:p>
+        </p:txBody>
+      </p:sp>
+    </p:spTree>
+    <p:extLst>
+      <p:ext uri="{BB962C8B-B14F-4D97-AF65-F5344CB8AC3E}">
+        <p14:creationId xmlns:p14="http://schemas.microsoft.com/office/powerpoint/2010/main" val="104149308"/>
+      </p:ext>
+    </p:extLst>
+  </p:cSld>
+  <p:clrMapOvr>
+    <a:masterClrMapping/>
+  </p:clrMapOvr>
+</p:sld>
+</file>
+
+<file path=ppt/slides/slide16.xml><?xml version="1.0" encoding="utf-8"?>
+<p:sld xmlns:a="http://schemas.openxmlformats.org/drawingml/2006/main" xmlns:r="http://schemas.openxmlformats.org/officeDocument/2006/relationships" xmlns:p="http://schemas.openxmlformats.org/presentationml/2006/main">
+  <p:cSld>
+    <p:spTree>
+      <p:nvGrpSpPr>
+        <p:cNvPr id="1" name=""/>
+        <p:cNvGrpSpPr/>
+        <p:nvPr/>
+      </p:nvGrpSpPr>
+      <p:grpSpPr>
+        <a:xfrm>
+          <a:off x="0" y="0"/>
+          <a:ext cx="0" cy="0"/>
+          <a:chOff x="0" y="0"/>
+          <a:chExt cx="0" cy="0"/>
+        </a:xfrm>
+      </p:grpSpPr>
+      <p:sp>
+        <p:nvSpPr>
+          <p:cNvPr id="2" name="Title 1">
+            <a:extLst>
+              <a:ext uri="{FF2B5EF4-FFF2-40B4-BE49-F238E27FC236}">
+                <a16:creationId xmlns:a16="http://schemas.microsoft.com/office/drawing/2014/main" id="{83B97F31-E516-48E7-9573-0D656F84C04B}"/>
+              </a:ext>
+            </a:extLst>
+          </p:cNvPr>
+          <p:cNvSpPr>
+            <a:spLocks noGrp="1"/>
+          </p:cNvSpPr>
+          <p:nvPr>
+            <p:ph type="title"/>
+          </p:nvPr>
+        </p:nvSpPr>
+        <p:spPr/>
+        <p:txBody>
+          <a:bodyPr/>
+          <a:lstStyle/>
+          <a:p>
+            <a:endParaRPr lang="en-US"/>
+          </a:p>
+        </p:txBody>
+      </p:sp>
+      <p:sp>
+        <p:nvSpPr>
+          <p:cNvPr id="3" name="Content Placeholder 2">
+            <a:extLst>
+              <a:ext uri="{FF2B5EF4-FFF2-40B4-BE49-F238E27FC236}">
+                <a16:creationId xmlns:a16="http://schemas.microsoft.com/office/drawing/2014/main" id="{7216C2E0-4BA2-4168-8828-26564AFF2CF2}"/>
+              </a:ext>
+            </a:extLst>
+          </p:cNvPr>
+          <p:cNvSpPr>
+            <a:spLocks noGrp="1"/>
+          </p:cNvSpPr>
+          <p:nvPr>
+            <p:ph idx="1"/>
+          </p:nvPr>
+        </p:nvSpPr>
+        <p:spPr/>
+        <p:txBody>
+          <a:bodyPr/>
+          <a:lstStyle/>
+          <a:p>
+            <a:endParaRPr lang="en-US"/>
+          </a:p>
+        </p:txBody>
+      </p:sp>
+    </p:spTree>
+    <p:extLst>
+      <p:ext uri="{BB962C8B-B14F-4D97-AF65-F5344CB8AC3E}">
+        <p14:creationId xmlns:p14="http://schemas.microsoft.com/office/powerpoint/2010/main" val="3895706036"/>
       </p:ext>
     </p:extLst>
   </p:cSld>
@@ -30725,6 +31295,243 @@
 </p:sld>
 </file>
 
+<file path=ppt/slides/slide7.xml><?xml version="1.0" encoding="utf-8"?>
+<p:sld xmlns:a="http://schemas.openxmlformats.org/drawingml/2006/main" xmlns:r="http://schemas.openxmlformats.org/officeDocument/2006/relationships" xmlns:p="http://schemas.openxmlformats.org/presentationml/2006/main">
+  <p:cSld>
+    <p:spTree>
+      <p:nvGrpSpPr>
+        <p:cNvPr id="1" name=""/>
+        <p:cNvGrpSpPr/>
+        <p:nvPr/>
+      </p:nvGrpSpPr>
+      <p:grpSpPr>
+        <a:xfrm>
+          <a:off x="0" y="0"/>
+          <a:ext cx="0" cy="0"/>
+          <a:chOff x="0" y="0"/>
+          <a:chExt cx="0" cy="0"/>
+        </a:xfrm>
+      </p:grpSpPr>
+      <p:pic>
+        <p:nvPicPr>
+          <p:cNvPr id="4" name="Picture 4" descr="https://lh3.googleusercontent.com/-SwKTR4wtLAE/Vf85SdsNBpI/AAAAAAAFlG8/9o04NldSOws/s912-Ic42/DSC05824.JPG">
+            <a:extLst>
+              <a:ext uri="{FF2B5EF4-FFF2-40B4-BE49-F238E27FC236}">
+                <a16:creationId xmlns:a16="http://schemas.microsoft.com/office/drawing/2014/main" id="{AF03D583-C670-4992-8CF9-62916F9546CD}"/>
+              </a:ext>
+            </a:extLst>
+          </p:cNvPr>
+          <p:cNvPicPr>
+            <a:picLocks noChangeAspect="1" noChangeArrowheads="1"/>
+          </p:cNvPicPr>
+          <p:nvPr/>
+        </p:nvPicPr>
+        <p:blipFill>
+          <a:blip r:embed="rId2">
+            <a:extLst>
+              <a:ext uri="{28A0092B-C50C-407E-A947-70E740481C1C}">
+                <a14:useLocalDpi xmlns:a14="http://schemas.microsoft.com/office/drawing/2010/main" val="0"/>
+              </a:ext>
+            </a:extLst>
+          </a:blip>
+          <a:srcRect/>
+          <a:stretch>
+            <a:fillRect/>
+          </a:stretch>
+        </p:blipFill>
+        <p:spPr bwMode="auto">
+          <a:xfrm>
+            <a:off x="2840010" y="388862"/>
+            <a:ext cx="8107032" cy="6080275"/>
+          </a:xfrm>
+          <a:prstGeom prst="rect">
+            <a:avLst/>
+          </a:prstGeom>
+          <a:noFill/>
+          <a:extLst>
+            <a:ext uri="{909E8E84-426E-40DD-AFC4-6F175D3DCCD1}">
+              <a14:hiddenFill xmlns:a14="http://schemas.microsoft.com/office/drawing/2010/main">
+                <a:solidFill>
+                  <a:srgbClr val="FFFFFF"/>
+                </a:solidFill>
+              </a14:hiddenFill>
+            </a:ext>
+          </a:extLst>
+        </p:spPr>
+      </p:pic>
+    </p:spTree>
+    <p:extLst>
+      <p:ext uri="{BB962C8B-B14F-4D97-AF65-F5344CB8AC3E}">
+        <p14:creationId xmlns:p14="http://schemas.microsoft.com/office/powerpoint/2010/main" val="1678146579"/>
+      </p:ext>
+    </p:extLst>
+  </p:cSld>
+  <p:clrMapOvr>
+    <a:masterClrMapping/>
+  </p:clrMapOvr>
+</p:sld>
+</file>
+
+<file path=ppt/slides/slide8.xml><?xml version="1.0" encoding="utf-8"?>
+<p:sld xmlns:a="http://schemas.openxmlformats.org/drawingml/2006/main" xmlns:r="http://schemas.openxmlformats.org/officeDocument/2006/relationships" xmlns:p="http://schemas.openxmlformats.org/presentationml/2006/main">
+  <p:cSld>
+    <p:spTree>
+      <p:nvGrpSpPr>
+        <p:cNvPr id="1" name=""/>
+        <p:cNvGrpSpPr/>
+        <p:nvPr/>
+      </p:nvGrpSpPr>
+      <p:grpSpPr>
+        <a:xfrm>
+          <a:off x="0" y="0"/>
+          <a:ext cx="0" cy="0"/>
+          <a:chOff x="0" y="0"/>
+          <a:chExt cx="0" cy="0"/>
+        </a:xfrm>
+      </p:grpSpPr>
+      <p:sp>
+        <p:nvSpPr>
+          <p:cNvPr id="2" name="Title 1">
+            <a:extLst>
+              <a:ext uri="{FF2B5EF4-FFF2-40B4-BE49-F238E27FC236}">
+                <a16:creationId xmlns:a16="http://schemas.microsoft.com/office/drawing/2014/main" id="{242619C6-F1F4-426C-BD9E-306B36C729B9}"/>
+              </a:ext>
+            </a:extLst>
+          </p:cNvPr>
+          <p:cNvSpPr>
+            <a:spLocks noGrp="1"/>
+          </p:cNvSpPr>
+          <p:nvPr>
+            <p:ph type="title"/>
+          </p:nvPr>
+        </p:nvSpPr>
+        <p:spPr/>
+        <p:txBody>
+          <a:bodyPr/>
+          <a:lstStyle/>
+          <a:p>
+            <a:endParaRPr lang="en-US"/>
+          </a:p>
+        </p:txBody>
+      </p:sp>
+      <p:sp>
+        <p:nvSpPr>
+          <p:cNvPr id="3" name="Content Placeholder 2">
+            <a:extLst>
+              <a:ext uri="{FF2B5EF4-FFF2-40B4-BE49-F238E27FC236}">
+                <a16:creationId xmlns:a16="http://schemas.microsoft.com/office/drawing/2014/main" id="{449602E6-AD74-4E1D-AD3D-786E941EA5D1}"/>
+              </a:ext>
+            </a:extLst>
+          </p:cNvPr>
+          <p:cNvSpPr>
+            <a:spLocks noGrp="1"/>
+          </p:cNvSpPr>
+          <p:nvPr>
+            <p:ph idx="1"/>
+          </p:nvPr>
+        </p:nvSpPr>
+        <p:spPr/>
+        <p:txBody>
+          <a:bodyPr/>
+          <a:lstStyle/>
+          <a:p>
+            <a:endParaRPr lang="en-US"/>
+          </a:p>
+        </p:txBody>
+      </p:sp>
+    </p:spTree>
+    <p:extLst>
+      <p:ext uri="{BB962C8B-B14F-4D97-AF65-F5344CB8AC3E}">
+        <p14:creationId xmlns:p14="http://schemas.microsoft.com/office/powerpoint/2010/main" val="1951051662"/>
+      </p:ext>
+    </p:extLst>
+  </p:cSld>
+  <p:clrMapOvr>
+    <a:masterClrMapping/>
+  </p:clrMapOvr>
+</p:sld>
+</file>
+
+<file path=ppt/slides/slide9.xml><?xml version="1.0" encoding="utf-8"?>
+<p:sld xmlns:a="http://schemas.openxmlformats.org/drawingml/2006/main" xmlns:r="http://schemas.openxmlformats.org/officeDocument/2006/relationships" xmlns:p="http://schemas.openxmlformats.org/presentationml/2006/main">
+  <p:cSld>
+    <p:spTree>
+      <p:nvGrpSpPr>
+        <p:cNvPr id="1" name=""/>
+        <p:cNvGrpSpPr/>
+        <p:nvPr/>
+      </p:nvGrpSpPr>
+      <p:grpSpPr>
+        <a:xfrm>
+          <a:off x="0" y="0"/>
+          <a:ext cx="0" cy="0"/>
+          <a:chOff x="0" y="0"/>
+          <a:chExt cx="0" cy="0"/>
+        </a:xfrm>
+      </p:grpSpPr>
+      <p:sp>
+        <p:nvSpPr>
+          <p:cNvPr id="2" name="Title 1">
+            <a:extLst>
+              <a:ext uri="{FF2B5EF4-FFF2-40B4-BE49-F238E27FC236}">
+                <a16:creationId xmlns:a16="http://schemas.microsoft.com/office/drawing/2014/main" id="{9D98428C-1359-4987-927C-785095946BFA}"/>
+              </a:ext>
+            </a:extLst>
+          </p:cNvPr>
+          <p:cNvSpPr>
+            <a:spLocks noGrp="1"/>
+          </p:cNvSpPr>
+          <p:nvPr>
+            <p:ph type="title"/>
+          </p:nvPr>
+        </p:nvSpPr>
+        <p:spPr/>
+        <p:txBody>
+          <a:bodyPr/>
+          <a:lstStyle/>
+          <a:p>
+            <a:endParaRPr lang="en-US"/>
+          </a:p>
+        </p:txBody>
+      </p:sp>
+      <p:sp>
+        <p:nvSpPr>
+          <p:cNvPr id="3" name="Content Placeholder 2">
+            <a:extLst>
+              <a:ext uri="{FF2B5EF4-FFF2-40B4-BE49-F238E27FC236}">
+                <a16:creationId xmlns:a16="http://schemas.microsoft.com/office/drawing/2014/main" id="{F9E293E8-5F0E-4862-B3F7-5ABFA0E17541}"/>
+              </a:ext>
+            </a:extLst>
+          </p:cNvPr>
+          <p:cNvSpPr>
+            <a:spLocks noGrp="1"/>
+          </p:cNvSpPr>
+          <p:nvPr>
+            <p:ph idx="1"/>
+          </p:nvPr>
+        </p:nvSpPr>
+        <p:spPr/>
+        <p:txBody>
+          <a:bodyPr/>
+          <a:lstStyle/>
+          <a:p>
+            <a:endParaRPr lang="en-US"/>
+          </a:p>
+        </p:txBody>
+      </p:sp>
+    </p:spTree>
+    <p:extLst>
+      <p:ext uri="{BB962C8B-B14F-4D97-AF65-F5344CB8AC3E}">
+        <p14:creationId xmlns:p14="http://schemas.microsoft.com/office/powerpoint/2010/main" val="2907166301"/>
+      </p:ext>
+    </p:extLst>
+  </p:cSld>
+  <p:clrMapOvr>
+    <a:masterClrMapping/>
+  </p:clrMapOvr>
+</p:sld>
+</file>
+
 <file path=ppt/tags/tag1.xml><?xml version="1.0" encoding="utf-8"?>
 <p:tagLst xmlns:a="http://schemas.openxmlformats.org/drawingml/2006/main" xmlns:r="http://schemas.openxmlformats.org/officeDocument/2006/relationships" xmlns:p="http://schemas.openxmlformats.org/presentationml/2006/main">
   <p:tag name="OUTPUTDPI" val="1200"/>

</xml_diff>

<commit_message>
some tidying up of the first sections + images
</commit_message>
<xml_diff>
--- a/ClareDiagrams.pptx
+++ b/ClareDiagrams.pptx
@@ -215,7 +215,7 @@
           <a:p>
             <a:fld id="{F874CE64-B02C-4A29-A5B8-BB55C61F4F91}" type="datetimeFigureOut">
               <a:rPr lang="en-US" smtClean="0"/>
-              <a:t>11/4/2018</a:t>
+              <a:t>11/20/2018</a:t>
             </a:fld>
             <a:endParaRPr lang="en-US"/>
           </a:p>
@@ -977,7 +977,7 @@
           <a:p>
             <a:fld id="{3721CA93-E140-4E2A-A30C-04BF0C6AAEA4}" type="datetimeFigureOut">
               <a:rPr lang="en-US" smtClean="0"/>
-              <a:t>11/4/2018</a:t>
+              <a:t>11/20/2018</a:t>
             </a:fld>
             <a:endParaRPr lang="en-US"/>
           </a:p>
@@ -1175,7 +1175,7 @@
           <a:p>
             <a:fld id="{3721CA93-E140-4E2A-A30C-04BF0C6AAEA4}" type="datetimeFigureOut">
               <a:rPr lang="en-US" smtClean="0"/>
-              <a:t>11/4/2018</a:t>
+              <a:t>11/20/2018</a:t>
             </a:fld>
             <a:endParaRPr lang="en-US"/>
           </a:p>
@@ -1383,7 +1383,7 @@
           <a:p>
             <a:fld id="{3721CA93-E140-4E2A-A30C-04BF0C6AAEA4}" type="datetimeFigureOut">
               <a:rPr lang="en-US" smtClean="0"/>
-              <a:t>11/4/2018</a:t>
+              <a:t>11/20/2018</a:t>
             </a:fld>
             <a:endParaRPr lang="en-US"/>
           </a:p>
@@ -1581,7 +1581,7 @@
           <a:p>
             <a:fld id="{3721CA93-E140-4E2A-A30C-04BF0C6AAEA4}" type="datetimeFigureOut">
               <a:rPr lang="en-US" smtClean="0"/>
-              <a:t>11/4/2018</a:t>
+              <a:t>11/20/2018</a:t>
             </a:fld>
             <a:endParaRPr lang="en-US"/>
           </a:p>
@@ -1856,7 +1856,7 @@
           <a:p>
             <a:fld id="{3721CA93-E140-4E2A-A30C-04BF0C6AAEA4}" type="datetimeFigureOut">
               <a:rPr lang="en-US" smtClean="0"/>
-              <a:t>11/4/2018</a:t>
+              <a:t>11/20/2018</a:t>
             </a:fld>
             <a:endParaRPr lang="en-US"/>
           </a:p>
@@ -2121,7 +2121,7 @@
           <a:p>
             <a:fld id="{3721CA93-E140-4E2A-A30C-04BF0C6AAEA4}" type="datetimeFigureOut">
               <a:rPr lang="en-US" smtClean="0"/>
-              <a:t>11/4/2018</a:t>
+              <a:t>11/20/2018</a:t>
             </a:fld>
             <a:endParaRPr lang="en-US"/>
           </a:p>
@@ -2533,7 +2533,7 @@
           <a:p>
             <a:fld id="{3721CA93-E140-4E2A-A30C-04BF0C6AAEA4}" type="datetimeFigureOut">
               <a:rPr lang="en-US" smtClean="0"/>
-              <a:t>11/4/2018</a:t>
+              <a:t>11/20/2018</a:t>
             </a:fld>
             <a:endParaRPr lang="en-US"/>
           </a:p>
@@ -2674,7 +2674,7 @@
           <a:p>
             <a:fld id="{3721CA93-E140-4E2A-A30C-04BF0C6AAEA4}" type="datetimeFigureOut">
               <a:rPr lang="en-US" smtClean="0"/>
-              <a:t>11/4/2018</a:t>
+              <a:t>11/20/2018</a:t>
             </a:fld>
             <a:endParaRPr lang="en-US"/>
           </a:p>
@@ -2787,7 +2787,7 @@
           <a:p>
             <a:fld id="{3721CA93-E140-4E2A-A30C-04BF0C6AAEA4}" type="datetimeFigureOut">
               <a:rPr lang="en-US" smtClean="0"/>
-              <a:t>11/4/2018</a:t>
+              <a:t>11/20/2018</a:t>
             </a:fld>
             <a:endParaRPr lang="en-US"/>
           </a:p>
@@ -3098,7 +3098,7 @@
           <a:p>
             <a:fld id="{3721CA93-E140-4E2A-A30C-04BF0C6AAEA4}" type="datetimeFigureOut">
               <a:rPr lang="en-US" smtClean="0"/>
-              <a:t>11/4/2018</a:t>
+              <a:t>11/20/2018</a:t>
             </a:fld>
             <a:endParaRPr lang="en-US"/>
           </a:p>
@@ -3386,7 +3386,7 @@
           <a:p>
             <a:fld id="{3721CA93-E140-4E2A-A30C-04BF0C6AAEA4}" type="datetimeFigureOut">
               <a:rPr lang="en-US" smtClean="0"/>
-              <a:t>11/4/2018</a:t>
+              <a:t>11/20/2018</a:t>
             </a:fld>
             <a:endParaRPr lang="en-US"/>
           </a:p>
@@ -3627,7 +3627,7 @@
           <a:p>
             <a:fld id="{3721CA93-E140-4E2A-A30C-04BF0C6AAEA4}" type="datetimeFigureOut">
               <a:rPr lang="en-US" smtClean="0"/>
-              <a:t>11/4/2018</a:t>
+              <a:t>11/20/2018</a:t>
             </a:fld>
             <a:endParaRPr lang="en-US"/>
           </a:p>
@@ -19175,23 +19175,43 @@
       </p:grpSpPr>
       <p:sp>
         <p:nvSpPr>
-          <p:cNvPr id="2" name="Title 1">
+          <p:cNvPr id="5" name="AutoShape 2" descr="image.png">
             <a:extLst>
               <a:ext uri="{FF2B5EF4-FFF2-40B4-BE49-F238E27FC236}">
-                <a16:creationId xmlns:a16="http://schemas.microsoft.com/office/drawing/2014/main" id="{3C2B3C3F-9994-4698-A0F8-0FB7298024B4}"/>
+                <a16:creationId xmlns:a16="http://schemas.microsoft.com/office/drawing/2014/main" id="{18FEEC12-DD76-4663-99E6-845A3366B673}"/>
               </a:ext>
             </a:extLst>
           </p:cNvPr>
           <p:cNvSpPr>
-            <a:spLocks noGrp="1"/>
+            <a:spLocks noChangeAspect="1" noChangeArrowheads="1"/>
           </p:cNvSpPr>
-          <p:nvPr>
-            <p:ph type="title"/>
-          </p:nvPr>
+          <p:nvPr/>
         </p:nvSpPr>
-        <p:spPr/>
+        <p:spPr bwMode="auto">
+          <a:xfrm>
+            <a:off x="4110038" y="847725"/>
+            <a:ext cx="3971925" cy="5162550"/>
+          </a:xfrm>
+          <a:prstGeom prst="rect">
+            <a:avLst/>
+          </a:prstGeom>
+          <a:noFill/>
+          <a:extLst>
+            <a:ext uri="{909E8E84-426E-40DD-AFC4-6F175D3DCCD1}">
+              <a14:hiddenFill xmlns:a14="http://schemas.microsoft.com/office/drawing/2010/main">
+                <a:solidFill>
+                  <a:srgbClr val="FFFFFF"/>
+                </a:solidFill>
+              </a14:hiddenFill>
+            </a:ext>
+          </a:extLst>
+        </p:spPr>
         <p:txBody>
-          <a:bodyPr/>
+          <a:bodyPr vert="horz" wrap="square" lIns="91440" tIns="45720" rIns="91440" bIns="45720" numCol="1" anchor="t" anchorCtr="0" compatLnSpc="1">
+            <a:prstTxWarp prst="textNoShape">
+              <a:avLst/>
+            </a:prstTxWarp>
+          </a:bodyPr>
           <a:lstStyle/>
           <a:p>
             <a:endParaRPr lang="en-US"/>
@@ -19200,29 +19220,220 @@
       </p:sp>
       <p:sp>
         <p:nvSpPr>
-          <p:cNvPr id="3" name="Content Placeholder 2">
+          <p:cNvPr id="6" name="AutoShape 4" descr="image.png">
             <a:extLst>
               <a:ext uri="{FF2B5EF4-FFF2-40B4-BE49-F238E27FC236}">
-                <a16:creationId xmlns:a16="http://schemas.microsoft.com/office/drawing/2014/main" id="{4543A4B2-24B2-4B5A-B28F-DFEC6F7157C9}"/>
+                <a16:creationId xmlns:a16="http://schemas.microsoft.com/office/drawing/2014/main" id="{E27DDAA2-D2AB-4567-9819-776A13B86BCA}"/>
               </a:ext>
             </a:extLst>
           </p:cNvPr>
           <p:cNvSpPr>
-            <a:spLocks noGrp="1"/>
+            <a:spLocks noChangeAspect="1" noChangeArrowheads="1"/>
           </p:cNvSpPr>
-          <p:nvPr>
-            <p:ph idx="1"/>
-          </p:nvPr>
+          <p:nvPr/>
         </p:nvSpPr>
-        <p:spPr/>
+        <p:spPr bwMode="auto">
+          <a:xfrm>
+            <a:off x="4262438" y="1000125"/>
+            <a:ext cx="3971925" cy="5162550"/>
+          </a:xfrm>
+          <a:prstGeom prst="rect">
+            <a:avLst/>
+          </a:prstGeom>
+          <a:noFill/>
+          <a:extLst>
+            <a:ext uri="{909E8E84-426E-40DD-AFC4-6F175D3DCCD1}">
+              <a14:hiddenFill xmlns:a14="http://schemas.microsoft.com/office/drawing/2010/main">
+                <a:solidFill>
+                  <a:srgbClr val="FFFFFF"/>
+                </a:solidFill>
+              </a14:hiddenFill>
+            </a:ext>
+          </a:extLst>
+        </p:spPr>
         <p:txBody>
-          <a:bodyPr/>
+          <a:bodyPr vert="horz" wrap="square" lIns="91440" tIns="45720" rIns="91440" bIns="45720" numCol="1" anchor="t" anchorCtr="0" compatLnSpc="1">
+            <a:prstTxWarp prst="textNoShape">
+              <a:avLst/>
+            </a:prstTxWarp>
+          </a:bodyPr>
           <a:lstStyle/>
           <a:p>
             <a:endParaRPr lang="en-US"/>
           </a:p>
         </p:txBody>
       </p:sp>
+      <p:sp>
+        <p:nvSpPr>
+          <p:cNvPr id="7" name="AutoShape 6" descr="image.png">
+            <a:extLst>
+              <a:ext uri="{FF2B5EF4-FFF2-40B4-BE49-F238E27FC236}">
+                <a16:creationId xmlns:a16="http://schemas.microsoft.com/office/drawing/2014/main" id="{90B2D16F-AE9F-48D4-8059-EDD4241A545B}"/>
+              </a:ext>
+            </a:extLst>
+          </p:cNvPr>
+          <p:cNvSpPr>
+            <a:spLocks noChangeAspect="1" noChangeArrowheads="1"/>
+          </p:cNvSpPr>
+          <p:nvPr/>
+        </p:nvSpPr>
+        <p:spPr bwMode="auto">
+          <a:xfrm>
+            <a:off x="4414838" y="1152525"/>
+            <a:ext cx="3971925" cy="5162550"/>
+          </a:xfrm>
+          <a:prstGeom prst="rect">
+            <a:avLst/>
+          </a:prstGeom>
+          <a:noFill/>
+          <a:extLst>
+            <a:ext uri="{909E8E84-426E-40DD-AFC4-6F175D3DCCD1}">
+              <a14:hiddenFill xmlns:a14="http://schemas.microsoft.com/office/drawing/2010/main">
+                <a:solidFill>
+                  <a:srgbClr val="FFFFFF"/>
+                </a:solidFill>
+              </a14:hiddenFill>
+            </a:ext>
+          </a:extLst>
+        </p:spPr>
+        <p:txBody>
+          <a:bodyPr vert="horz" wrap="square" lIns="91440" tIns="45720" rIns="91440" bIns="45720" numCol="1" anchor="t" anchorCtr="0" compatLnSpc="1">
+            <a:prstTxWarp prst="textNoShape">
+              <a:avLst/>
+            </a:prstTxWarp>
+          </a:bodyPr>
+          <a:lstStyle/>
+          <a:p>
+            <a:endParaRPr lang="en-US"/>
+          </a:p>
+        </p:txBody>
+      </p:sp>
+      <p:sp>
+        <p:nvSpPr>
+          <p:cNvPr id="8" name="AutoShape 8" descr="image.png">
+            <a:extLst>
+              <a:ext uri="{FF2B5EF4-FFF2-40B4-BE49-F238E27FC236}">
+                <a16:creationId xmlns:a16="http://schemas.microsoft.com/office/drawing/2014/main" id="{D61FAB0C-66E4-4511-91CB-32DC66BF6C6A}"/>
+              </a:ext>
+            </a:extLst>
+          </p:cNvPr>
+          <p:cNvSpPr>
+            <a:spLocks noChangeAspect="1" noChangeArrowheads="1"/>
+          </p:cNvSpPr>
+          <p:nvPr/>
+        </p:nvSpPr>
+        <p:spPr bwMode="auto">
+          <a:xfrm>
+            <a:off x="4567238" y="1304925"/>
+            <a:ext cx="3971925" cy="5162550"/>
+          </a:xfrm>
+          <a:prstGeom prst="rect">
+            <a:avLst/>
+          </a:prstGeom>
+          <a:noFill/>
+          <a:extLst>
+            <a:ext uri="{909E8E84-426E-40DD-AFC4-6F175D3DCCD1}">
+              <a14:hiddenFill xmlns:a14="http://schemas.microsoft.com/office/drawing/2010/main">
+                <a:solidFill>
+                  <a:srgbClr val="FFFFFF"/>
+                </a:solidFill>
+              </a14:hiddenFill>
+            </a:ext>
+          </a:extLst>
+        </p:spPr>
+        <p:txBody>
+          <a:bodyPr vert="horz" wrap="square" lIns="91440" tIns="45720" rIns="91440" bIns="45720" numCol="1" anchor="t" anchorCtr="0" compatLnSpc="1">
+            <a:prstTxWarp prst="textNoShape">
+              <a:avLst/>
+            </a:prstTxWarp>
+          </a:bodyPr>
+          <a:lstStyle/>
+          <a:p>
+            <a:endParaRPr lang="en-US"/>
+          </a:p>
+        </p:txBody>
+      </p:sp>
+      <p:pic>
+        <p:nvPicPr>
+          <p:cNvPr id="1034" name="Picture 10" descr="https://lh3.googleusercontent.com/Raodza5J3U9GRxvfLKkqjKDRgdxvtROxIEOFn0gwjgAhMhTSyQKIzU1Amji61KqBdoKbZynmewNMfF1jArKrr3BnyyB7-WOZK_MUq0OfwS4kXq7gnGL-vdzJbj_GXvSfxcDvMPa4ei-6r_u0r4hsUliJML3ru17PILKfrVChR7zJwZwIylLZx1Nb2I7xDptDGQhaD6Tro-LYGJ43Zxf6panc3dJ-eYxQzlKBSISmxbT3pb_T2OMbCJa8P4rDzqhng_G-bdd3_gegGGdetB-AT2lKzJhnITiLnXxf04epWV4UCvdVScnmIdTWLWtyfLavNOIij4wn59k8hzTyGFAKBSWia8kR7okjTc8aHeElVTIKE3HUR7HIR0L8cG7kKqFx6wAUfE3IQUt8gLMAv6UDGe6zhPsMON-Mq1KyZQFgke1Ex5k8wMABjjBI73jlPAHCE_FYQVhfdOs4JwznTf55QpDTgLOlyZ-KbbFVzmi0Ym86_GqAgrPF5OyskLb6-zBwnkuoPPDJbTOlZU0LHQKYQ_rC8FVprrOq3pLi3whqREVOQrm7IhSUSg_d4xpoB_wPufk_hpPc4i_P9F37xis4iGbg1ABxoMKSXsiQJ16CdPYp9LqTXLnd_P_F6Pj6gdZpiVO-4Ph42dJfkzn0xo8V7a-azbZQABr-dW6jnGTngGuzD4db9IszYckaSNaT43jA-2nt0e5uPQHQmmGHow=w477-h636-no">
+            <a:extLst>
+              <a:ext uri="{FF2B5EF4-FFF2-40B4-BE49-F238E27FC236}">
+                <a16:creationId xmlns:a16="http://schemas.microsoft.com/office/drawing/2014/main" id="{49DBD972-AEE9-4B73-BE5D-D85C0117D7DC}"/>
+              </a:ext>
+            </a:extLst>
+          </p:cNvPr>
+          <p:cNvPicPr>
+            <a:picLocks noChangeAspect="1" noChangeArrowheads="1"/>
+          </p:cNvPicPr>
+          <p:nvPr/>
+        </p:nvPicPr>
+        <p:blipFill rotWithShape="1">
+          <a:blip r:embed="rId2">
+            <a:extLst>
+              <a:ext uri="{28A0092B-C50C-407E-A947-70E740481C1C}">
+                <a14:useLocalDpi xmlns:a14="http://schemas.microsoft.com/office/drawing/2010/main" val="0"/>
+              </a:ext>
+            </a:extLst>
+          </a:blip>
+          <a:srcRect t="12263" b="5032"/>
+          <a:stretch/>
+        </p:blipFill>
+        <p:spPr bwMode="auto">
+          <a:xfrm>
+            <a:off x="1425592" y="1000125"/>
+            <a:ext cx="4543425" cy="5010150"/>
+          </a:xfrm>
+          <a:prstGeom prst="rect">
+            <a:avLst/>
+          </a:prstGeom>
+          <a:noFill/>
+          <a:extLst>
+            <a:ext uri="{909E8E84-426E-40DD-AFC4-6F175D3DCCD1}">
+              <a14:hiddenFill xmlns:a14="http://schemas.microsoft.com/office/drawing/2010/main">
+                <a:solidFill>
+                  <a:srgbClr val="FFFFFF"/>
+                </a:solidFill>
+              </a14:hiddenFill>
+            </a:ext>
+          </a:extLst>
+        </p:spPr>
+      </p:pic>
+      <p:pic>
+        <p:nvPicPr>
+          <p:cNvPr id="12" name="Picture 11">
+            <a:extLst>
+              <a:ext uri="{FF2B5EF4-FFF2-40B4-BE49-F238E27FC236}">
+                <a16:creationId xmlns:a16="http://schemas.microsoft.com/office/drawing/2014/main" id="{12DEF18D-C5F2-4E62-B058-A3E13C45F37F}"/>
+              </a:ext>
+            </a:extLst>
+          </p:cNvPr>
+          <p:cNvPicPr>
+            <a:picLocks noChangeAspect="1"/>
+          </p:cNvPicPr>
+          <p:nvPr/>
+        </p:nvPicPr>
+        <p:blipFill>
+          <a:blip r:embed="rId3">
+            <a:extLst>
+              <a:ext uri="{28A0092B-C50C-407E-A947-70E740481C1C}">
+                <a14:useLocalDpi xmlns:a14="http://schemas.microsoft.com/office/drawing/2010/main" val="0"/>
+              </a:ext>
+            </a:extLst>
+          </a:blip>
+          <a:stretch>
+            <a:fillRect/>
+          </a:stretch>
+        </p:blipFill>
+        <p:spPr>
+          <a:xfrm>
+            <a:off x="6235717" y="1189571"/>
+            <a:ext cx="5140292" cy="4478857"/>
+          </a:xfrm>
+          <a:prstGeom prst="rect">
+            <a:avLst/>
+          </a:prstGeom>
+        </p:spPr>
+      </p:pic>
     </p:spTree>
     <p:extLst>
       <p:ext uri="{BB962C8B-B14F-4D97-AF65-F5344CB8AC3E}">

</xml_diff>

<commit_message>
siphon complete, some hard stuff up ahead
</commit_message>
<xml_diff>
--- a/ClareDiagrams.pptx
+++ b/ClareDiagrams.pptx
@@ -215,7 +215,7 @@
           <a:p>
             <a:fld id="{F874CE64-B02C-4A29-A5B8-BB55C61F4F91}" type="datetimeFigureOut">
               <a:rPr lang="en-US" smtClean="0"/>
-              <a:t>11/20/2018</a:t>
+              <a:t>12/6/2018</a:t>
             </a:fld>
             <a:endParaRPr lang="en-US"/>
           </a:p>
@@ -977,7 +977,7 @@
           <a:p>
             <a:fld id="{3721CA93-E140-4E2A-A30C-04BF0C6AAEA4}" type="datetimeFigureOut">
               <a:rPr lang="en-US" smtClean="0"/>
-              <a:t>11/20/2018</a:t>
+              <a:t>12/6/2018</a:t>
             </a:fld>
             <a:endParaRPr lang="en-US"/>
           </a:p>
@@ -1175,7 +1175,7 @@
           <a:p>
             <a:fld id="{3721CA93-E140-4E2A-A30C-04BF0C6AAEA4}" type="datetimeFigureOut">
               <a:rPr lang="en-US" smtClean="0"/>
-              <a:t>11/20/2018</a:t>
+              <a:t>12/6/2018</a:t>
             </a:fld>
             <a:endParaRPr lang="en-US"/>
           </a:p>
@@ -1383,7 +1383,7 @@
           <a:p>
             <a:fld id="{3721CA93-E140-4E2A-A30C-04BF0C6AAEA4}" type="datetimeFigureOut">
               <a:rPr lang="en-US" smtClean="0"/>
-              <a:t>11/20/2018</a:t>
+              <a:t>12/6/2018</a:t>
             </a:fld>
             <a:endParaRPr lang="en-US"/>
           </a:p>
@@ -1581,7 +1581,7 @@
           <a:p>
             <a:fld id="{3721CA93-E140-4E2A-A30C-04BF0C6AAEA4}" type="datetimeFigureOut">
               <a:rPr lang="en-US" smtClean="0"/>
-              <a:t>11/20/2018</a:t>
+              <a:t>12/6/2018</a:t>
             </a:fld>
             <a:endParaRPr lang="en-US"/>
           </a:p>
@@ -1856,7 +1856,7 @@
           <a:p>
             <a:fld id="{3721CA93-E140-4E2A-A30C-04BF0C6AAEA4}" type="datetimeFigureOut">
               <a:rPr lang="en-US" smtClean="0"/>
-              <a:t>11/20/2018</a:t>
+              <a:t>12/6/2018</a:t>
             </a:fld>
             <a:endParaRPr lang="en-US"/>
           </a:p>
@@ -2121,7 +2121,7 @@
           <a:p>
             <a:fld id="{3721CA93-E140-4E2A-A30C-04BF0C6AAEA4}" type="datetimeFigureOut">
               <a:rPr lang="en-US" smtClean="0"/>
-              <a:t>11/20/2018</a:t>
+              <a:t>12/6/2018</a:t>
             </a:fld>
             <a:endParaRPr lang="en-US"/>
           </a:p>
@@ -2533,7 +2533,7 @@
           <a:p>
             <a:fld id="{3721CA93-E140-4E2A-A30C-04BF0C6AAEA4}" type="datetimeFigureOut">
               <a:rPr lang="en-US" smtClean="0"/>
-              <a:t>11/20/2018</a:t>
+              <a:t>12/6/2018</a:t>
             </a:fld>
             <a:endParaRPr lang="en-US"/>
           </a:p>
@@ -2674,7 +2674,7 @@
           <a:p>
             <a:fld id="{3721CA93-E140-4E2A-A30C-04BF0C6AAEA4}" type="datetimeFigureOut">
               <a:rPr lang="en-US" smtClean="0"/>
-              <a:t>11/20/2018</a:t>
+              <a:t>12/6/2018</a:t>
             </a:fld>
             <a:endParaRPr lang="en-US"/>
           </a:p>
@@ -2787,7 +2787,7 @@
           <a:p>
             <a:fld id="{3721CA93-E140-4E2A-A30C-04BF0C6AAEA4}" type="datetimeFigureOut">
               <a:rPr lang="en-US" smtClean="0"/>
-              <a:t>11/20/2018</a:t>
+              <a:t>12/6/2018</a:t>
             </a:fld>
             <a:endParaRPr lang="en-US"/>
           </a:p>
@@ -3098,7 +3098,7 @@
           <a:p>
             <a:fld id="{3721CA93-E140-4E2A-A30C-04BF0C6AAEA4}" type="datetimeFigureOut">
               <a:rPr lang="en-US" smtClean="0"/>
-              <a:t>11/20/2018</a:t>
+              <a:t>12/6/2018</a:t>
             </a:fld>
             <a:endParaRPr lang="en-US"/>
           </a:p>
@@ -3386,7 +3386,7 @@
           <a:p>
             <a:fld id="{3721CA93-E140-4E2A-A30C-04BF0C6AAEA4}" type="datetimeFigureOut">
               <a:rPr lang="en-US" smtClean="0"/>
-              <a:t>11/20/2018</a:t>
+              <a:t>12/6/2018</a:t>
             </a:fld>
             <a:endParaRPr lang="en-US"/>
           </a:p>
@@ -3627,7 +3627,7 @@
           <a:p>
             <a:fld id="{3721CA93-E140-4E2A-A30C-04BF0C6AAEA4}" type="datetimeFigureOut">
               <a:rPr lang="en-US" smtClean="0"/>
-              <a:t>11/20/2018</a:t>
+              <a:t>12/6/2018</a:t>
             </a:fld>
             <a:endParaRPr lang="en-US"/>
           </a:p>
@@ -19464,56 +19464,957 @@
           <a:chExt cx="0" cy="0"/>
         </a:xfrm>
       </p:grpSpPr>
-      <p:sp>
-        <p:nvSpPr>
-          <p:cNvPr id="2" name="Title 1">
+      <p:grpSp>
+        <p:nvGrpSpPr>
+          <p:cNvPr id="34" name="Group 33">
             <a:extLst>
               <a:ext uri="{FF2B5EF4-FFF2-40B4-BE49-F238E27FC236}">
-                <a16:creationId xmlns:a16="http://schemas.microsoft.com/office/drawing/2014/main" id="{BD5BB5E1-9A9A-43B3-B5C3-F9D77A9B941B}"/>
+                <a16:creationId xmlns:a16="http://schemas.microsoft.com/office/drawing/2014/main" id="{0932E065-5CC3-4A26-BE09-A6803F377238}"/>
               </a:ext>
             </a:extLst>
           </p:cNvPr>
-          <p:cNvSpPr>
-            <a:spLocks noGrp="1"/>
-          </p:cNvSpPr>
-          <p:nvPr>
-            <p:ph type="title"/>
-          </p:nvPr>
-        </p:nvSpPr>
-        <p:spPr/>
-        <p:txBody>
-          <a:bodyPr/>
-          <a:lstStyle/>
-          <a:p>
-            <a:endParaRPr lang="en-US"/>
-          </a:p>
-        </p:txBody>
-      </p:sp>
-      <p:sp>
-        <p:nvSpPr>
-          <p:cNvPr id="3" name="Content Placeholder 2">
-            <a:extLst>
-              <a:ext uri="{FF2B5EF4-FFF2-40B4-BE49-F238E27FC236}">
-                <a16:creationId xmlns:a16="http://schemas.microsoft.com/office/drawing/2014/main" id="{33EB1C9F-7A9D-4433-9BB1-E52F3F542BC2}"/>
-              </a:ext>
-            </a:extLst>
-          </p:cNvPr>
-          <p:cNvSpPr>
-            <a:spLocks noGrp="1"/>
-          </p:cNvSpPr>
-          <p:nvPr>
-            <p:ph idx="1"/>
-          </p:nvPr>
-        </p:nvSpPr>
-        <p:spPr/>
-        <p:txBody>
-          <a:bodyPr/>
-          <a:lstStyle/>
-          <a:p>
-            <a:endParaRPr lang="en-US"/>
-          </a:p>
-        </p:txBody>
-      </p:sp>
+          <p:cNvGrpSpPr/>
+          <p:nvPr/>
+        </p:nvGrpSpPr>
+        <p:grpSpPr>
+          <a:xfrm>
+            <a:off x="1887717" y="178286"/>
+            <a:ext cx="8566044" cy="5767588"/>
+            <a:chOff x="1887717" y="178286"/>
+            <a:chExt cx="8566044" cy="5767588"/>
+          </a:xfrm>
+        </p:grpSpPr>
+        <p:sp>
+          <p:nvSpPr>
+            <p:cNvPr id="25" name="L-Shape 24">
+              <a:extLst>
+                <a:ext uri="{FF2B5EF4-FFF2-40B4-BE49-F238E27FC236}">
+                  <a16:creationId xmlns:a16="http://schemas.microsoft.com/office/drawing/2014/main" id="{5C2A8E2B-6EFD-4DF9-94C2-A837D238E30D}"/>
+                </a:ext>
+              </a:extLst>
+            </p:cNvPr>
+            <p:cNvSpPr/>
+            <p:nvPr/>
+          </p:nvSpPr>
+          <p:spPr>
+            <a:xfrm rot="16200000" flipV="1">
+              <a:off x="3235912" y="4116898"/>
+              <a:ext cx="2669366" cy="739787"/>
+            </a:xfrm>
+            <a:prstGeom prst="corner">
+              <a:avLst>
+                <a:gd name="adj1" fmla="val 50000"/>
+                <a:gd name="adj2" fmla="val 46078"/>
+              </a:avLst>
+            </a:prstGeom>
+            <a:ln>
+              <a:noFill/>
+            </a:ln>
+          </p:spPr>
+          <p:style>
+            <a:lnRef idx="2">
+              <a:schemeClr val="accent1">
+                <a:shade val="50000"/>
+              </a:schemeClr>
+            </a:lnRef>
+            <a:fillRef idx="1">
+              <a:schemeClr val="accent1"/>
+            </a:fillRef>
+            <a:effectRef idx="0">
+              <a:schemeClr val="accent1"/>
+            </a:effectRef>
+            <a:fontRef idx="minor">
+              <a:schemeClr val="lt1"/>
+            </a:fontRef>
+          </p:style>
+          <p:txBody>
+            <a:bodyPr rtlCol="0" anchor="ctr"/>
+            <a:lstStyle/>
+            <a:p>
+              <a:pPr algn="ctr"/>
+              <a:endParaRPr lang="en-US"/>
+            </a:p>
+          </p:txBody>
+        </p:sp>
+        <p:sp>
+          <p:nvSpPr>
+            <p:cNvPr id="4" name="Rectangle 3">
+              <a:extLst>
+                <a:ext uri="{FF2B5EF4-FFF2-40B4-BE49-F238E27FC236}">
+                  <a16:creationId xmlns:a16="http://schemas.microsoft.com/office/drawing/2014/main" id="{F2FB3D1D-A3BF-4826-AE36-3E8D047EC43D}"/>
+                </a:ext>
+              </a:extLst>
+            </p:cNvPr>
+            <p:cNvSpPr/>
+            <p:nvPr/>
+          </p:nvSpPr>
+          <p:spPr>
+            <a:xfrm>
+              <a:off x="4940491" y="1810602"/>
+              <a:ext cx="1746913" cy="4135272"/>
+            </a:xfrm>
+            <a:prstGeom prst="rect">
+              <a:avLst/>
+            </a:prstGeom>
+            <a:solidFill>
+              <a:schemeClr val="accent1">
+                <a:lumMod val="40000"/>
+                <a:lumOff val="60000"/>
+              </a:schemeClr>
+            </a:solidFill>
+            <a:ln w="38100"/>
+          </p:spPr>
+          <p:style>
+            <a:lnRef idx="2">
+              <a:schemeClr val="accent1">
+                <a:shade val="50000"/>
+              </a:schemeClr>
+            </a:lnRef>
+            <a:fillRef idx="1">
+              <a:schemeClr val="accent1"/>
+            </a:fillRef>
+            <a:effectRef idx="0">
+              <a:schemeClr val="accent1"/>
+            </a:effectRef>
+            <a:fontRef idx="minor">
+              <a:schemeClr val="lt1"/>
+            </a:fontRef>
+          </p:style>
+          <p:txBody>
+            <a:bodyPr rtlCol="0" anchor="ctr"/>
+            <a:lstStyle/>
+            <a:p>
+              <a:pPr algn="ctr"/>
+              <a:endParaRPr lang="en-US"/>
+            </a:p>
+          </p:txBody>
+        </p:sp>
+        <p:sp>
+          <p:nvSpPr>
+            <p:cNvPr id="5" name="Rectangle 4">
+              <a:extLst>
+                <a:ext uri="{FF2B5EF4-FFF2-40B4-BE49-F238E27FC236}">
+                  <a16:creationId xmlns:a16="http://schemas.microsoft.com/office/drawing/2014/main" id="{E43E626C-0E32-47CB-A030-AAEEF8346EAA}"/>
+                </a:ext>
+              </a:extLst>
+            </p:cNvPr>
+            <p:cNvSpPr/>
+            <p:nvPr/>
+          </p:nvSpPr>
+          <p:spPr>
+            <a:xfrm>
+              <a:off x="3682970" y="178286"/>
+              <a:ext cx="1214649" cy="2973823"/>
+            </a:xfrm>
+            <a:prstGeom prst="rect">
+              <a:avLst/>
+            </a:prstGeom>
+            <a:solidFill>
+              <a:schemeClr val="accent1">
+                <a:lumMod val="40000"/>
+                <a:lumOff val="60000"/>
+              </a:schemeClr>
+            </a:solidFill>
+            <a:ln w="38100"/>
+          </p:spPr>
+          <p:style>
+            <a:lnRef idx="2">
+              <a:schemeClr val="accent1">
+                <a:shade val="50000"/>
+              </a:schemeClr>
+            </a:lnRef>
+            <a:fillRef idx="1">
+              <a:schemeClr val="accent1"/>
+            </a:fillRef>
+            <a:effectRef idx="0">
+              <a:schemeClr val="accent1"/>
+            </a:effectRef>
+            <a:fontRef idx="minor">
+              <a:schemeClr val="lt1"/>
+            </a:fontRef>
+          </p:style>
+          <p:txBody>
+            <a:bodyPr rtlCol="0" anchor="ctr"/>
+            <a:lstStyle/>
+            <a:p>
+              <a:pPr algn="ctr"/>
+              <a:endParaRPr lang="en-US"/>
+            </a:p>
+          </p:txBody>
+        </p:sp>
+        <p:pic>
+          <p:nvPicPr>
+            <p:cNvPr id="9" name="Picture 8">
+              <a:extLst>
+                <a:ext uri="{FF2B5EF4-FFF2-40B4-BE49-F238E27FC236}">
+                  <a16:creationId xmlns:a16="http://schemas.microsoft.com/office/drawing/2014/main" id="{3AAA4744-A710-4F8D-B6F0-D853F639645E}"/>
+                </a:ext>
+              </a:extLst>
+            </p:cNvPr>
+            <p:cNvPicPr>
+              <a:picLocks noChangeAspect="1"/>
+            </p:cNvPicPr>
+            <p:nvPr>
+              <p:custDataLst>
+                <p:tags r:id="rId1"/>
+              </p:custDataLst>
+            </p:nvPr>
+          </p:nvPicPr>
+          <p:blipFill>
+            <a:blip r:embed="rId10">
+              <a:extLst>
+                <a:ext uri="{28A0092B-C50C-407E-A947-70E740481C1C}">
+                  <a14:useLocalDpi xmlns:a14="http://schemas.microsoft.com/office/drawing/2010/main" val="0"/>
+                </a:ext>
+              </a:extLst>
+            </a:blip>
+            <a:stretch>
+              <a:fillRect/>
+            </a:stretch>
+          </p:blipFill>
+          <p:spPr>
+            <a:xfrm>
+              <a:off x="1887717" y="410570"/>
+              <a:ext cx="1752381" cy="178286"/>
+            </a:xfrm>
+            <a:prstGeom prst="rect">
+              <a:avLst/>
+            </a:prstGeom>
+          </p:spPr>
+        </p:pic>
+        <p:pic>
+          <p:nvPicPr>
+            <p:cNvPr id="11" name="Picture 10">
+              <a:extLst>
+                <a:ext uri="{FF2B5EF4-FFF2-40B4-BE49-F238E27FC236}">
+                  <a16:creationId xmlns:a16="http://schemas.microsoft.com/office/drawing/2014/main" id="{9113EF52-D7B3-46A8-9125-E18B06041B46}"/>
+                </a:ext>
+              </a:extLst>
+            </p:cNvPr>
+            <p:cNvPicPr>
+              <a:picLocks noChangeAspect="1"/>
+            </p:cNvPicPr>
+            <p:nvPr>
+              <p:custDataLst>
+                <p:tags r:id="rId2"/>
+              </p:custDataLst>
+            </p:nvPr>
+          </p:nvPicPr>
+          <p:blipFill>
+            <a:blip r:embed="rId11">
+              <a:extLst>
+                <a:ext uri="{28A0092B-C50C-407E-A947-70E740481C1C}">
+                  <a14:useLocalDpi xmlns:a14="http://schemas.microsoft.com/office/drawing/2010/main" val="0"/>
+                </a:ext>
+              </a:extLst>
+            </a:blip>
+            <a:stretch>
+              <a:fillRect/>
+            </a:stretch>
+          </p:blipFill>
+          <p:spPr>
+            <a:xfrm>
+              <a:off x="5137375" y="5351060"/>
+              <a:ext cx="1353143" cy="227048"/>
+            </a:xfrm>
+            <a:prstGeom prst="rect">
+              <a:avLst/>
+            </a:prstGeom>
+          </p:spPr>
+        </p:pic>
+        <p:grpSp>
+          <p:nvGrpSpPr>
+            <p:cNvPr id="18" name="Group 17">
+              <a:extLst>
+                <a:ext uri="{FF2B5EF4-FFF2-40B4-BE49-F238E27FC236}">
+                  <a16:creationId xmlns:a16="http://schemas.microsoft.com/office/drawing/2014/main" id="{81951DB2-0FDD-49B2-850C-DE722AE35453}"/>
+                </a:ext>
+              </a:extLst>
+            </p:cNvPr>
+            <p:cNvGrpSpPr/>
+            <p:nvPr/>
+          </p:nvGrpSpPr>
+          <p:grpSpPr>
+            <a:xfrm>
+              <a:off x="6714699" y="2123727"/>
+              <a:ext cx="1991491" cy="3822147"/>
+              <a:chOff x="6714699" y="2123727"/>
+              <a:chExt cx="1991491" cy="3822147"/>
+            </a:xfrm>
+          </p:grpSpPr>
+          <p:grpSp>
+            <p:nvGrpSpPr>
+              <p:cNvPr id="16" name="Group 15">
+                <a:extLst>
+                  <a:ext uri="{FF2B5EF4-FFF2-40B4-BE49-F238E27FC236}">
+                    <a16:creationId xmlns:a16="http://schemas.microsoft.com/office/drawing/2014/main" id="{3B491CEA-208C-4C70-9A7E-9C231D91BD9F}"/>
+                  </a:ext>
+                </a:extLst>
+              </p:cNvPr>
+              <p:cNvGrpSpPr/>
+              <p:nvPr/>
+            </p:nvGrpSpPr>
+            <p:grpSpPr>
+              <a:xfrm>
+                <a:off x="6714699" y="2123727"/>
+                <a:ext cx="1991491" cy="3822147"/>
+                <a:chOff x="6714700" y="2123727"/>
+                <a:chExt cx="1820733" cy="3822147"/>
+              </a:xfrm>
+            </p:grpSpPr>
+            <p:sp>
+              <p:nvSpPr>
+                <p:cNvPr id="13" name="Arrow: U-Turn 12">
+                  <a:extLst>
+                    <a:ext uri="{FF2B5EF4-FFF2-40B4-BE49-F238E27FC236}">
+                      <a16:creationId xmlns:a16="http://schemas.microsoft.com/office/drawing/2014/main" id="{42164C30-55FE-4A4E-B54E-C92FD1AEB2E5}"/>
+                    </a:ext>
+                  </a:extLst>
+                </p:cNvPr>
+                <p:cNvSpPr/>
+                <p:nvPr/>
+              </p:nvSpPr>
+              <p:spPr>
+                <a:xfrm rot="10800000" flipH="1">
+                  <a:off x="7525570" y="2471745"/>
+                  <a:ext cx="1009863" cy="3474129"/>
+                </a:xfrm>
+                <a:prstGeom prst="uturnArrow">
+                  <a:avLst>
+                    <a:gd name="adj1" fmla="val 33592"/>
+                    <a:gd name="adj2" fmla="val 25000"/>
+                    <a:gd name="adj3" fmla="val 0"/>
+                    <a:gd name="adj4" fmla="val 45898"/>
+                    <a:gd name="adj5" fmla="val 30272"/>
+                  </a:avLst>
+                </a:prstGeom>
+                <a:ln>
+                  <a:noFill/>
+                </a:ln>
+              </p:spPr>
+              <p:style>
+                <a:lnRef idx="2">
+                  <a:schemeClr val="accent1">
+                    <a:shade val="50000"/>
+                  </a:schemeClr>
+                </a:lnRef>
+                <a:fillRef idx="1">
+                  <a:schemeClr val="accent1"/>
+                </a:fillRef>
+                <a:effectRef idx="0">
+                  <a:schemeClr val="accent1"/>
+                </a:effectRef>
+                <a:fontRef idx="minor">
+                  <a:schemeClr val="lt1"/>
+                </a:fontRef>
+              </p:style>
+              <p:txBody>
+                <a:bodyPr rtlCol="0" anchor="ctr"/>
+                <a:lstStyle/>
+                <a:p>
+                  <a:pPr algn="ctr"/>
+                  <a:endParaRPr lang="en-US" dirty="0">
+                    <a:solidFill>
+                      <a:schemeClr val="tx1"/>
+                    </a:solidFill>
+                  </a:endParaRPr>
+                </a:p>
+              </p:txBody>
+            </p:sp>
+            <p:sp>
+              <p:nvSpPr>
+                <p:cNvPr id="15" name="L-Shape 14">
+                  <a:extLst>
+                    <a:ext uri="{FF2B5EF4-FFF2-40B4-BE49-F238E27FC236}">
+                      <a16:creationId xmlns:a16="http://schemas.microsoft.com/office/drawing/2014/main" id="{55D06D36-46A9-4DB0-B40F-FB7FF5FD871C}"/>
+                    </a:ext>
+                  </a:extLst>
+                </p:cNvPr>
+                <p:cNvSpPr/>
+                <p:nvPr/>
+              </p:nvSpPr>
+              <p:spPr>
+                <a:xfrm rot="10800000">
+                  <a:off x="6714700" y="2123727"/>
+                  <a:ext cx="1146408" cy="696036"/>
+                </a:xfrm>
+                <a:prstGeom prst="corner">
+                  <a:avLst>
+                    <a:gd name="adj1" fmla="val 50000"/>
+                    <a:gd name="adj2" fmla="val 46078"/>
+                  </a:avLst>
+                </a:prstGeom>
+                <a:ln>
+                  <a:noFill/>
+                </a:ln>
+              </p:spPr>
+              <p:style>
+                <a:lnRef idx="2">
+                  <a:schemeClr val="accent1">
+                    <a:shade val="50000"/>
+                  </a:schemeClr>
+                </a:lnRef>
+                <a:fillRef idx="1">
+                  <a:schemeClr val="accent1"/>
+                </a:fillRef>
+                <a:effectRef idx="0">
+                  <a:schemeClr val="accent1"/>
+                </a:effectRef>
+                <a:fontRef idx="minor">
+                  <a:schemeClr val="lt1"/>
+                </a:fontRef>
+              </p:style>
+              <p:txBody>
+                <a:bodyPr rtlCol="0" anchor="ctr"/>
+                <a:lstStyle/>
+                <a:p>
+                  <a:pPr algn="ctr"/>
+                  <a:endParaRPr lang="en-US"/>
+                </a:p>
+              </p:txBody>
+            </p:sp>
+          </p:grpSp>
+          <p:sp>
+            <p:nvSpPr>
+              <p:cNvPr id="17" name="Flowchart: Collate 16">
+                <a:extLst>
+                  <a:ext uri="{FF2B5EF4-FFF2-40B4-BE49-F238E27FC236}">
+                    <a16:creationId xmlns:a16="http://schemas.microsoft.com/office/drawing/2014/main" id="{A6F7C469-3101-4616-B906-B6C1DB37A0CA}"/>
+                  </a:ext>
+                </a:extLst>
+              </p:cNvPr>
+              <p:cNvSpPr/>
+              <p:nvPr/>
+            </p:nvSpPr>
+            <p:spPr>
+              <a:xfrm rot="5400000">
+                <a:off x="6975572" y="2128892"/>
+                <a:ext cx="348019" cy="337690"/>
+              </a:xfrm>
+              <a:prstGeom prst="flowChartCollate">
+                <a:avLst/>
+              </a:prstGeom>
+              <a:solidFill>
+                <a:schemeClr val="tx1"/>
+              </a:solidFill>
+            </p:spPr>
+            <p:style>
+              <a:lnRef idx="2">
+                <a:schemeClr val="accent1">
+                  <a:shade val="50000"/>
+                </a:schemeClr>
+              </a:lnRef>
+              <a:fillRef idx="1">
+                <a:schemeClr val="accent1"/>
+              </a:fillRef>
+              <a:effectRef idx="0">
+                <a:schemeClr val="accent1"/>
+              </a:effectRef>
+              <a:fontRef idx="minor">
+                <a:schemeClr val="lt1"/>
+              </a:fontRef>
+            </p:style>
+            <p:txBody>
+              <a:bodyPr rtlCol="0" anchor="ctr"/>
+              <a:lstStyle/>
+              <a:p>
+                <a:pPr algn="ctr"/>
+                <a:endParaRPr lang="en-US">
+                  <a:solidFill>
+                    <a:schemeClr val="tx1"/>
+                  </a:solidFill>
+                </a:endParaRPr>
+              </a:p>
+            </p:txBody>
+          </p:sp>
+        </p:grpSp>
+        <p:cxnSp>
+          <p:nvCxnSpPr>
+            <p:cNvPr id="20" name="Straight Arrow Connector 19">
+              <a:extLst>
+                <a:ext uri="{FF2B5EF4-FFF2-40B4-BE49-F238E27FC236}">
+                  <a16:creationId xmlns:a16="http://schemas.microsoft.com/office/drawing/2014/main" id="{2EAEB633-AD3B-4774-857B-14D16A9FFFFA}"/>
+                </a:ext>
+              </a:extLst>
+            </p:cNvPr>
+            <p:cNvCxnSpPr/>
+            <p:nvPr/>
+          </p:nvCxnSpPr>
+          <p:spPr>
+            <a:xfrm>
+              <a:off x="6980736" y="943698"/>
+              <a:ext cx="168845" cy="1180029"/>
+            </a:xfrm>
+            <a:prstGeom prst="straightConnector1">
+              <a:avLst/>
+            </a:prstGeom>
+            <a:ln>
+              <a:tailEnd type="triangle"/>
+            </a:ln>
+          </p:spPr>
+          <p:style>
+            <a:lnRef idx="1">
+              <a:schemeClr val="accent1"/>
+            </a:lnRef>
+            <a:fillRef idx="0">
+              <a:schemeClr val="accent1"/>
+            </a:fillRef>
+            <a:effectRef idx="0">
+              <a:schemeClr val="accent1"/>
+            </a:effectRef>
+            <a:fontRef idx="minor">
+              <a:schemeClr val="tx1"/>
+            </a:fontRef>
+          </p:style>
+        </p:cxnSp>
+        <p:pic>
+          <p:nvPicPr>
+            <p:cNvPr id="22" name="Picture 21">
+              <a:extLst>
+                <a:ext uri="{FF2B5EF4-FFF2-40B4-BE49-F238E27FC236}">
+                  <a16:creationId xmlns:a16="http://schemas.microsoft.com/office/drawing/2014/main" id="{2DF6C5AC-B1B4-407B-B9B9-EB733CAAA1E2}"/>
+                </a:ext>
+              </a:extLst>
+            </p:cNvPr>
+            <p:cNvPicPr>
+              <a:picLocks noChangeAspect="1"/>
+            </p:cNvPicPr>
+            <p:nvPr>
+              <p:custDataLst>
+                <p:tags r:id="rId3"/>
+              </p:custDataLst>
+            </p:nvPr>
+          </p:nvPicPr>
+          <p:blipFill>
+            <a:blip r:embed="rId12">
+              <a:extLst>
+                <a:ext uri="{28A0092B-C50C-407E-A947-70E740481C1C}">
+                  <a14:useLocalDpi xmlns:a14="http://schemas.microsoft.com/office/drawing/2010/main" val="0"/>
+                </a:ext>
+              </a:extLst>
+            </a:blip>
+            <a:stretch>
+              <a:fillRect/>
+            </a:stretch>
+          </p:blipFill>
+          <p:spPr>
+            <a:xfrm>
+              <a:off x="6212736" y="741031"/>
+              <a:ext cx="1536000" cy="227048"/>
+            </a:xfrm>
+            <a:prstGeom prst="rect">
+              <a:avLst/>
+            </a:prstGeom>
+          </p:spPr>
+        </p:pic>
+        <p:cxnSp>
+          <p:nvCxnSpPr>
+            <p:cNvPr id="24" name="Straight Connector 23">
+              <a:extLst>
+                <a:ext uri="{FF2B5EF4-FFF2-40B4-BE49-F238E27FC236}">
+                  <a16:creationId xmlns:a16="http://schemas.microsoft.com/office/drawing/2014/main" id="{EC9A95D3-ABC9-441D-BFC1-D740F179A323}"/>
+                </a:ext>
+              </a:extLst>
+            </p:cNvPr>
+            <p:cNvCxnSpPr/>
+            <p:nvPr/>
+          </p:nvCxnSpPr>
+          <p:spPr>
+            <a:xfrm flipH="1">
+              <a:off x="7748736" y="4899546"/>
+              <a:ext cx="1556031" cy="0"/>
+            </a:xfrm>
+            <a:prstGeom prst="line">
+              <a:avLst/>
+            </a:prstGeom>
+            <a:ln>
+              <a:prstDash val="dash"/>
+            </a:ln>
+          </p:spPr>
+          <p:style>
+            <a:lnRef idx="1">
+              <a:schemeClr val="dk1"/>
+            </a:lnRef>
+            <a:fillRef idx="0">
+              <a:schemeClr val="dk1"/>
+            </a:fillRef>
+            <a:effectRef idx="0">
+              <a:schemeClr val="dk1"/>
+            </a:effectRef>
+            <a:fontRef idx="minor">
+              <a:schemeClr val="tx1"/>
+            </a:fontRef>
+          </p:style>
+        </p:cxnSp>
+        <p:cxnSp>
+          <p:nvCxnSpPr>
+            <p:cNvPr id="26" name="Straight Connector 25">
+              <a:extLst>
+                <a:ext uri="{FF2B5EF4-FFF2-40B4-BE49-F238E27FC236}">
+                  <a16:creationId xmlns:a16="http://schemas.microsoft.com/office/drawing/2014/main" id="{88A6A894-7F9A-4728-8974-BA074E17AB16}"/>
+                </a:ext>
+              </a:extLst>
+            </p:cNvPr>
+            <p:cNvCxnSpPr>
+              <a:cxnSpLocks/>
+            </p:cNvCxnSpPr>
+            <p:nvPr/>
+          </p:nvCxnSpPr>
+          <p:spPr>
+            <a:xfrm>
+              <a:off x="2904954" y="2471745"/>
+              <a:ext cx="6399813" cy="0"/>
+            </a:xfrm>
+            <a:prstGeom prst="line">
+              <a:avLst/>
+            </a:prstGeom>
+            <a:ln>
+              <a:prstDash val="dash"/>
+              <a:headEnd type="none" w="med" len="med"/>
+              <a:tailEnd type="none" w="med" len="med"/>
+            </a:ln>
+          </p:spPr>
+          <p:style>
+            <a:lnRef idx="1">
+              <a:schemeClr val="dk1"/>
+            </a:lnRef>
+            <a:fillRef idx="0">
+              <a:schemeClr val="dk1"/>
+            </a:fillRef>
+            <a:effectRef idx="0">
+              <a:schemeClr val="dk1"/>
+            </a:effectRef>
+            <a:fontRef idx="minor">
+              <a:schemeClr val="tx1"/>
+            </a:fontRef>
+          </p:style>
+        </p:cxnSp>
+        <p:cxnSp>
+          <p:nvCxnSpPr>
+            <p:cNvPr id="28" name="Straight Connector 27">
+              <a:extLst>
+                <a:ext uri="{FF2B5EF4-FFF2-40B4-BE49-F238E27FC236}">
+                  <a16:creationId xmlns:a16="http://schemas.microsoft.com/office/drawing/2014/main" id="{1730AB88-5838-4E51-A77D-67314297EFE2}"/>
+                </a:ext>
+              </a:extLst>
+            </p:cNvPr>
+            <p:cNvCxnSpPr>
+              <a:cxnSpLocks/>
+            </p:cNvCxnSpPr>
+            <p:nvPr/>
+          </p:nvCxnSpPr>
+          <p:spPr>
+            <a:xfrm>
+              <a:off x="8867945" y="2471745"/>
+              <a:ext cx="0" cy="2427801"/>
+            </a:xfrm>
+            <a:prstGeom prst="line">
+              <a:avLst/>
+            </a:prstGeom>
+            <a:ln w="28575">
+              <a:solidFill>
+                <a:schemeClr val="tx1"/>
+              </a:solidFill>
+            </a:ln>
+          </p:spPr>
+          <p:style>
+            <a:lnRef idx="1">
+              <a:schemeClr val="accent1"/>
+            </a:lnRef>
+            <a:fillRef idx="0">
+              <a:schemeClr val="accent1"/>
+            </a:fillRef>
+            <a:effectRef idx="0">
+              <a:schemeClr val="accent1"/>
+            </a:effectRef>
+            <a:fontRef idx="minor">
+              <a:schemeClr val="tx1"/>
+            </a:fontRef>
+          </p:style>
+        </p:cxnSp>
+        <p:cxnSp>
+          <p:nvCxnSpPr>
+            <p:cNvPr id="19" name="Straight Connector 18">
+              <a:extLst>
+                <a:ext uri="{FF2B5EF4-FFF2-40B4-BE49-F238E27FC236}">
+                  <a16:creationId xmlns:a16="http://schemas.microsoft.com/office/drawing/2014/main" id="{992C27B0-640C-4277-B32F-99A96F4ABDDF}"/>
+                </a:ext>
+              </a:extLst>
+            </p:cNvPr>
+            <p:cNvCxnSpPr/>
+            <p:nvPr/>
+          </p:nvCxnSpPr>
+          <p:spPr>
+            <a:xfrm flipH="1">
+              <a:off x="2904954" y="3152109"/>
+              <a:ext cx="1556031" cy="0"/>
+            </a:xfrm>
+            <a:prstGeom prst="line">
+              <a:avLst/>
+            </a:prstGeom>
+            <a:ln>
+              <a:prstDash val="dash"/>
+            </a:ln>
+          </p:spPr>
+          <p:style>
+            <a:lnRef idx="1">
+              <a:schemeClr val="dk1"/>
+            </a:lnRef>
+            <a:fillRef idx="0">
+              <a:schemeClr val="dk1"/>
+            </a:fillRef>
+            <a:effectRef idx="0">
+              <a:schemeClr val="dk1"/>
+            </a:effectRef>
+            <a:fontRef idx="minor">
+              <a:schemeClr val="tx1"/>
+            </a:fontRef>
+          </p:style>
+        </p:cxnSp>
+        <p:cxnSp>
+          <p:nvCxnSpPr>
+            <p:cNvPr id="21" name="Straight Connector 20">
+              <a:extLst>
+                <a:ext uri="{FF2B5EF4-FFF2-40B4-BE49-F238E27FC236}">
+                  <a16:creationId xmlns:a16="http://schemas.microsoft.com/office/drawing/2014/main" id="{5D27C4EA-1FA7-4EC0-B9EC-DBC5898D99B4}"/>
+                </a:ext>
+              </a:extLst>
+            </p:cNvPr>
+            <p:cNvCxnSpPr>
+              <a:cxnSpLocks/>
+            </p:cNvCxnSpPr>
+            <p:nvPr/>
+          </p:nvCxnSpPr>
+          <p:spPr>
+            <a:xfrm>
+              <a:off x="3263489" y="2471745"/>
+              <a:ext cx="0" cy="680364"/>
+            </a:xfrm>
+            <a:prstGeom prst="line">
+              <a:avLst/>
+            </a:prstGeom>
+            <a:ln w="28575">
+              <a:solidFill>
+                <a:schemeClr val="tx1"/>
+              </a:solidFill>
+            </a:ln>
+          </p:spPr>
+          <p:style>
+            <a:lnRef idx="1">
+              <a:schemeClr val="accent1"/>
+            </a:lnRef>
+            <a:fillRef idx="0">
+              <a:schemeClr val="accent1"/>
+            </a:fillRef>
+            <a:effectRef idx="0">
+              <a:schemeClr val="accent1"/>
+            </a:effectRef>
+            <a:fontRef idx="minor">
+              <a:schemeClr val="tx1"/>
+            </a:fontRef>
+          </p:style>
+        </p:cxnSp>
+        <p:pic>
+          <p:nvPicPr>
+            <p:cNvPr id="10" name="Picture 9">
+              <a:extLst>
+                <a:ext uri="{FF2B5EF4-FFF2-40B4-BE49-F238E27FC236}">
+                  <a16:creationId xmlns:a16="http://schemas.microsoft.com/office/drawing/2014/main" id="{3FA33312-4A25-4BE0-81D6-ED65B5A502D0}"/>
+                </a:ext>
+              </a:extLst>
+            </p:cNvPr>
+            <p:cNvPicPr>
+              <a:picLocks noChangeAspect="1"/>
+            </p:cNvPicPr>
+            <p:nvPr>
+              <p:custDataLst>
+                <p:tags r:id="rId4"/>
+              </p:custDataLst>
+            </p:nvPr>
+          </p:nvPicPr>
+          <p:blipFill>
+            <a:blip r:embed="rId13">
+              <a:extLst>
+                <a:ext uri="{28A0092B-C50C-407E-A947-70E740481C1C}">
+                  <a14:useLocalDpi xmlns:a14="http://schemas.microsoft.com/office/drawing/2010/main" val="0"/>
+                </a:ext>
+              </a:extLst>
+            </a:blip>
+            <a:stretch>
+              <a:fillRect/>
+            </a:stretch>
+          </p:blipFill>
+          <p:spPr>
+            <a:xfrm>
+              <a:off x="2528032" y="2707077"/>
+              <a:ext cx="556190" cy="175238"/>
+            </a:xfrm>
+            <a:prstGeom prst="rect">
+              <a:avLst/>
+            </a:prstGeom>
+          </p:spPr>
+        </p:pic>
+        <p:pic>
+          <p:nvPicPr>
+            <p:cNvPr id="14" name="Picture 13">
+              <a:extLst>
+                <a:ext uri="{FF2B5EF4-FFF2-40B4-BE49-F238E27FC236}">
+                  <a16:creationId xmlns:a16="http://schemas.microsoft.com/office/drawing/2014/main" id="{E31FA8D4-FA9B-4153-9CF9-19E4A88B8F05}"/>
+                </a:ext>
+              </a:extLst>
+            </p:cNvPr>
+            <p:cNvPicPr>
+              <a:picLocks noChangeAspect="1"/>
+            </p:cNvPicPr>
+            <p:nvPr>
+              <p:custDataLst>
+                <p:tags r:id="rId5"/>
+              </p:custDataLst>
+            </p:nvPr>
+          </p:nvPicPr>
+          <p:blipFill>
+            <a:blip r:embed="rId14">
+              <a:extLst>
+                <a:ext uri="{28A0092B-C50C-407E-A947-70E740481C1C}">
+                  <a14:useLocalDpi xmlns:a14="http://schemas.microsoft.com/office/drawing/2010/main" val="0"/>
+                </a:ext>
+              </a:extLst>
+            </a:blip>
+            <a:stretch>
+              <a:fillRect/>
+            </a:stretch>
+          </p:blipFill>
+          <p:spPr>
+            <a:xfrm>
+              <a:off x="2184588" y="4357149"/>
+              <a:ext cx="1979428" cy="178286"/>
+            </a:xfrm>
+            <a:prstGeom prst="rect">
+              <a:avLst/>
+            </a:prstGeom>
+          </p:spPr>
+        </p:pic>
+        <p:pic>
+          <p:nvPicPr>
+            <p:cNvPr id="27" name="Picture 26">
+              <a:extLst>
+                <a:ext uri="{FF2B5EF4-FFF2-40B4-BE49-F238E27FC236}">
+                  <a16:creationId xmlns:a16="http://schemas.microsoft.com/office/drawing/2014/main" id="{60BFCC72-8796-409F-A973-F0A2498F89AF}"/>
+                </a:ext>
+              </a:extLst>
+            </p:cNvPr>
+            <p:cNvPicPr>
+              <a:picLocks noChangeAspect="1"/>
+            </p:cNvPicPr>
+            <p:nvPr>
+              <p:custDataLst>
+                <p:tags r:id="rId6"/>
+              </p:custDataLst>
+            </p:nvPr>
+          </p:nvPicPr>
+          <p:blipFill>
+            <a:blip r:embed="rId15">
+              <a:extLst>
+                <a:ext uri="{28A0092B-C50C-407E-A947-70E740481C1C}">
+                  <a14:useLocalDpi xmlns:a14="http://schemas.microsoft.com/office/drawing/2010/main" val="0"/>
+                </a:ext>
+              </a:extLst>
+            </a:blip>
+            <a:stretch>
+              <a:fillRect/>
+            </a:stretch>
+          </p:blipFill>
+          <p:spPr>
+            <a:xfrm>
+              <a:off x="8706190" y="4906874"/>
+              <a:ext cx="1593905" cy="227048"/>
+            </a:xfrm>
+            <a:prstGeom prst="rect">
+              <a:avLst/>
+            </a:prstGeom>
+          </p:spPr>
+        </p:pic>
+        <p:pic>
+          <p:nvPicPr>
+            <p:cNvPr id="31" name="Picture 30">
+              <a:extLst>
+                <a:ext uri="{FF2B5EF4-FFF2-40B4-BE49-F238E27FC236}">
+                  <a16:creationId xmlns:a16="http://schemas.microsoft.com/office/drawing/2014/main" id="{59A864D7-8848-4E79-B7FA-26EFA8666736}"/>
+                </a:ext>
+              </a:extLst>
+            </p:cNvPr>
+            <p:cNvPicPr>
+              <a:picLocks noChangeAspect="1"/>
+            </p:cNvPicPr>
+            <p:nvPr>
+              <p:custDataLst>
+                <p:tags r:id="rId7"/>
+              </p:custDataLst>
+            </p:nvPr>
+          </p:nvPicPr>
+          <p:blipFill>
+            <a:blip r:embed="rId16">
+              <a:extLst>
+                <a:ext uri="{28A0092B-C50C-407E-A947-70E740481C1C}">
+                  <a14:useLocalDpi xmlns:a14="http://schemas.microsoft.com/office/drawing/2010/main" val="0"/>
+                </a:ext>
+              </a:extLst>
+            </a:blip>
+            <a:stretch>
+              <a:fillRect/>
+            </a:stretch>
+          </p:blipFill>
+          <p:spPr>
+            <a:xfrm>
+              <a:off x="7032267" y="3465981"/>
+              <a:ext cx="1398857" cy="227004"/>
+            </a:xfrm>
+            <a:prstGeom prst="rect">
+              <a:avLst/>
+            </a:prstGeom>
+          </p:spPr>
+        </p:pic>
+        <p:pic>
+          <p:nvPicPr>
+            <p:cNvPr id="33" name="Picture 32">
+              <a:extLst>
+                <a:ext uri="{FF2B5EF4-FFF2-40B4-BE49-F238E27FC236}">
+                  <a16:creationId xmlns:a16="http://schemas.microsoft.com/office/drawing/2014/main" id="{21CDB2BA-64D5-40A2-BE5C-775FF58267F8}"/>
+                </a:ext>
+              </a:extLst>
+            </p:cNvPr>
+            <p:cNvPicPr>
+              <a:picLocks noChangeAspect="1"/>
+            </p:cNvPicPr>
+            <p:nvPr>
+              <p:custDataLst>
+                <p:tags r:id="rId8"/>
+              </p:custDataLst>
+            </p:nvPr>
+          </p:nvPicPr>
+          <p:blipFill>
+            <a:blip r:embed="rId17">
+              <a:extLst>
+                <a:ext uri="{28A0092B-C50C-407E-A947-70E740481C1C}">
+                  <a14:useLocalDpi xmlns:a14="http://schemas.microsoft.com/office/drawing/2010/main" val="0"/>
+                </a:ext>
+              </a:extLst>
+            </a:blip>
+            <a:stretch>
+              <a:fillRect/>
+            </a:stretch>
+          </p:blipFill>
+          <p:spPr>
+            <a:xfrm>
+              <a:off x="8989380" y="3495908"/>
+              <a:ext cx="1464381" cy="213333"/>
+            </a:xfrm>
+            <a:prstGeom prst="rect">
+              <a:avLst/>
+            </a:prstGeom>
+          </p:spPr>
+        </p:pic>
+      </p:grpSp>
     </p:spTree>
     <p:extLst>
       <p:ext uri="{BB962C8B-B14F-4D97-AF65-F5344CB8AC3E}">
@@ -19569,31 +20470,474 @@
           </a:p>
         </p:txBody>
       </p:sp>
-      <p:sp>
-        <p:nvSpPr>
-          <p:cNvPr id="3" name="Content Placeholder 2">
+      <p:graphicFrame>
+        <p:nvGraphicFramePr>
+          <p:cNvPr id="4" name="Content Placeholder 3">
             <a:extLst>
               <a:ext uri="{FF2B5EF4-FFF2-40B4-BE49-F238E27FC236}">
-                <a16:creationId xmlns:a16="http://schemas.microsoft.com/office/drawing/2014/main" id="{C88DF3AD-E8BE-4E5F-B58E-C6994DE1AB69}"/>
+                <a16:creationId xmlns:a16="http://schemas.microsoft.com/office/drawing/2014/main" id="{CFB2F120-0D06-4B63-9072-ACA3D5C0B7C6}"/>
               </a:ext>
             </a:extLst>
           </p:cNvPr>
-          <p:cNvSpPr>
-            <a:spLocks noGrp="1"/>
-          </p:cNvSpPr>
+          <p:cNvGraphicFramePr>
+            <a:graphicFrameLocks noGrp="1"/>
+          </p:cNvGraphicFramePr>
           <p:nvPr>
             <p:ph idx="1"/>
+            <p:extLst>
+              <p:ext uri="{D42A27DB-BD31-4B8C-83A1-F6EECF244321}">
+                <p14:modId xmlns:p14="http://schemas.microsoft.com/office/powerpoint/2010/main" val="3627882380"/>
+              </p:ext>
+            </p:extLst>
           </p:nvPr>
-        </p:nvSpPr>
-        <p:spPr/>
-        <p:txBody>
-          <a:bodyPr/>
-          <a:lstStyle/>
-          <a:p>
-            <a:endParaRPr lang="en-US"/>
-          </a:p>
-        </p:txBody>
-      </p:sp>
+        </p:nvGraphicFramePr>
+        <p:xfrm>
+          <a:off x="838200" y="1825625"/>
+          <a:ext cx="10515600" cy="3749040"/>
+        </p:xfrm>
+        <a:graphic>
+          <a:graphicData uri="http://schemas.openxmlformats.org/drawingml/2006/table">
+            <a:tbl>
+              <a:tblPr firstRow="1" bandRow="1">
+                <a:tableStyleId>{5C22544A-7EE6-4342-B048-85BDC9FD1C3A}</a:tableStyleId>
+              </a:tblPr>
+              <a:tblGrid>
+                <a:gridCol w="1660301">
+                  <a:extLst>
+                    <a:ext uri="{9D8B030D-6E8A-4147-A177-3AD203B41FA5}">
+                      <a16:colId xmlns:a16="http://schemas.microsoft.com/office/drawing/2014/main" val="2533800480"/>
+                    </a:ext>
+                  </a:extLst>
+                </a:gridCol>
+                <a:gridCol w="2545939">
+                  <a:extLst>
+                    <a:ext uri="{9D8B030D-6E8A-4147-A177-3AD203B41FA5}">
+                      <a16:colId xmlns:a16="http://schemas.microsoft.com/office/drawing/2014/main" val="2944347849"/>
+                    </a:ext>
+                  </a:extLst>
+                </a:gridCol>
+                <a:gridCol w="2103120">
+                  <a:extLst>
+                    <a:ext uri="{9D8B030D-6E8A-4147-A177-3AD203B41FA5}">
+                      <a16:colId xmlns:a16="http://schemas.microsoft.com/office/drawing/2014/main" val="1876130703"/>
+                    </a:ext>
+                  </a:extLst>
+                </a:gridCol>
+                <a:gridCol w="2103120">
+                  <a:extLst>
+                    <a:ext uri="{9D8B030D-6E8A-4147-A177-3AD203B41FA5}">
+                      <a16:colId xmlns:a16="http://schemas.microsoft.com/office/drawing/2014/main" val="2321744013"/>
+                    </a:ext>
+                  </a:extLst>
+                </a:gridCol>
+                <a:gridCol w="2103120">
+                  <a:extLst>
+                    <a:ext uri="{9D8B030D-6E8A-4147-A177-3AD203B41FA5}">
+                      <a16:colId xmlns:a16="http://schemas.microsoft.com/office/drawing/2014/main" val="4137464316"/>
+                    </a:ext>
+                  </a:extLst>
+                </a:gridCol>
+              </a:tblGrid>
+              <a:tr h="370840">
+                <a:tc>
+                  <a:txBody>
+                    <a:bodyPr/>
+                    <a:lstStyle/>
+                    <a:p>
+                      <a:r>
+                        <a:rPr lang="en-US" dirty="0"/>
+                        <a:t>(feature)</a:t>
+                      </a:r>
+                    </a:p>
+                  </a:txBody>
+                  <a:tcPr/>
+                </a:tc>
+                <a:tc>
+                  <a:txBody>
+                    <a:bodyPr/>
+                    <a:lstStyle/>
+                    <a:p>
+                      <a:r>
+                        <a:rPr lang="en-US" dirty="0" err="1"/>
+                        <a:t>EStaRS</a:t>
+                      </a:r>
+                      <a:r>
+                        <a:rPr lang="en-US" dirty="0"/>
+                        <a:t> for </a:t>
+                      </a:r>
+                      <a:r>
+                        <a:rPr lang="en-US" dirty="0" err="1"/>
+                        <a:t>plantita</a:t>
+                      </a:r>
+                      <a:endParaRPr lang="en-US" dirty="0"/>
+                    </a:p>
+                  </a:txBody>
+                  <a:tcPr/>
+                </a:tc>
+                <a:tc>
+                  <a:txBody>
+                    <a:bodyPr/>
+                    <a:lstStyle/>
+                    <a:p>
+                      <a:r>
+                        <a:rPr lang="en-US" dirty="0" err="1"/>
+                        <a:t>EStaRS</a:t>
+                      </a:r>
+                      <a:r>
+                        <a:rPr lang="en-US" dirty="0"/>
+                        <a:t> “concrete”</a:t>
+                      </a:r>
+                    </a:p>
+                  </a:txBody>
+                  <a:tcPr/>
+                </a:tc>
+                <a:tc>
+                  <a:txBody>
+                    <a:bodyPr/>
+                    <a:lstStyle/>
+                    <a:p>
+                      <a:r>
+                        <a:rPr lang="en-US" dirty="0" err="1"/>
+                        <a:t>EStaRS</a:t>
+                      </a:r>
+                      <a:r>
+                        <a:rPr lang="en-US" dirty="0"/>
+                        <a:t> “Micky Mouse”</a:t>
+                      </a:r>
+                    </a:p>
+                  </a:txBody>
+                  <a:tcPr/>
+                </a:tc>
+                <a:tc>
+                  <a:txBody>
+                    <a:bodyPr/>
+                    <a:lstStyle/>
+                    <a:p>
+                      <a:r>
+                        <a:rPr lang="en-US" dirty="0" err="1"/>
+                        <a:t>OStaRS</a:t>
+                      </a:r>
+                      <a:endParaRPr lang="en-US" dirty="0"/>
+                    </a:p>
+                  </a:txBody>
+                  <a:tcPr/>
+                </a:tc>
+                <a:extLst>
+                  <a:ext uri="{0D108BD9-81ED-4DB2-BD59-A6C34878D82A}">
+                    <a16:rowId xmlns:a16="http://schemas.microsoft.com/office/drawing/2014/main" val="1387374077"/>
+                  </a:ext>
+                </a:extLst>
+              </a:tr>
+              <a:tr h="370840">
+                <a:tc>
+                  <a:txBody>
+                    <a:bodyPr/>
+                    <a:lstStyle/>
+                    <a:p>
+                      <a:r>
+                        <a:rPr lang="en-US" dirty="0"/>
+                        <a:t>Sand layer height</a:t>
+                      </a:r>
+                    </a:p>
+                  </a:txBody>
+                  <a:tcPr/>
+                </a:tc>
+                <a:tc>
+                  <a:txBody>
+                    <a:bodyPr/>
+                    <a:lstStyle/>
+                    <a:p>
+                      <a:r>
+                        <a:rPr lang="en-US" dirty="0"/>
+                        <a:t>15cm</a:t>
+                      </a:r>
+                    </a:p>
+                  </a:txBody>
+                  <a:tcPr/>
+                </a:tc>
+                <a:tc>
+                  <a:txBody>
+                    <a:bodyPr/>
+                    <a:lstStyle/>
+                    <a:p>
+                      <a:r>
+                        <a:rPr lang="en-US" dirty="0"/>
+                        <a:t>20cm</a:t>
+                      </a:r>
+                    </a:p>
+                  </a:txBody>
+                  <a:tcPr/>
+                </a:tc>
+                <a:tc>
+                  <a:txBody>
+                    <a:bodyPr/>
+                    <a:lstStyle/>
+                    <a:p>
+                      <a:r>
+                        <a:rPr lang="en-US" dirty="0"/>
+                        <a:t>20cm</a:t>
+                      </a:r>
+                    </a:p>
+                  </a:txBody>
+                  <a:tcPr/>
+                </a:tc>
+                <a:tc>
+                  <a:txBody>
+                    <a:bodyPr/>
+                    <a:lstStyle/>
+                    <a:p>
+                      <a:r>
+                        <a:rPr lang="en-US" dirty="0"/>
+                        <a:t>Function of trunk diameters, 20cm min</a:t>
+                      </a:r>
+                    </a:p>
+                  </a:txBody>
+                  <a:tcPr/>
+                </a:tc>
+                <a:extLst>
+                  <a:ext uri="{0D108BD9-81ED-4DB2-BD59-A6C34878D82A}">
+                    <a16:rowId xmlns:a16="http://schemas.microsoft.com/office/drawing/2014/main" val="3728123247"/>
+                  </a:ext>
+                </a:extLst>
+              </a:tr>
+              <a:tr h="370840">
+                <a:tc>
+                  <a:txBody>
+                    <a:bodyPr/>
+                    <a:lstStyle/>
+                    <a:p>
+                      <a:r>
+                        <a:rPr lang="en-US" dirty="0"/>
+                        <a:t>Signal for backwash</a:t>
+                      </a:r>
+                    </a:p>
+                  </a:txBody>
+                  <a:tcPr/>
+                </a:tc>
+                <a:tc>
+                  <a:txBody>
+                    <a:bodyPr/>
+                    <a:lstStyle/>
+                    <a:p>
+                      <a:r>
+                        <a:rPr lang="en-US" dirty="0"/>
+                        <a:t>60cm head loss</a:t>
+                      </a:r>
+                    </a:p>
+                  </a:txBody>
+                  <a:tcPr/>
+                </a:tc>
+                <a:tc>
+                  <a:txBody>
+                    <a:bodyPr/>
+                    <a:lstStyle/>
+                    <a:p>
+                      <a:r>
+                        <a:rPr lang="en-US" dirty="0"/>
+                        <a:t>75 cm head loss</a:t>
+                      </a:r>
+                    </a:p>
+                  </a:txBody>
+                  <a:tcPr/>
+                </a:tc>
+                <a:tc>
+                  <a:txBody>
+                    <a:bodyPr/>
+                    <a:lstStyle/>
+                    <a:p>
+                      <a:r>
+                        <a:rPr lang="en-US" dirty="0"/>
+                        <a:t>75 cm head loss</a:t>
+                      </a:r>
+                    </a:p>
+                  </a:txBody>
+                  <a:tcPr/>
+                </a:tc>
+                <a:tc>
+                  <a:txBody>
+                    <a:bodyPr/>
+                    <a:lstStyle/>
+                    <a:p>
+                      <a:r>
+                        <a:rPr lang="en-US" dirty="0"/>
+                        <a:t>80 cm head loss</a:t>
+                      </a:r>
+                    </a:p>
+                  </a:txBody>
+                  <a:tcPr/>
+                </a:tc>
+                <a:extLst>
+                  <a:ext uri="{0D108BD9-81ED-4DB2-BD59-A6C34878D82A}">
+                    <a16:rowId xmlns:a16="http://schemas.microsoft.com/office/drawing/2014/main" val="2964677717"/>
+                  </a:ext>
+                </a:extLst>
+              </a:tr>
+              <a:tr h="370840">
+                <a:tc>
+                  <a:txBody>
+                    <a:bodyPr/>
+                    <a:lstStyle/>
+                    <a:p>
+                      <a:r>
+                        <a:rPr lang="en-US" dirty="0"/>
+                        <a:t>Entrance tank material</a:t>
+                      </a:r>
+                    </a:p>
+                  </a:txBody>
+                  <a:tcPr/>
+                </a:tc>
+                <a:tc>
+                  <a:txBody>
+                    <a:bodyPr/>
+                    <a:lstStyle/>
+                    <a:p>
+                      <a:r>
+                        <a:rPr lang="en-US" dirty="0"/>
+                        <a:t>Concrete/PVC</a:t>
+                      </a:r>
+                    </a:p>
+                  </a:txBody>
+                  <a:tcPr/>
+                </a:tc>
+                <a:tc>
+                  <a:txBody>
+                    <a:bodyPr/>
+                    <a:lstStyle/>
+                    <a:p>
+                      <a:r>
+                        <a:rPr lang="en-US" dirty="0"/>
+                        <a:t>Concrete</a:t>
+                      </a:r>
+                    </a:p>
+                  </a:txBody>
+                  <a:tcPr/>
+                </a:tc>
+                <a:tc>
+                  <a:txBody>
+                    <a:bodyPr/>
+                    <a:lstStyle/>
+                    <a:p>
+                      <a:r>
+                        <a:rPr lang="en-US" dirty="0"/>
+                        <a:t>PVC</a:t>
+                      </a:r>
+                    </a:p>
+                  </a:txBody>
+                  <a:tcPr/>
+                </a:tc>
+                <a:tc>
+                  <a:txBody>
+                    <a:bodyPr/>
+                    <a:lstStyle/>
+                    <a:p>
+                      <a:r>
+                        <a:rPr lang="en-US" dirty="0"/>
+                        <a:t>Concrete</a:t>
+                      </a:r>
+                    </a:p>
+                  </a:txBody>
+                  <a:tcPr/>
+                </a:tc>
+                <a:extLst>
+                  <a:ext uri="{0D108BD9-81ED-4DB2-BD59-A6C34878D82A}">
+                    <a16:rowId xmlns:a16="http://schemas.microsoft.com/office/drawing/2014/main" val="2922214200"/>
+                  </a:ext>
+                </a:extLst>
+              </a:tr>
+              <a:tr h="370840">
+                <a:tc>
+                  <a:txBody>
+                    <a:bodyPr/>
+                    <a:lstStyle/>
+                    <a:p>
+                      <a:r>
+                        <a:rPr lang="en-US" dirty="0"/>
+                        <a:t>Acceptable flows per 1 filter (L/s)</a:t>
+                      </a:r>
+                    </a:p>
+                  </a:txBody>
+                  <a:tcPr/>
+                </a:tc>
+                <a:tc>
+                  <a:txBody>
+                    <a:bodyPr/>
+                    <a:lstStyle/>
+                    <a:p>
+                      <a:r>
+                        <a:rPr lang="en-US" dirty="0"/>
+                        <a:t>&lt;.75</a:t>
+                      </a:r>
+                    </a:p>
+                  </a:txBody>
+                  <a:tcPr/>
+                </a:tc>
+                <a:tc>
+                  <a:txBody>
+                    <a:bodyPr/>
+                    <a:lstStyle/>
+                    <a:p>
+                      <a:r>
+                        <a:rPr lang="en-US" sz="1800" b="0" i="0" kern="1200" dirty="0">
+                          <a:solidFill>
+                            <a:schemeClr val="dk1"/>
+                          </a:solidFill>
+                          <a:effectLst/>
+                          <a:latin typeface="+mn-lt"/>
+                          <a:ea typeface="+mn-ea"/>
+                          <a:cs typeface="+mn-cs"/>
+                        </a:rPr>
+                        <a:t>.764, 3.07,  7.024 </a:t>
+                      </a:r>
+                      <a:endParaRPr lang="en-US" dirty="0"/>
+                    </a:p>
+                  </a:txBody>
+                  <a:tcPr/>
+                </a:tc>
+                <a:tc>
+                  <a:txBody>
+                    <a:bodyPr/>
+                    <a:lstStyle/>
+                    <a:p>
+                      <a:r>
+                        <a:rPr lang="en-US" sz="1800" b="0" i="0" kern="1200" dirty="0">
+                          <a:solidFill>
+                            <a:schemeClr val="dk1"/>
+                          </a:solidFill>
+                          <a:effectLst/>
+                          <a:latin typeface="+mn-lt"/>
+                          <a:ea typeface="+mn-ea"/>
+                          <a:cs typeface="+mn-cs"/>
+                        </a:rPr>
+                        <a:t>.764, 3.07, 7.024</a:t>
+                      </a:r>
+                      <a:endParaRPr lang="en-US" dirty="0"/>
+                    </a:p>
+                  </a:txBody>
+                  <a:tcPr/>
+                </a:tc>
+                <a:tc>
+                  <a:txBody>
+                    <a:bodyPr/>
+                    <a:lstStyle/>
+                    <a:p>
+                      <a:r>
+                        <a:rPr lang="en-US" dirty="0"/>
+                        <a:t>&gt;8 </a:t>
+                      </a:r>
+                    </a:p>
+                  </a:txBody>
+                  <a:tcPr/>
+                </a:tc>
+                <a:extLst>
+                  <a:ext uri="{0D108BD9-81ED-4DB2-BD59-A6C34878D82A}">
+                    <a16:rowId xmlns:a16="http://schemas.microsoft.com/office/drawing/2014/main" val="1732536272"/>
+                  </a:ext>
+                </a:extLst>
+              </a:tr>
+            </a:tbl>
+          </a:graphicData>
+        </a:graphic>
+      </p:graphicFrame>
     </p:spTree>
     <p:extLst>
       <p:ext uri="{BB962C8B-B14F-4D97-AF65-F5344CB8AC3E}">
@@ -47086,6 +48430,139 @@
 </p:tagLst>
 </file>
 
+<file path=ppt/tags/tag83.xml><?xml version="1.0" encoding="utf-8"?>
+<p:tagLst xmlns:a="http://schemas.openxmlformats.org/drawingml/2006/main" xmlns:r="http://schemas.openxmlformats.org/officeDocument/2006/relationships" xmlns:p="http://schemas.openxmlformats.org/presentationml/2006/main">
+  <p:tag name="OUTPUTDPI" val="1200"/>
+  <p:tag name="ORIGINALHEIGHT" val="87.73905"/>
+  <p:tag name="ORIGINALWIDTH" val="862.3922"/>
+  <p:tag name="LATEXADDIN" val="\documentclass{article}&#10;\usepackage{amsmath}&#10;\usepackage{xcolor}&#10;\usepackage{ragged2e}&#10;\pagestyle{empty}&#10;\begin{document}&#10;&#10;\definecolor{Monred}{RGB}{172,0,0}&#10;&#10;$&#10;Entrance \ Tank&#10;$&#10;&#10;&#10;\end{document}"/>
+  <p:tag name="IGUANATEXSIZE" val="20"/>
+  <p:tag name="IGUANATEXCURSOR" val="171"/>
+  <p:tag name="TRANSPARENCY" val="True"/>
+  <p:tag name="FILENAME" val=""/>
+  <p:tag name="LATEXENGINEID" val="0"/>
+  <p:tag name="TEMPFOLDER" val="c:\temp\"/>
+  <p:tag name="LATEXFORMHEIGHT" val="312"/>
+  <p:tag name="LATEXFORMWIDTH" val="384"/>
+  <p:tag name="LATEXFORMWRAP" val="True"/>
+  <p:tag name="BITMAPVECTOR" val="0"/>
+</p:tagLst>
+</file>
+
+<file path=ppt/tags/tag84.xml><?xml version="1.0" encoding="utf-8"?>
+<p:tagLst xmlns:a="http://schemas.openxmlformats.org/drawingml/2006/main" xmlns:r="http://schemas.openxmlformats.org/officeDocument/2006/relationships" xmlns:p="http://schemas.openxmlformats.org/presentationml/2006/main">
+  <p:tag name="OUTPUTDPI" val="1200"/>
+  <p:tag name="ORIGINALHEIGHT" val="111.7361"/>
+  <p:tag name="ORIGINALWIDTH" val="665.9167"/>
+  <p:tag name="LATEXADDIN" val="\documentclass{article}&#10;\usepackage{amsmath}&#10;\usepackage{xcolor}&#10;\usepackage{ragged2e}&#10;\pagestyle{empty}&#10;\begin{document}&#10;&#10;\definecolor{Monred}{RGB}{172,0,0}&#10;&#10;$&#10;Filter \ Body&#10;$&#10;&#10;\end{document}"/>
+  <p:tag name="IGUANATEXSIZE" val="20"/>
+  <p:tag name="IGUANATEXCURSOR" val="160"/>
+  <p:tag name="TRANSPARENCY" val="True"/>
+  <p:tag name="FILENAME" val=""/>
+  <p:tag name="LATEXENGINEID" val="0"/>
+  <p:tag name="TEMPFOLDER" val="c:\temp\"/>
+  <p:tag name="LATEXFORMHEIGHT" val="312"/>
+  <p:tag name="LATEXFORMWIDTH" val="384"/>
+  <p:tag name="LATEXFORMWRAP" val="True"/>
+  <p:tag name="BITMAPVECTOR" val="0"/>
+</p:tagLst>
+</file>
+
+<file path=ppt/tags/tag85.xml><?xml version="1.0" encoding="utf-8"?>
+<p:tagLst xmlns:a="http://schemas.openxmlformats.org/drawingml/2006/main" xmlns:r="http://schemas.openxmlformats.org/officeDocument/2006/relationships" xmlns:p="http://schemas.openxmlformats.org/presentationml/2006/main">
+  <p:tag name="OUTPUTDPI" val="1200"/>
+  <p:tag name="ORIGINALHEIGHT" val="111.7361"/>
+  <p:tag name="ORIGINALWIDTH" val="755.9055"/>
+  <p:tag name="LATEXADDIN" val="\documentclass{article}&#10;\usepackage{amsmath}&#10;\usepackage{xcolor}&#10;\usepackage{ragged2e}&#10;\pagestyle{empty}&#10;\begin{document}&#10;&#10;\definecolor{Monred}{RGB}{172,0,0}&#10;$&#10;Siphon \ Valve&#10;$&#10;&#10;&#10;&#10;\end{document}"/>
+  <p:tag name="IGUANATEXSIZE" val="20"/>
+  <p:tag name="IGUANATEXCURSOR" val="176"/>
+  <p:tag name="TRANSPARENCY" val="True"/>
+  <p:tag name="FILENAME" val=""/>
+  <p:tag name="LATEXENGINEID" val="0"/>
+  <p:tag name="TEMPFOLDER" val="c:\temp\"/>
+  <p:tag name="LATEXFORMHEIGHT" val="312"/>
+  <p:tag name="LATEXFORMWIDTH" val="384"/>
+  <p:tag name="LATEXFORMWRAP" val="True"/>
+  <p:tag name="BITMAPVECTOR" val="0"/>
+</p:tagLst>
+</file>
+
+<file path=ppt/tags/tag86.xml><?xml version="1.0" encoding="utf-8"?>
+<p:tagLst xmlns:a="http://schemas.openxmlformats.org/drawingml/2006/main" xmlns:r="http://schemas.openxmlformats.org/officeDocument/2006/relationships" xmlns:p="http://schemas.openxmlformats.org/presentationml/2006/main">
+  <p:tag name="OUTPUTDPI" val="1200"/>
+  <p:tag name="ORIGINALHEIGHT" val="86.23921"/>
+  <p:tag name="ORIGINALWIDTH" val="273.7158"/>
+  <p:tag name="LATEXADDIN" val="\documentclass{article}&#10;\usepackage{amsmath}&#10;\usepackage{xcolor}&#10;\usepackage{ragged2e}&#10;\pagestyle{empty}&#10;\begin{document}&#10;&#10;\definecolor{Monred}{RGB}{172,0,0}&#10;&#10;$&#10;10cm&#10;$&#10;&#10;&#10;\end{document}"/>
+  <p:tag name="IGUANATEXSIZE" val="20"/>
+  <p:tag name="IGUANATEXCURSOR" val="167"/>
+  <p:tag name="TRANSPARENCY" val="True"/>
+  <p:tag name="FILENAME" val=""/>
+  <p:tag name="LATEXENGINEID" val="0"/>
+  <p:tag name="TEMPFOLDER" val="c:\temp\"/>
+  <p:tag name="LATEXFORMHEIGHT" val="312"/>
+  <p:tag name="LATEXFORMWIDTH" val="384"/>
+  <p:tag name="LATEXFORMWRAP" val="True"/>
+  <p:tag name="BITMAPVECTOR" val="0"/>
+</p:tagLst>
+</file>
+
+<file path=ppt/tags/tag87.xml><?xml version="1.0" encoding="utf-8"?>
+<p:tagLst xmlns:a="http://schemas.openxmlformats.org/drawingml/2006/main" xmlns:r="http://schemas.openxmlformats.org/officeDocument/2006/relationships" xmlns:p="http://schemas.openxmlformats.org/presentationml/2006/main">
+  <p:tag name="OUTPUTDPI" val="1200"/>
+  <p:tag name="ORIGINALHEIGHT" val="87.73905"/>
+  <p:tag name="ORIGINALWIDTH" val="974.1282"/>
+  <p:tag name="LATEXADDIN" val="\documentclass{article}&#10;\usepackage{amsmath}&#10;\usepackage{xcolor}&#10;\usepackage{ragged2e}&#10;\pagestyle{empty}&#10;\begin{document}&#10;&#10;\definecolor{Monred}{RGB}{172,0,0}&#10;&#10;$&#10;Backwash \ Trunk&#10;$&#10;&#10;&#10;\end{document}"/>
+  <p:tag name="IGUANATEXSIZE" val="20"/>
+  <p:tag name="IGUANATEXCURSOR" val="179"/>
+  <p:tag name="TRANSPARENCY" val="True"/>
+  <p:tag name="FILENAME" val=""/>
+  <p:tag name="LATEXENGINEID" val="0"/>
+  <p:tag name="TEMPFOLDER" val="c:\temp\"/>
+  <p:tag name="LATEXFORMHEIGHT" val="312"/>
+  <p:tag name="LATEXFORMWIDTH" val="384"/>
+  <p:tag name="LATEXFORMWRAP" val="True"/>
+  <p:tag name="BITMAPVECTOR" val="0"/>
+</p:tagLst>
+</file>
+
+<file path=ppt/tags/tag88.xml><?xml version="1.0" encoding="utf-8"?>
+<p:tagLst xmlns:a="http://schemas.openxmlformats.org/drawingml/2006/main" xmlns:r="http://schemas.openxmlformats.org/officeDocument/2006/relationships" xmlns:p="http://schemas.openxmlformats.org/presentationml/2006/main">
+  <p:tag name="OUTPUTDPI" val="1200"/>
+  <p:tag name="ORIGINALHEIGHT" val="111.7361"/>
+  <p:tag name="ORIGINALWIDTH" val="784.402"/>
+  <p:tag name="LATEXADDIN" val="\documentclass{article}&#10;\usepackage{amsmath}&#10;\usepackage{xcolor}&#10;\usepackage{ragged2e}&#10;\pagestyle{empty}&#10;\begin{document}&#10;&#10;\definecolor{Monred}{RGB}{172,0,0}&#10;&#10;$Siphon \ Outlet $&#10;&#10;&#10;&#10;\end{document}"/>
+  <p:tag name="IGUANATEXSIZE" val="20"/>
+  <p:tag name="IGUANATEXCURSOR" val="178"/>
+  <p:tag name="TRANSPARENCY" val="True"/>
+  <p:tag name="FILENAME" val=""/>
+  <p:tag name="LATEXENGINEID" val="0"/>
+  <p:tag name="TEMPFOLDER" val="c:\temp\"/>
+  <p:tag name="LATEXFORMHEIGHT" val="312"/>
+  <p:tag name="LATEXFORMWIDTH" val="384"/>
+  <p:tag name="LATEXFORMWRAP" val="True"/>
+  <p:tag name="BITMAPVECTOR" val="0"/>
+</p:tagLst>
+</file>
+
+<file path=ppt/tags/tag89.xml><?xml version="1.0" encoding="utf-8"?>
+<p:tagLst xmlns:a="http://schemas.openxmlformats.org/drawingml/2006/main" xmlns:r="http://schemas.openxmlformats.org/officeDocument/2006/relationships" xmlns:p="http://schemas.openxmlformats.org/presentationml/2006/main">
+  <p:tag name="OUTPUTDPI" val="1200"/>
+  <p:tag name="ORIGINALHEIGHT" val="111.7361"/>
+  <p:tag name="ORIGINALWIDTH" val="688.4139"/>
+  <p:tag name="LATEXADDIN" val="\documentclass{article}&#10;\usepackage{amsmath}&#10;\usepackage{xcolor}&#10;\usepackage{ragged2e}&#10;\pagestyle{empty}&#10;\begin{document}&#10;&#10;\definecolor{Monred}{RGB}{172,0,0}&#10;&#10;$Siphon \ Pipe $&#10;&#10;&#10;&#10;\end{document}"/>
+  <p:tag name="IGUANATEXSIZE" val="20"/>
+  <p:tag name="IGUANATEXCURSOR" val="173"/>
+  <p:tag name="TRANSPARENCY" val="True"/>
+  <p:tag name="FILENAME" val=""/>
+  <p:tag name="LATEXENGINEID" val="0"/>
+  <p:tag name="TEMPFOLDER" val="c:\temp\"/>
+  <p:tag name="LATEXFORMHEIGHT" val="312"/>
+  <p:tag name="LATEXFORMWIDTH" val="384"/>
+  <p:tag name="LATEXFORMWRAP" val="True"/>
+  <p:tag name="BITMAPVECTOR" val="0"/>
+</p:tagLst>
+</file>
+
 <file path=ppt/tags/tag9.xml><?xml version="1.0" encoding="utf-8"?>
 <p:tagLst xmlns:a="http://schemas.openxmlformats.org/drawingml/2006/main" xmlns:r="http://schemas.openxmlformats.org/officeDocument/2006/relationships" xmlns:p="http://schemas.openxmlformats.org/presentationml/2006/main">
   <p:tag name="OUTPUTDPI" val="1200"/>
@@ -47094,6 +48571,25 @@
   <p:tag name="LATEXADDIN" val="\documentclass{article}&#10;\usepackage{amsmath}&#10;\usepackage{xcolor}&#10;\pagestyle{empty}&#10;\begin{document}&#10;&#10;\definecolor{Monred}{RGB}{172,0,0}&#10;&#10;$$H_{W_2}$$&#10;&#10;&#10;\end{document}"/>
   <p:tag name="IGUANATEXSIZE" val="20"/>
   <p:tag name="IGUANATEXCURSOR" val="148"/>
+  <p:tag name="TRANSPARENCY" val="True"/>
+  <p:tag name="FILENAME" val=""/>
+  <p:tag name="LATEXENGINEID" val="0"/>
+  <p:tag name="TEMPFOLDER" val="c:\temp\"/>
+  <p:tag name="LATEXFORMHEIGHT" val="312"/>
+  <p:tag name="LATEXFORMWIDTH" val="384"/>
+  <p:tag name="LATEXFORMWRAP" val="True"/>
+  <p:tag name="BITMAPVECTOR" val="0"/>
+</p:tagLst>
+</file>
+
+<file path=ppt/tags/tag90.xml><?xml version="1.0" encoding="utf-8"?>
+<p:tagLst xmlns:a="http://schemas.openxmlformats.org/drawingml/2006/main" xmlns:r="http://schemas.openxmlformats.org/officeDocument/2006/relationships" xmlns:p="http://schemas.openxmlformats.org/presentationml/2006/main">
+  <p:tag name="OUTPUTDPI" val="1200"/>
+  <p:tag name="ORIGINALHEIGHT" val="104.9868"/>
+  <p:tag name="ORIGINALWIDTH" val="720.6599"/>
+  <p:tag name="LATEXADDIN" val="\documentclass{article}&#10;\usepackage{amsmath}&#10;\usepackage{xcolor}&#10;\usepackage{ragged2e}&#10;\pagestyle{empty}&#10;\begin{document}&#10;&#10;\definecolor{Monred}{RGB}{172,0,0}&#10;&#10;$&#10;HL_{BwTotalSS}&#10;$&#10;&#10;&#10;\end{document}"/>
+  <p:tag name="IGUANATEXSIZE" val="20"/>
+  <p:tag name="IGUANATEXCURSOR" val="177"/>
   <p:tag name="TRANSPARENCY" val="True"/>
   <p:tag name="FILENAME" val=""/>
   <p:tag name="LATEXENGINEID" val="0"/>

</xml_diff>

<commit_message>
table + images refs update
</commit_message>
<xml_diff>
--- a/ClareDiagrams.pptx
+++ b/ClareDiagrams.pptx
@@ -215,7 +215,7 @@
           <a:p>
             <a:fld id="{F874CE64-B02C-4A29-A5B8-BB55C61F4F91}" type="datetimeFigureOut">
               <a:rPr lang="en-US" smtClean="0"/>
-              <a:t>12/9/2018</a:t>
+              <a:t>12/10/2018</a:t>
             </a:fld>
             <a:endParaRPr lang="en-US"/>
           </a:p>
@@ -977,7 +977,7 @@
           <a:p>
             <a:fld id="{3721CA93-E140-4E2A-A30C-04BF0C6AAEA4}" type="datetimeFigureOut">
               <a:rPr lang="en-US" smtClean="0"/>
-              <a:t>12/9/2018</a:t>
+              <a:t>12/10/2018</a:t>
             </a:fld>
             <a:endParaRPr lang="en-US"/>
           </a:p>
@@ -1175,7 +1175,7 @@
           <a:p>
             <a:fld id="{3721CA93-E140-4E2A-A30C-04BF0C6AAEA4}" type="datetimeFigureOut">
               <a:rPr lang="en-US" smtClean="0"/>
-              <a:t>12/9/2018</a:t>
+              <a:t>12/10/2018</a:t>
             </a:fld>
             <a:endParaRPr lang="en-US"/>
           </a:p>
@@ -1383,7 +1383,7 @@
           <a:p>
             <a:fld id="{3721CA93-E140-4E2A-A30C-04BF0C6AAEA4}" type="datetimeFigureOut">
               <a:rPr lang="en-US" smtClean="0"/>
-              <a:t>12/9/2018</a:t>
+              <a:t>12/10/2018</a:t>
             </a:fld>
             <a:endParaRPr lang="en-US"/>
           </a:p>
@@ -1581,7 +1581,7 @@
           <a:p>
             <a:fld id="{3721CA93-E140-4E2A-A30C-04BF0C6AAEA4}" type="datetimeFigureOut">
               <a:rPr lang="en-US" smtClean="0"/>
-              <a:t>12/9/2018</a:t>
+              <a:t>12/10/2018</a:t>
             </a:fld>
             <a:endParaRPr lang="en-US"/>
           </a:p>
@@ -1856,7 +1856,7 @@
           <a:p>
             <a:fld id="{3721CA93-E140-4E2A-A30C-04BF0C6AAEA4}" type="datetimeFigureOut">
               <a:rPr lang="en-US" smtClean="0"/>
-              <a:t>12/9/2018</a:t>
+              <a:t>12/10/2018</a:t>
             </a:fld>
             <a:endParaRPr lang="en-US"/>
           </a:p>
@@ -2121,7 +2121,7 @@
           <a:p>
             <a:fld id="{3721CA93-E140-4E2A-A30C-04BF0C6AAEA4}" type="datetimeFigureOut">
               <a:rPr lang="en-US" smtClean="0"/>
-              <a:t>12/9/2018</a:t>
+              <a:t>12/10/2018</a:t>
             </a:fld>
             <a:endParaRPr lang="en-US"/>
           </a:p>
@@ -2533,7 +2533,7 @@
           <a:p>
             <a:fld id="{3721CA93-E140-4E2A-A30C-04BF0C6AAEA4}" type="datetimeFigureOut">
               <a:rPr lang="en-US" smtClean="0"/>
-              <a:t>12/9/2018</a:t>
+              <a:t>12/10/2018</a:t>
             </a:fld>
             <a:endParaRPr lang="en-US"/>
           </a:p>
@@ -2674,7 +2674,7 @@
           <a:p>
             <a:fld id="{3721CA93-E140-4E2A-A30C-04BF0C6AAEA4}" type="datetimeFigureOut">
               <a:rPr lang="en-US" smtClean="0"/>
-              <a:t>12/9/2018</a:t>
+              <a:t>12/10/2018</a:t>
             </a:fld>
             <a:endParaRPr lang="en-US"/>
           </a:p>
@@ -2787,7 +2787,7 @@
           <a:p>
             <a:fld id="{3721CA93-E140-4E2A-A30C-04BF0C6AAEA4}" type="datetimeFigureOut">
               <a:rPr lang="en-US" smtClean="0"/>
-              <a:t>12/9/2018</a:t>
+              <a:t>12/10/2018</a:t>
             </a:fld>
             <a:endParaRPr lang="en-US"/>
           </a:p>
@@ -3098,7 +3098,7 @@
           <a:p>
             <a:fld id="{3721CA93-E140-4E2A-A30C-04BF0C6AAEA4}" type="datetimeFigureOut">
               <a:rPr lang="en-US" smtClean="0"/>
-              <a:t>12/9/2018</a:t>
+              <a:t>12/10/2018</a:t>
             </a:fld>
             <a:endParaRPr lang="en-US"/>
           </a:p>
@@ -3386,7 +3386,7 @@
           <a:p>
             <a:fld id="{3721CA93-E140-4E2A-A30C-04BF0C6AAEA4}" type="datetimeFigureOut">
               <a:rPr lang="en-US" smtClean="0"/>
-              <a:t>12/9/2018</a:t>
+              <a:t>12/10/2018</a:t>
             </a:fld>
             <a:endParaRPr lang="en-US"/>
           </a:p>
@@ -3627,7 +3627,7 @@
           <a:p>
             <a:fld id="{3721CA93-E140-4E2A-A30C-04BF0C6AAEA4}" type="datetimeFigureOut">
               <a:rPr lang="en-US" smtClean="0"/>
-              <a:t>12/9/2018</a:t>
+              <a:t>12/10/2018</a:t>
             </a:fld>
             <a:endParaRPr lang="en-US"/>
           </a:p>
@@ -11416,683 +11416,6 @@
           <a:chExt cx="0" cy="0"/>
         </a:xfrm>
       </p:grpSpPr>
-      <p:sp>
-        <p:nvSpPr>
-          <p:cNvPr id="4" name="Oval 3">
-            <a:extLst>
-              <a:ext uri="{FF2B5EF4-FFF2-40B4-BE49-F238E27FC236}">
-                <a16:creationId xmlns:a16="http://schemas.microsoft.com/office/drawing/2014/main" id="{05A80D2C-F686-452A-94B9-D43C1315CEB7}"/>
-              </a:ext>
-            </a:extLst>
-          </p:cNvPr>
-          <p:cNvSpPr/>
-          <p:nvPr/>
-        </p:nvSpPr>
-        <p:spPr>
-          <a:xfrm>
-            <a:off x="2770495" y="641445"/>
-            <a:ext cx="5827594" cy="5827594"/>
-          </a:xfrm>
-          <a:prstGeom prst="ellipse">
-            <a:avLst/>
-          </a:prstGeom>
-          <a:noFill/>
-          <a:ln w="177800"/>
-        </p:spPr>
-        <p:style>
-          <a:lnRef idx="2">
-            <a:schemeClr val="accent1">
-              <a:shade val="50000"/>
-            </a:schemeClr>
-          </a:lnRef>
-          <a:fillRef idx="1">
-            <a:schemeClr val="accent1"/>
-          </a:fillRef>
-          <a:effectRef idx="0">
-            <a:schemeClr val="accent1"/>
-          </a:effectRef>
-          <a:fontRef idx="minor">
-            <a:schemeClr val="lt1"/>
-          </a:fontRef>
-        </p:style>
-        <p:txBody>
-          <a:bodyPr rtlCol="0" anchor="ctr"/>
-          <a:lstStyle/>
-          <a:p>
-            <a:pPr algn="ctr"/>
-            <a:endParaRPr lang="en-US" dirty="0"/>
-          </a:p>
-        </p:txBody>
-      </p:sp>
-      <p:grpSp>
-        <p:nvGrpSpPr>
-          <p:cNvPr id="17" name="Group 16">
-            <a:extLst>
-              <a:ext uri="{FF2B5EF4-FFF2-40B4-BE49-F238E27FC236}">
-                <a16:creationId xmlns:a16="http://schemas.microsoft.com/office/drawing/2014/main" id="{EA20FC53-BE08-4C9F-8902-1169CBC3DF5F}"/>
-              </a:ext>
-            </a:extLst>
-          </p:cNvPr>
-          <p:cNvGrpSpPr/>
-          <p:nvPr/>
-        </p:nvGrpSpPr>
-        <p:grpSpPr>
-          <a:xfrm>
-            <a:off x="3088944" y="832514"/>
-            <a:ext cx="6332561" cy="5432093"/>
-            <a:chOff x="3088944" y="832514"/>
-            <a:chExt cx="6332561" cy="5432093"/>
-          </a:xfrm>
-        </p:grpSpPr>
-        <p:grpSp>
-          <p:nvGrpSpPr>
-            <p:cNvPr id="10" name="Group 9">
-              <a:extLst>
-                <a:ext uri="{FF2B5EF4-FFF2-40B4-BE49-F238E27FC236}">
-                  <a16:creationId xmlns:a16="http://schemas.microsoft.com/office/drawing/2014/main" id="{673970CB-373E-4BE4-A258-FE6A5F8D6864}"/>
-                </a:ext>
-              </a:extLst>
-            </p:cNvPr>
-            <p:cNvGrpSpPr/>
-            <p:nvPr/>
-          </p:nvGrpSpPr>
-          <p:grpSpPr>
-            <a:xfrm>
-              <a:off x="3088944" y="1757292"/>
-              <a:ext cx="6332561" cy="3595900"/>
-              <a:chOff x="3088944" y="1637731"/>
-              <a:chExt cx="6332561" cy="3595900"/>
-            </a:xfrm>
-          </p:grpSpPr>
-          <p:sp>
-            <p:nvSpPr>
-              <p:cNvPr id="5" name="Rectangle: Rounded Corners 4">
-                <a:extLst>
-                  <a:ext uri="{FF2B5EF4-FFF2-40B4-BE49-F238E27FC236}">
-                    <a16:creationId xmlns:a16="http://schemas.microsoft.com/office/drawing/2014/main" id="{7542E908-9EE4-4A76-8565-068DDD7C2513}"/>
-                  </a:ext>
-                </a:extLst>
-              </p:cNvPr>
-              <p:cNvSpPr/>
-              <p:nvPr/>
-            </p:nvSpPr>
-            <p:spPr>
-              <a:xfrm>
-                <a:off x="3088944" y="3120219"/>
-                <a:ext cx="6332561" cy="617561"/>
-              </a:xfrm>
-              <a:prstGeom prst="roundRect">
-                <a:avLst/>
-              </a:prstGeom>
-            </p:spPr>
-            <p:style>
-              <a:lnRef idx="2">
-                <a:schemeClr val="accent1">
-                  <a:shade val="50000"/>
-                </a:schemeClr>
-              </a:lnRef>
-              <a:fillRef idx="1">
-                <a:schemeClr val="accent1"/>
-              </a:fillRef>
-              <a:effectRef idx="0">
-                <a:schemeClr val="accent1"/>
-              </a:effectRef>
-              <a:fontRef idx="minor">
-                <a:schemeClr val="lt1"/>
-              </a:fontRef>
-            </p:style>
-            <p:txBody>
-              <a:bodyPr rtlCol="0" anchor="ctr"/>
-              <a:lstStyle/>
-              <a:p>
-                <a:pPr algn="ctr"/>
-                <a:endParaRPr lang="en-US"/>
-              </a:p>
-            </p:txBody>
-          </p:sp>
-          <p:sp>
-            <p:nvSpPr>
-              <p:cNvPr id="6" name="Rectangle: Rounded Corners 5">
-                <a:extLst>
-                  <a:ext uri="{FF2B5EF4-FFF2-40B4-BE49-F238E27FC236}">
-                    <a16:creationId xmlns:a16="http://schemas.microsoft.com/office/drawing/2014/main" id="{C6F6FE84-0773-4ABC-AF15-F8ADC783DCA8}"/>
-                  </a:ext>
-                </a:extLst>
-              </p:cNvPr>
-              <p:cNvSpPr/>
-              <p:nvPr/>
-            </p:nvSpPr>
-            <p:spPr>
-              <a:xfrm>
-                <a:off x="3643952" y="1637731"/>
-                <a:ext cx="272955" cy="1482488"/>
-              </a:xfrm>
-              <a:prstGeom prst="roundRect">
-                <a:avLst/>
-              </a:prstGeom>
-            </p:spPr>
-            <p:style>
-              <a:lnRef idx="2">
-                <a:schemeClr val="accent1">
-                  <a:shade val="50000"/>
-                </a:schemeClr>
-              </a:lnRef>
-              <a:fillRef idx="1">
-                <a:schemeClr val="accent1"/>
-              </a:fillRef>
-              <a:effectRef idx="0">
-                <a:schemeClr val="accent1"/>
-              </a:effectRef>
-              <a:fontRef idx="minor">
-                <a:schemeClr val="lt1"/>
-              </a:fontRef>
-            </p:style>
-            <p:txBody>
-              <a:bodyPr rtlCol="0" anchor="ctr"/>
-              <a:lstStyle/>
-              <a:p>
-                <a:pPr algn="ctr"/>
-                <a:endParaRPr lang="en-US"/>
-              </a:p>
-            </p:txBody>
-          </p:sp>
-          <p:sp>
-            <p:nvSpPr>
-              <p:cNvPr id="7" name="Rectangle: Rounded Corners 6">
-                <a:extLst>
-                  <a:ext uri="{FF2B5EF4-FFF2-40B4-BE49-F238E27FC236}">
-                    <a16:creationId xmlns:a16="http://schemas.microsoft.com/office/drawing/2014/main" id="{9152B474-9D69-472C-B17B-1BB7BBA2671A}"/>
-                  </a:ext>
-                </a:extLst>
-              </p:cNvPr>
-              <p:cNvSpPr/>
-              <p:nvPr/>
-            </p:nvSpPr>
-            <p:spPr>
-              <a:xfrm>
-                <a:off x="3643952" y="3737780"/>
-                <a:ext cx="272955" cy="1482488"/>
-              </a:xfrm>
-              <a:prstGeom prst="roundRect">
-                <a:avLst/>
-              </a:prstGeom>
-            </p:spPr>
-            <p:style>
-              <a:lnRef idx="2">
-                <a:schemeClr val="accent1">
-                  <a:shade val="50000"/>
-                </a:schemeClr>
-              </a:lnRef>
-              <a:fillRef idx="1">
-                <a:schemeClr val="accent1"/>
-              </a:fillRef>
-              <a:effectRef idx="0">
-                <a:schemeClr val="accent1"/>
-              </a:effectRef>
-              <a:fontRef idx="minor">
-                <a:schemeClr val="lt1"/>
-              </a:fontRef>
-            </p:style>
-            <p:txBody>
-              <a:bodyPr rtlCol="0" anchor="ctr"/>
-              <a:lstStyle/>
-              <a:p>
-                <a:pPr algn="ctr"/>
-                <a:endParaRPr lang="en-US"/>
-              </a:p>
-            </p:txBody>
-          </p:sp>
-          <p:sp>
-            <p:nvSpPr>
-              <p:cNvPr id="8" name="Rectangle: Rounded Corners 7">
-                <a:extLst>
-                  <a:ext uri="{FF2B5EF4-FFF2-40B4-BE49-F238E27FC236}">
-                    <a16:creationId xmlns:a16="http://schemas.microsoft.com/office/drawing/2014/main" id="{EB4C9D2B-AEB1-48B1-8FBC-085EF4B9E803}"/>
-                  </a:ext>
-                </a:extLst>
-              </p:cNvPr>
-              <p:cNvSpPr/>
-              <p:nvPr/>
-            </p:nvSpPr>
-            <p:spPr>
-              <a:xfrm>
-                <a:off x="7444854" y="3751143"/>
-                <a:ext cx="272955" cy="1482488"/>
-              </a:xfrm>
-              <a:prstGeom prst="roundRect">
-                <a:avLst/>
-              </a:prstGeom>
-            </p:spPr>
-            <p:style>
-              <a:lnRef idx="2">
-                <a:schemeClr val="accent1">
-                  <a:shade val="50000"/>
-                </a:schemeClr>
-              </a:lnRef>
-              <a:fillRef idx="1">
-                <a:schemeClr val="accent1"/>
-              </a:fillRef>
-              <a:effectRef idx="0">
-                <a:schemeClr val="accent1"/>
-              </a:effectRef>
-              <a:fontRef idx="minor">
-                <a:schemeClr val="lt1"/>
-              </a:fontRef>
-            </p:style>
-            <p:txBody>
-              <a:bodyPr rtlCol="0" anchor="ctr"/>
-              <a:lstStyle/>
-              <a:p>
-                <a:pPr algn="ctr"/>
-                <a:endParaRPr lang="en-US"/>
-              </a:p>
-            </p:txBody>
-          </p:sp>
-          <p:sp>
-            <p:nvSpPr>
-              <p:cNvPr id="9" name="Rectangle: Rounded Corners 8">
-                <a:extLst>
-                  <a:ext uri="{FF2B5EF4-FFF2-40B4-BE49-F238E27FC236}">
-                    <a16:creationId xmlns:a16="http://schemas.microsoft.com/office/drawing/2014/main" id="{C00468EF-DFE0-4035-992E-C959519F7252}"/>
-                  </a:ext>
-                </a:extLst>
-              </p:cNvPr>
-              <p:cNvSpPr/>
-              <p:nvPr/>
-            </p:nvSpPr>
-            <p:spPr>
-              <a:xfrm>
-                <a:off x="7444854" y="1637731"/>
-                <a:ext cx="272955" cy="1482488"/>
-              </a:xfrm>
-              <a:prstGeom prst="roundRect">
-                <a:avLst/>
-              </a:prstGeom>
-            </p:spPr>
-            <p:style>
-              <a:lnRef idx="2">
-                <a:schemeClr val="accent1">
-                  <a:shade val="50000"/>
-                </a:schemeClr>
-              </a:lnRef>
-              <a:fillRef idx="1">
-                <a:schemeClr val="accent1"/>
-              </a:fillRef>
-              <a:effectRef idx="0">
-                <a:schemeClr val="accent1"/>
-              </a:effectRef>
-              <a:fontRef idx="minor">
-                <a:schemeClr val="lt1"/>
-              </a:fontRef>
-            </p:style>
-            <p:txBody>
-              <a:bodyPr rtlCol="0" anchor="ctr"/>
-              <a:lstStyle/>
-              <a:p>
-                <a:pPr algn="ctr"/>
-                <a:endParaRPr lang="en-US"/>
-              </a:p>
-            </p:txBody>
-          </p:sp>
-        </p:grpSp>
-        <p:sp>
-          <p:nvSpPr>
-            <p:cNvPr id="11" name="Rectangle: Rounded Corners 10">
-              <a:extLst>
-                <a:ext uri="{FF2B5EF4-FFF2-40B4-BE49-F238E27FC236}">
-                  <a16:creationId xmlns:a16="http://schemas.microsoft.com/office/drawing/2014/main" id="{814598F1-F464-4CFE-AB00-5304FEE6F3C7}"/>
-                </a:ext>
-              </a:extLst>
-            </p:cNvPr>
-            <p:cNvSpPr/>
-            <p:nvPr/>
-          </p:nvSpPr>
-          <p:spPr>
-            <a:xfrm>
-              <a:off x="5547815" y="832514"/>
-              <a:ext cx="269544" cy="2407266"/>
-            </a:xfrm>
-            <a:prstGeom prst="roundRect">
-              <a:avLst/>
-            </a:prstGeom>
-          </p:spPr>
-          <p:style>
-            <a:lnRef idx="2">
-              <a:schemeClr val="accent1">
-                <a:shade val="50000"/>
-              </a:schemeClr>
-            </a:lnRef>
-            <a:fillRef idx="1">
-              <a:schemeClr val="accent1"/>
-            </a:fillRef>
-            <a:effectRef idx="0">
-              <a:schemeClr val="accent1"/>
-            </a:effectRef>
-            <a:fontRef idx="minor">
-              <a:schemeClr val="lt1"/>
-            </a:fontRef>
-          </p:style>
-          <p:txBody>
-            <a:bodyPr rtlCol="0" anchor="ctr"/>
-            <a:lstStyle/>
-            <a:p>
-              <a:pPr algn="ctr"/>
-              <a:endParaRPr lang="en-US"/>
-            </a:p>
-          </p:txBody>
-        </p:sp>
-        <p:sp>
-          <p:nvSpPr>
-            <p:cNvPr id="12" name="Rectangle: Rounded Corners 11">
-              <a:extLst>
-                <a:ext uri="{FF2B5EF4-FFF2-40B4-BE49-F238E27FC236}">
-                  <a16:creationId xmlns:a16="http://schemas.microsoft.com/office/drawing/2014/main" id="{572F0968-74E0-4972-B569-5D7067FD2425}"/>
-                </a:ext>
-              </a:extLst>
-            </p:cNvPr>
-            <p:cNvSpPr/>
-            <p:nvPr/>
-          </p:nvSpPr>
-          <p:spPr>
-            <a:xfrm>
-              <a:off x="5544403" y="3870704"/>
-              <a:ext cx="272955" cy="2393903"/>
-            </a:xfrm>
-            <a:prstGeom prst="roundRect">
-              <a:avLst/>
-            </a:prstGeom>
-          </p:spPr>
-          <p:style>
-            <a:lnRef idx="2">
-              <a:schemeClr val="accent1">
-                <a:shade val="50000"/>
-              </a:schemeClr>
-            </a:lnRef>
-            <a:fillRef idx="1">
-              <a:schemeClr val="accent1"/>
-            </a:fillRef>
-            <a:effectRef idx="0">
-              <a:schemeClr val="accent1"/>
-            </a:effectRef>
-            <a:fontRef idx="minor">
-              <a:schemeClr val="lt1"/>
-            </a:fontRef>
-          </p:style>
-          <p:txBody>
-            <a:bodyPr rtlCol="0" anchor="ctr"/>
-            <a:lstStyle/>
-            <a:p>
-              <a:pPr algn="ctr"/>
-              <a:endParaRPr lang="en-US"/>
-            </a:p>
-          </p:txBody>
-        </p:sp>
-        <p:sp>
-          <p:nvSpPr>
-            <p:cNvPr id="13" name="Rectangle: Rounded Corners 12">
-              <a:extLst>
-                <a:ext uri="{FF2B5EF4-FFF2-40B4-BE49-F238E27FC236}">
-                  <a16:creationId xmlns:a16="http://schemas.microsoft.com/office/drawing/2014/main" id="{489A880E-6D2C-44F1-8C28-B0159086EF42}"/>
-                </a:ext>
-              </a:extLst>
-            </p:cNvPr>
-            <p:cNvSpPr/>
-            <p:nvPr/>
-          </p:nvSpPr>
-          <p:spPr>
-            <a:xfrm>
-              <a:off x="6496334" y="1064525"/>
-              <a:ext cx="272955" cy="2175255"/>
-            </a:xfrm>
-            <a:prstGeom prst="roundRect">
-              <a:avLst/>
-            </a:prstGeom>
-          </p:spPr>
-          <p:style>
-            <a:lnRef idx="2">
-              <a:schemeClr val="accent1">
-                <a:shade val="50000"/>
-              </a:schemeClr>
-            </a:lnRef>
-            <a:fillRef idx="1">
-              <a:schemeClr val="accent1"/>
-            </a:fillRef>
-            <a:effectRef idx="0">
-              <a:schemeClr val="accent1"/>
-            </a:effectRef>
-            <a:fontRef idx="minor">
-              <a:schemeClr val="lt1"/>
-            </a:fontRef>
-          </p:style>
-          <p:txBody>
-            <a:bodyPr rtlCol="0" anchor="ctr"/>
-            <a:lstStyle/>
-            <a:p>
-              <a:pPr algn="ctr"/>
-              <a:endParaRPr lang="en-US"/>
-            </a:p>
-          </p:txBody>
-        </p:sp>
-        <p:sp>
-          <p:nvSpPr>
-            <p:cNvPr id="14" name="Rectangle: Rounded Corners 13">
-              <a:extLst>
-                <a:ext uri="{FF2B5EF4-FFF2-40B4-BE49-F238E27FC236}">
-                  <a16:creationId xmlns:a16="http://schemas.microsoft.com/office/drawing/2014/main" id="{C6FB79E8-B244-4967-940A-3E49D706CAD4}"/>
-                </a:ext>
-              </a:extLst>
-            </p:cNvPr>
-            <p:cNvSpPr/>
-            <p:nvPr/>
-          </p:nvSpPr>
-          <p:spPr>
-            <a:xfrm>
-              <a:off x="6523630" y="3870704"/>
-              <a:ext cx="272955" cy="2175255"/>
-            </a:xfrm>
-            <a:prstGeom prst="roundRect">
-              <a:avLst/>
-            </a:prstGeom>
-          </p:spPr>
-          <p:style>
-            <a:lnRef idx="2">
-              <a:schemeClr val="accent1">
-                <a:shade val="50000"/>
-              </a:schemeClr>
-            </a:lnRef>
-            <a:fillRef idx="1">
-              <a:schemeClr val="accent1"/>
-            </a:fillRef>
-            <a:effectRef idx="0">
-              <a:schemeClr val="accent1"/>
-            </a:effectRef>
-            <a:fontRef idx="minor">
-              <a:schemeClr val="lt1"/>
-            </a:fontRef>
-          </p:style>
-          <p:txBody>
-            <a:bodyPr rtlCol="0" anchor="ctr"/>
-            <a:lstStyle/>
-            <a:p>
-              <a:pPr algn="ctr"/>
-              <a:endParaRPr lang="en-US"/>
-            </a:p>
-          </p:txBody>
-        </p:sp>
-        <p:sp>
-          <p:nvSpPr>
-            <p:cNvPr id="15" name="Rectangle: Rounded Corners 14">
-              <a:extLst>
-                <a:ext uri="{FF2B5EF4-FFF2-40B4-BE49-F238E27FC236}">
-                  <a16:creationId xmlns:a16="http://schemas.microsoft.com/office/drawing/2014/main" id="{1265EE2B-16CA-4C0F-8721-4D4F8786DA8B}"/>
-                </a:ext>
-              </a:extLst>
-            </p:cNvPr>
-            <p:cNvSpPr/>
-            <p:nvPr/>
-          </p:nvSpPr>
-          <p:spPr>
-            <a:xfrm>
-              <a:off x="4618628" y="3870704"/>
-              <a:ext cx="272955" cy="2175255"/>
-            </a:xfrm>
-            <a:prstGeom prst="roundRect">
-              <a:avLst/>
-            </a:prstGeom>
-          </p:spPr>
-          <p:style>
-            <a:lnRef idx="2">
-              <a:schemeClr val="accent1">
-                <a:shade val="50000"/>
-              </a:schemeClr>
-            </a:lnRef>
-            <a:fillRef idx="1">
-              <a:schemeClr val="accent1"/>
-            </a:fillRef>
-            <a:effectRef idx="0">
-              <a:schemeClr val="accent1"/>
-            </a:effectRef>
-            <a:fontRef idx="minor">
-              <a:schemeClr val="lt1"/>
-            </a:fontRef>
-          </p:style>
-          <p:txBody>
-            <a:bodyPr rtlCol="0" anchor="ctr"/>
-            <a:lstStyle/>
-            <a:p>
-              <a:pPr algn="ctr"/>
-              <a:endParaRPr lang="en-US"/>
-            </a:p>
-          </p:txBody>
-        </p:sp>
-        <p:sp>
-          <p:nvSpPr>
-            <p:cNvPr id="16" name="Rectangle: Rounded Corners 15">
-              <a:extLst>
-                <a:ext uri="{FF2B5EF4-FFF2-40B4-BE49-F238E27FC236}">
-                  <a16:creationId xmlns:a16="http://schemas.microsoft.com/office/drawing/2014/main" id="{A1FB36C2-31CA-40C7-AFB8-E292CFF1A055}"/>
-                </a:ext>
-              </a:extLst>
-            </p:cNvPr>
-            <p:cNvSpPr/>
-            <p:nvPr/>
-          </p:nvSpPr>
-          <p:spPr>
-            <a:xfrm>
-              <a:off x="4618629" y="1064525"/>
-              <a:ext cx="272955" cy="2175255"/>
-            </a:xfrm>
-            <a:prstGeom prst="roundRect">
-              <a:avLst/>
-            </a:prstGeom>
-          </p:spPr>
-          <p:style>
-            <a:lnRef idx="2">
-              <a:schemeClr val="accent1">
-                <a:shade val="50000"/>
-              </a:schemeClr>
-            </a:lnRef>
-            <a:fillRef idx="1">
-              <a:schemeClr val="accent1"/>
-            </a:fillRef>
-            <a:effectRef idx="0">
-              <a:schemeClr val="accent1"/>
-            </a:effectRef>
-            <a:fontRef idx="minor">
-              <a:schemeClr val="lt1"/>
-            </a:fontRef>
-          </p:style>
-          <p:txBody>
-            <a:bodyPr rtlCol="0" anchor="ctr"/>
-            <a:lstStyle/>
-            <a:p>
-              <a:pPr algn="ctr"/>
-              <a:endParaRPr lang="en-US"/>
-            </a:p>
-          </p:txBody>
-        </p:sp>
-      </p:grpSp>
-      <p:cxnSp>
-        <p:nvCxnSpPr>
-          <p:cNvPr id="19" name="Straight Arrow Connector 18">
-            <a:extLst>
-              <a:ext uri="{FF2B5EF4-FFF2-40B4-BE49-F238E27FC236}">
-                <a16:creationId xmlns:a16="http://schemas.microsoft.com/office/drawing/2014/main" id="{3607274D-E30D-4C74-A103-DDB133B12CAE}"/>
-              </a:ext>
-            </a:extLst>
-          </p:cNvPr>
-          <p:cNvCxnSpPr>
-            <a:cxnSpLocks/>
-            <a:stCxn id="16" idx="3"/>
-          </p:cNvCxnSpPr>
-          <p:nvPr/>
-        </p:nvCxnSpPr>
-        <p:spPr>
-          <a:xfrm>
-            <a:off x="4891584" y="2152153"/>
-            <a:ext cx="652819" cy="0"/>
-          </a:xfrm>
-          <a:prstGeom prst="straightConnector1">
-            <a:avLst/>
-          </a:prstGeom>
-          <a:ln>
-            <a:headEnd type="triangle"/>
-            <a:tailEnd type="triangle"/>
-          </a:ln>
-        </p:spPr>
-        <p:style>
-          <a:lnRef idx="1">
-            <a:schemeClr val="accent1"/>
-          </a:lnRef>
-          <a:fillRef idx="0">
-            <a:schemeClr val="accent1"/>
-          </a:fillRef>
-          <a:effectRef idx="0">
-            <a:schemeClr val="accent1"/>
-          </a:effectRef>
-          <a:fontRef idx="minor">
-            <a:schemeClr val="tx1"/>
-          </a:fontRef>
-        </p:style>
-      </p:cxnSp>
-      <p:cxnSp>
-        <p:nvCxnSpPr>
-          <p:cNvPr id="22" name="Straight Connector 21">
-            <a:extLst>
-              <a:ext uri="{FF2B5EF4-FFF2-40B4-BE49-F238E27FC236}">
-                <a16:creationId xmlns:a16="http://schemas.microsoft.com/office/drawing/2014/main" id="{3C77BCC9-7876-431C-A039-9DD222885DAF}"/>
-              </a:ext>
-            </a:extLst>
-          </p:cNvPr>
-          <p:cNvCxnSpPr>
-            <a:cxnSpLocks/>
-          </p:cNvCxnSpPr>
-          <p:nvPr/>
-        </p:nvCxnSpPr>
-        <p:spPr>
-          <a:xfrm flipH="1">
-            <a:off x="460612" y="545911"/>
-            <a:ext cx="5356746" cy="0"/>
-          </a:xfrm>
-          <a:prstGeom prst="line">
-            <a:avLst/>
-          </a:prstGeom>
-        </p:spPr>
-        <p:style>
-          <a:lnRef idx="1">
-            <a:schemeClr val="accent1"/>
-          </a:lnRef>
-          <a:fillRef idx="0">
-            <a:schemeClr val="accent1"/>
-          </a:fillRef>
-          <a:effectRef idx="0">
-            <a:schemeClr val="accent1"/>
-          </a:effectRef>
-          <a:fontRef idx="minor">
-            <a:schemeClr val="tx1"/>
-          </a:fontRef>
-        </p:style>
-      </p:cxnSp>
       <p:cxnSp>
         <p:nvCxnSpPr>
           <p:cNvPr id="23" name="Straight Connector 22">
@@ -12171,280 +11494,1079 @@
           </a:fontRef>
         </p:style>
       </p:cxnSp>
-      <p:cxnSp>
-        <p:nvCxnSpPr>
-          <p:cNvPr id="27" name="Straight Connector 26">
+      <p:grpSp>
+        <p:nvGrpSpPr>
+          <p:cNvPr id="24" name="Group 23">
             <a:extLst>
               <a:ext uri="{FF2B5EF4-FFF2-40B4-BE49-F238E27FC236}">
-                <a16:creationId xmlns:a16="http://schemas.microsoft.com/office/drawing/2014/main" id="{82793B80-2777-457F-B0A8-77D4E134A638}"/>
+                <a16:creationId xmlns:a16="http://schemas.microsoft.com/office/drawing/2014/main" id="{3AE4B87A-04D3-43AB-8797-E787EF77354D}"/>
               </a:ext>
             </a:extLst>
           </p:cNvPr>
-          <p:cNvCxnSpPr>
-            <a:cxnSpLocks/>
-          </p:cNvCxnSpPr>
+          <p:cNvGrpSpPr/>
           <p:nvPr/>
-        </p:nvCxnSpPr>
-        <p:spPr>
-          <a:xfrm flipH="1">
-            <a:off x="1695450" y="727170"/>
-            <a:ext cx="4121908" cy="0"/>
+        </p:nvGrpSpPr>
+        <p:grpSpPr>
+          <a:xfrm>
+            <a:off x="1572797" y="186292"/>
+            <a:ext cx="9046405" cy="6391032"/>
+            <a:chOff x="421161" y="78007"/>
+            <a:chExt cx="9046405" cy="6391032"/>
           </a:xfrm>
-          <a:prstGeom prst="line">
-            <a:avLst/>
-          </a:prstGeom>
-        </p:spPr>
-        <p:style>
-          <a:lnRef idx="1">
-            <a:schemeClr val="accent1"/>
-          </a:lnRef>
-          <a:fillRef idx="0">
-            <a:schemeClr val="accent1"/>
-          </a:fillRef>
-          <a:effectRef idx="0">
-            <a:schemeClr val="accent1"/>
-          </a:effectRef>
-          <a:fontRef idx="minor">
-            <a:schemeClr val="tx1"/>
-          </a:fontRef>
-        </p:style>
-      </p:cxnSp>
-      <p:cxnSp>
-        <p:nvCxnSpPr>
-          <p:cNvPr id="29" name="Straight Connector 28">
-            <a:extLst>
-              <a:ext uri="{FF2B5EF4-FFF2-40B4-BE49-F238E27FC236}">
-                <a16:creationId xmlns:a16="http://schemas.microsoft.com/office/drawing/2014/main" id="{64A5F1E0-8A2D-40A0-AEFF-E0C4FA005B74}"/>
-              </a:ext>
-            </a:extLst>
-          </p:cNvPr>
-          <p:cNvCxnSpPr>
-            <a:cxnSpLocks/>
-          </p:cNvCxnSpPr>
-          <p:nvPr/>
-        </p:nvCxnSpPr>
-        <p:spPr>
-          <a:xfrm flipH="1">
-            <a:off x="1645409" y="6374836"/>
-            <a:ext cx="4121908" cy="0"/>
-          </a:xfrm>
-          <a:prstGeom prst="line">
-            <a:avLst/>
-          </a:prstGeom>
-        </p:spPr>
-        <p:style>
-          <a:lnRef idx="1">
-            <a:schemeClr val="accent1"/>
-          </a:lnRef>
-          <a:fillRef idx="0">
-            <a:schemeClr val="accent1"/>
-          </a:fillRef>
-          <a:effectRef idx="0">
-            <a:schemeClr val="accent1"/>
-          </a:effectRef>
-          <a:fontRef idx="minor">
-            <a:schemeClr val="tx1"/>
-          </a:fontRef>
-        </p:style>
-      </p:cxnSp>
-      <p:cxnSp>
-        <p:nvCxnSpPr>
-          <p:cNvPr id="31" name="Straight Arrow Connector 30">
-            <a:extLst>
-              <a:ext uri="{FF2B5EF4-FFF2-40B4-BE49-F238E27FC236}">
-                <a16:creationId xmlns:a16="http://schemas.microsoft.com/office/drawing/2014/main" id="{81E8B011-AD7D-4FCA-B6C8-4C060166AD1D}"/>
-              </a:ext>
-            </a:extLst>
-          </p:cNvPr>
-          <p:cNvCxnSpPr>
-            <a:cxnSpLocks/>
-          </p:cNvCxnSpPr>
-          <p:nvPr/>
-        </p:nvCxnSpPr>
-        <p:spPr>
-          <a:xfrm>
-            <a:off x="1695450" y="727170"/>
-            <a:ext cx="0" cy="5647666"/>
-          </a:xfrm>
-          <a:prstGeom prst="straightConnector1">
-            <a:avLst/>
-          </a:prstGeom>
-          <a:ln w="38100">
-            <a:headEnd type="triangle"/>
-            <a:tailEnd type="triangle"/>
-          </a:ln>
-        </p:spPr>
-        <p:style>
-          <a:lnRef idx="1">
-            <a:schemeClr val="accent1"/>
-          </a:lnRef>
-          <a:fillRef idx="0">
-            <a:schemeClr val="accent1"/>
-          </a:fillRef>
-          <a:effectRef idx="0">
-            <a:schemeClr val="accent1"/>
-          </a:effectRef>
-          <a:fontRef idx="minor">
-            <a:schemeClr val="tx1"/>
-          </a:fontRef>
-        </p:style>
-      </p:cxnSp>
-      <p:pic>
-        <p:nvPicPr>
-          <p:cNvPr id="34" name="Picture 33">
-            <a:extLst>
-              <a:ext uri="{FF2B5EF4-FFF2-40B4-BE49-F238E27FC236}">
-                <a16:creationId xmlns:a16="http://schemas.microsoft.com/office/drawing/2014/main" id="{8959D605-AFDA-4DC4-9963-25A0C8DF5CDA}"/>
-              </a:ext>
-            </a:extLst>
-          </p:cNvPr>
-          <p:cNvPicPr>
-            <a:picLocks noChangeAspect="1"/>
-          </p:cNvPicPr>
-          <p:nvPr>
-            <p:custDataLst>
-              <p:tags r:id="rId1"/>
-            </p:custDataLst>
-          </p:nvPr>
-        </p:nvPicPr>
-        <p:blipFill>
-          <a:blip r:embed="rId5">
-            <a:extLst>
-              <a:ext uri="{28A0092B-C50C-407E-A947-70E740481C1C}">
-                <a14:useLocalDpi xmlns:a14="http://schemas.microsoft.com/office/drawing/2010/main" val="0"/>
-              </a:ext>
-            </a:extLst>
-          </a:blip>
-          <a:stretch>
-            <a:fillRect/>
-          </a:stretch>
-        </p:blipFill>
-        <p:spPr>
-          <a:xfrm>
-            <a:off x="421161" y="1540911"/>
-            <a:ext cx="615619" cy="216381"/>
-          </a:xfrm>
-          <a:prstGeom prst="rect">
-            <a:avLst/>
-          </a:prstGeom>
-        </p:spPr>
-      </p:pic>
-      <p:pic>
-        <p:nvPicPr>
-          <p:cNvPr id="36" name="Picture 35">
-            <a:extLst>
-              <a:ext uri="{FF2B5EF4-FFF2-40B4-BE49-F238E27FC236}">
-                <a16:creationId xmlns:a16="http://schemas.microsoft.com/office/drawing/2014/main" id="{1A91A6CD-0E54-43D1-B657-5A6845CC15B6}"/>
-              </a:ext>
-            </a:extLst>
-          </p:cNvPr>
-          <p:cNvPicPr>
-            <a:picLocks noChangeAspect="1"/>
-          </p:cNvPicPr>
-          <p:nvPr>
-            <p:custDataLst>
-              <p:tags r:id="rId2"/>
-            </p:custDataLst>
-          </p:nvPr>
-        </p:nvPicPr>
-        <p:blipFill>
-          <a:blip r:embed="rId6">
-            <a:extLst>
-              <a:ext uri="{28A0092B-C50C-407E-A947-70E740481C1C}">
-                <a14:useLocalDpi xmlns:a14="http://schemas.microsoft.com/office/drawing/2010/main" val="0"/>
-              </a:ext>
-            </a:extLst>
-          </a:blip>
-          <a:stretch>
-            <a:fillRect/>
-          </a:stretch>
-        </p:blipFill>
-        <p:spPr>
-          <a:xfrm>
-            <a:off x="1800063" y="1556852"/>
-            <a:ext cx="551619" cy="211810"/>
-          </a:xfrm>
-          <a:prstGeom prst="rect">
-            <a:avLst/>
-          </a:prstGeom>
-        </p:spPr>
-      </p:pic>
-      <p:pic>
-        <p:nvPicPr>
-          <p:cNvPr id="38" name="Picture 37">
-            <a:extLst>
-              <a:ext uri="{FF2B5EF4-FFF2-40B4-BE49-F238E27FC236}">
-                <a16:creationId xmlns:a16="http://schemas.microsoft.com/office/drawing/2014/main" id="{A32F05A1-1158-4EFE-8BDB-090D3037419E}"/>
-              </a:ext>
-            </a:extLst>
-          </p:cNvPr>
-          <p:cNvPicPr>
-            <a:picLocks noChangeAspect="1"/>
-          </p:cNvPicPr>
-          <p:nvPr>
-            <p:custDataLst>
-              <p:tags r:id="rId3"/>
-            </p:custDataLst>
-          </p:nvPr>
-        </p:nvPicPr>
-        <p:blipFill>
-          <a:blip r:embed="rId7">
-            <a:extLst>
-              <a:ext uri="{28A0092B-C50C-407E-A947-70E740481C1C}">
-                <a14:useLocalDpi xmlns:a14="http://schemas.microsoft.com/office/drawing/2010/main" val="0"/>
-              </a:ext>
-            </a:extLst>
-          </a:blip>
-          <a:stretch>
-            <a:fillRect/>
-          </a:stretch>
-        </p:blipFill>
-        <p:spPr>
-          <a:xfrm>
-            <a:off x="4556952" y="78007"/>
-            <a:ext cx="1539048" cy="273891"/>
-          </a:xfrm>
-          <a:prstGeom prst="rect">
-            <a:avLst/>
-          </a:prstGeom>
-        </p:spPr>
-      </p:pic>
-      <p:cxnSp>
-        <p:nvCxnSpPr>
-          <p:cNvPr id="40" name="Straight Connector 39">
-            <a:extLst>
-              <a:ext uri="{FF2B5EF4-FFF2-40B4-BE49-F238E27FC236}">
-                <a16:creationId xmlns:a16="http://schemas.microsoft.com/office/drawing/2014/main" id="{43987B40-1192-4E85-8FDE-DAE582D582BD}"/>
-              </a:ext>
-            </a:extLst>
-          </p:cNvPr>
-          <p:cNvCxnSpPr/>
-          <p:nvPr/>
-        </p:nvCxnSpPr>
-        <p:spPr>
-          <a:xfrm flipV="1">
-            <a:off x="5217993" y="383766"/>
-            <a:ext cx="0" cy="1768386"/>
-          </a:xfrm>
-          <a:prstGeom prst="line">
-            <a:avLst/>
-          </a:prstGeom>
-        </p:spPr>
-        <p:style>
-          <a:lnRef idx="1">
-            <a:schemeClr val="accent1"/>
-          </a:lnRef>
-          <a:fillRef idx="0">
-            <a:schemeClr val="accent1"/>
-          </a:fillRef>
-          <a:effectRef idx="0">
-            <a:schemeClr val="accent1"/>
-          </a:effectRef>
-          <a:fontRef idx="minor">
-            <a:schemeClr val="tx1"/>
-          </a:fontRef>
-        </p:style>
-      </p:cxnSp>
+        </p:grpSpPr>
+        <p:sp>
+          <p:nvSpPr>
+            <p:cNvPr id="4" name="Oval 3">
+              <a:extLst>
+                <a:ext uri="{FF2B5EF4-FFF2-40B4-BE49-F238E27FC236}">
+                  <a16:creationId xmlns:a16="http://schemas.microsoft.com/office/drawing/2014/main" id="{05A80D2C-F686-452A-94B9-D43C1315CEB7}"/>
+                </a:ext>
+              </a:extLst>
+            </p:cNvPr>
+            <p:cNvSpPr/>
+            <p:nvPr/>
+          </p:nvSpPr>
+          <p:spPr>
+            <a:xfrm>
+              <a:off x="2770495" y="641445"/>
+              <a:ext cx="5827594" cy="5827594"/>
+            </a:xfrm>
+            <a:prstGeom prst="ellipse">
+              <a:avLst/>
+            </a:prstGeom>
+            <a:noFill/>
+            <a:ln w="177800"/>
+          </p:spPr>
+          <p:style>
+            <a:lnRef idx="2">
+              <a:schemeClr val="accent1">
+                <a:shade val="50000"/>
+              </a:schemeClr>
+            </a:lnRef>
+            <a:fillRef idx="1">
+              <a:schemeClr val="accent1"/>
+            </a:fillRef>
+            <a:effectRef idx="0">
+              <a:schemeClr val="accent1"/>
+            </a:effectRef>
+            <a:fontRef idx="minor">
+              <a:schemeClr val="lt1"/>
+            </a:fontRef>
+          </p:style>
+          <p:txBody>
+            <a:bodyPr rtlCol="0" anchor="ctr"/>
+            <a:lstStyle/>
+            <a:p>
+              <a:pPr algn="ctr"/>
+              <a:endParaRPr lang="en-US" dirty="0"/>
+            </a:p>
+          </p:txBody>
+        </p:sp>
+        <p:grpSp>
+          <p:nvGrpSpPr>
+            <p:cNvPr id="17" name="Group 16">
+              <a:extLst>
+                <a:ext uri="{FF2B5EF4-FFF2-40B4-BE49-F238E27FC236}">
+                  <a16:creationId xmlns:a16="http://schemas.microsoft.com/office/drawing/2014/main" id="{EA20FC53-BE08-4C9F-8902-1169CBC3DF5F}"/>
+                </a:ext>
+              </a:extLst>
+            </p:cNvPr>
+            <p:cNvGrpSpPr/>
+            <p:nvPr/>
+          </p:nvGrpSpPr>
+          <p:grpSpPr>
+            <a:xfrm>
+              <a:off x="3135005" y="795484"/>
+              <a:ext cx="6332561" cy="5432093"/>
+              <a:chOff x="3088944" y="832514"/>
+              <a:chExt cx="6332561" cy="5432093"/>
+            </a:xfrm>
+          </p:grpSpPr>
+          <p:grpSp>
+            <p:nvGrpSpPr>
+              <p:cNvPr id="10" name="Group 9">
+                <a:extLst>
+                  <a:ext uri="{FF2B5EF4-FFF2-40B4-BE49-F238E27FC236}">
+                    <a16:creationId xmlns:a16="http://schemas.microsoft.com/office/drawing/2014/main" id="{673970CB-373E-4BE4-A258-FE6A5F8D6864}"/>
+                  </a:ext>
+                </a:extLst>
+              </p:cNvPr>
+              <p:cNvGrpSpPr/>
+              <p:nvPr/>
+            </p:nvGrpSpPr>
+            <p:grpSpPr>
+              <a:xfrm>
+                <a:off x="3088944" y="1757292"/>
+                <a:ext cx="6332561" cy="3595900"/>
+                <a:chOff x="3088944" y="1637731"/>
+                <a:chExt cx="6332561" cy="3595900"/>
+              </a:xfrm>
+            </p:grpSpPr>
+            <p:sp>
+              <p:nvSpPr>
+                <p:cNvPr id="5" name="Rectangle: Rounded Corners 4">
+                  <a:extLst>
+                    <a:ext uri="{FF2B5EF4-FFF2-40B4-BE49-F238E27FC236}">
+                      <a16:creationId xmlns:a16="http://schemas.microsoft.com/office/drawing/2014/main" id="{7542E908-9EE4-4A76-8565-068DDD7C2513}"/>
+                    </a:ext>
+                  </a:extLst>
+                </p:cNvPr>
+                <p:cNvSpPr/>
+                <p:nvPr/>
+              </p:nvSpPr>
+              <p:spPr>
+                <a:xfrm>
+                  <a:off x="3088944" y="3120219"/>
+                  <a:ext cx="6332561" cy="617561"/>
+                </a:xfrm>
+                <a:prstGeom prst="roundRect">
+                  <a:avLst/>
+                </a:prstGeom>
+              </p:spPr>
+              <p:style>
+                <a:lnRef idx="2">
+                  <a:schemeClr val="accent1">
+                    <a:shade val="50000"/>
+                  </a:schemeClr>
+                </a:lnRef>
+                <a:fillRef idx="1">
+                  <a:schemeClr val="accent1"/>
+                </a:fillRef>
+                <a:effectRef idx="0">
+                  <a:schemeClr val="accent1"/>
+                </a:effectRef>
+                <a:fontRef idx="minor">
+                  <a:schemeClr val="lt1"/>
+                </a:fontRef>
+              </p:style>
+              <p:txBody>
+                <a:bodyPr rtlCol="0" anchor="ctr"/>
+                <a:lstStyle/>
+                <a:p>
+                  <a:pPr algn="ctr"/>
+                  <a:endParaRPr lang="en-US"/>
+                </a:p>
+              </p:txBody>
+            </p:sp>
+            <p:sp>
+              <p:nvSpPr>
+                <p:cNvPr id="6" name="Rectangle: Rounded Corners 5">
+                  <a:extLst>
+                    <a:ext uri="{FF2B5EF4-FFF2-40B4-BE49-F238E27FC236}">
+                      <a16:creationId xmlns:a16="http://schemas.microsoft.com/office/drawing/2014/main" id="{C6F6FE84-0773-4ABC-AF15-F8ADC783DCA8}"/>
+                    </a:ext>
+                  </a:extLst>
+                </p:cNvPr>
+                <p:cNvSpPr/>
+                <p:nvPr/>
+              </p:nvSpPr>
+              <p:spPr>
+                <a:xfrm>
+                  <a:off x="3643952" y="1637731"/>
+                  <a:ext cx="272955" cy="1482488"/>
+                </a:xfrm>
+                <a:prstGeom prst="roundRect">
+                  <a:avLst/>
+                </a:prstGeom>
+              </p:spPr>
+              <p:style>
+                <a:lnRef idx="2">
+                  <a:schemeClr val="accent1">
+                    <a:shade val="50000"/>
+                  </a:schemeClr>
+                </a:lnRef>
+                <a:fillRef idx="1">
+                  <a:schemeClr val="accent1"/>
+                </a:fillRef>
+                <a:effectRef idx="0">
+                  <a:schemeClr val="accent1"/>
+                </a:effectRef>
+                <a:fontRef idx="minor">
+                  <a:schemeClr val="lt1"/>
+                </a:fontRef>
+              </p:style>
+              <p:txBody>
+                <a:bodyPr rtlCol="0" anchor="ctr"/>
+                <a:lstStyle/>
+                <a:p>
+                  <a:pPr algn="ctr"/>
+                  <a:endParaRPr lang="en-US"/>
+                </a:p>
+              </p:txBody>
+            </p:sp>
+            <p:sp>
+              <p:nvSpPr>
+                <p:cNvPr id="7" name="Rectangle: Rounded Corners 6">
+                  <a:extLst>
+                    <a:ext uri="{FF2B5EF4-FFF2-40B4-BE49-F238E27FC236}">
+                      <a16:creationId xmlns:a16="http://schemas.microsoft.com/office/drawing/2014/main" id="{9152B474-9D69-472C-B17B-1BB7BBA2671A}"/>
+                    </a:ext>
+                  </a:extLst>
+                </p:cNvPr>
+                <p:cNvSpPr/>
+                <p:nvPr/>
+              </p:nvSpPr>
+              <p:spPr>
+                <a:xfrm>
+                  <a:off x="3643952" y="3737780"/>
+                  <a:ext cx="272955" cy="1482488"/>
+                </a:xfrm>
+                <a:prstGeom prst="roundRect">
+                  <a:avLst/>
+                </a:prstGeom>
+              </p:spPr>
+              <p:style>
+                <a:lnRef idx="2">
+                  <a:schemeClr val="accent1">
+                    <a:shade val="50000"/>
+                  </a:schemeClr>
+                </a:lnRef>
+                <a:fillRef idx="1">
+                  <a:schemeClr val="accent1"/>
+                </a:fillRef>
+                <a:effectRef idx="0">
+                  <a:schemeClr val="accent1"/>
+                </a:effectRef>
+                <a:fontRef idx="minor">
+                  <a:schemeClr val="lt1"/>
+                </a:fontRef>
+              </p:style>
+              <p:txBody>
+                <a:bodyPr rtlCol="0" anchor="ctr"/>
+                <a:lstStyle/>
+                <a:p>
+                  <a:pPr algn="ctr"/>
+                  <a:endParaRPr lang="en-US"/>
+                </a:p>
+              </p:txBody>
+            </p:sp>
+            <p:sp>
+              <p:nvSpPr>
+                <p:cNvPr id="8" name="Rectangle: Rounded Corners 7">
+                  <a:extLst>
+                    <a:ext uri="{FF2B5EF4-FFF2-40B4-BE49-F238E27FC236}">
+                      <a16:creationId xmlns:a16="http://schemas.microsoft.com/office/drawing/2014/main" id="{EB4C9D2B-AEB1-48B1-8FBC-085EF4B9E803}"/>
+                    </a:ext>
+                  </a:extLst>
+                </p:cNvPr>
+                <p:cNvSpPr/>
+                <p:nvPr/>
+              </p:nvSpPr>
+              <p:spPr>
+                <a:xfrm>
+                  <a:off x="7444854" y="3751143"/>
+                  <a:ext cx="272955" cy="1482488"/>
+                </a:xfrm>
+                <a:prstGeom prst="roundRect">
+                  <a:avLst/>
+                </a:prstGeom>
+              </p:spPr>
+              <p:style>
+                <a:lnRef idx="2">
+                  <a:schemeClr val="accent1">
+                    <a:shade val="50000"/>
+                  </a:schemeClr>
+                </a:lnRef>
+                <a:fillRef idx="1">
+                  <a:schemeClr val="accent1"/>
+                </a:fillRef>
+                <a:effectRef idx="0">
+                  <a:schemeClr val="accent1"/>
+                </a:effectRef>
+                <a:fontRef idx="minor">
+                  <a:schemeClr val="lt1"/>
+                </a:fontRef>
+              </p:style>
+              <p:txBody>
+                <a:bodyPr rtlCol="0" anchor="ctr"/>
+                <a:lstStyle/>
+                <a:p>
+                  <a:pPr algn="ctr"/>
+                  <a:endParaRPr lang="en-US"/>
+                </a:p>
+              </p:txBody>
+            </p:sp>
+            <p:sp>
+              <p:nvSpPr>
+                <p:cNvPr id="9" name="Rectangle: Rounded Corners 8">
+                  <a:extLst>
+                    <a:ext uri="{FF2B5EF4-FFF2-40B4-BE49-F238E27FC236}">
+                      <a16:creationId xmlns:a16="http://schemas.microsoft.com/office/drawing/2014/main" id="{C00468EF-DFE0-4035-992E-C959519F7252}"/>
+                    </a:ext>
+                  </a:extLst>
+                </p:cNvPr>
+                <p:cNvSpPr/>
+                <p:nvPr/>
+              </p:nvSpPr>
+              <p:spPr>
+                <a:xfrm>
+                  <a:off x="7444854" y="1637731"/>
+                  <a:ext cx="272955" cy="1482488"/>
+                </a:xfrm>
+                <a:prstGeom prst="roundRect">
+                  <a:avLst/>
+                </a:prstGeom>
+              </p:spPr>
+              <p:style>
+                <a:lnRef idx="2">
+                  <a:schemeClr val="accent1">
+                    <a:shade val="50000"/>
+                  </a:schemeClr>
+                </a:lnRef>
+                <a:fillRef idx="1">
+                  <a:schemeClr val="accent1"/>
+                </a:fillRef>
+                <a:effectRef idx="0">
+                  <a:schemeClr val="accent1"/>
+                </a:effectRef>
+                <a:fontRef idx="minor">
+                  <a:schemeClr val="lt1"/>
+                </a:fontRef>
+              </p:style>
+              <p:txBody>
+                <a:bodyPr rtlCol="0" anchor="ctr"/>
+                <a:lstStyle/>
+                <a:p>
+                  <a:pPr algn="ctr"/>
+                  <a:endParaRPr lang="en-US"/>
+                </a:p>
+              </p:txBody>
+            </p:sp>
+          </p:grpSp>
+          <p:sp>
+            <p:nvSpPr>
+              <p:cNvPr id="11" name="Rectangle: Rounded Corners 10">
+                <a:extLst>
+                  <a:ext uri="{FF2B5EF4-FFF2-40B4-BE49-F238E27FC236}">
+                    <a16:creationId xmlns:a16="http://schemas.microsoft.com/office/drawing/2014/main" id="{814598F1-F464-4CFE-AB00-5304FEE6F3C7}"/>
+                  </a:ext>
+                </a:extLst>
+              </p:cNvPr>
+              <p:cNvSpPr/>
+              <p:nvPr/>
+            </p:nvSpPr>
+            <p:spPr>
+              <a:xfrm>
+                <a:off x="5547815" y="832514"/>
+                <a:ext cx="269544" cy="2407266"/>
+              </a:xfrm>
+              <a:prstGeom prst="roundRect">
+                <a:avLst/>
+              </a:prstGeom>
+            </p:spPr>
+            <p:style>
+              <a:lnRef idx="2">
+                <a:schemeClr val="accent1">
+                  <a:shade val="50000"/>
+                </a:schemeClr>
+              </a:lnRef>
+              <a:fillRef idx="1">
+                <a:schemeClr val="accent1"/>
+              </a:fillRef>
+              <a:effectRef idx="0">
+                <a:schemeClr val="accent1"/>
+              </a:effectRef>
+              <a:fontRef idx="minor">
+                <a:schemeClr val="lt1"/>
+              </a:fontRef>
+            </p:style>
+            <p:txBody>
+              <a:bodyPr rtlCol="0" anchor="ctr"/>
+              <a:lstStyle/>
+              <a:p>
+                <a:pPr algn="ctr"/>
+                <a:endParaRPr lang="en-US"/>
+              </a:p>
+            </p:txBody>
+          </p:sp>
+          <p:sp>
+            <p:nvSpPr>
+              <p:cNvPr id="12" name="Rectangle: Rounded Corners 11">
+                <a:extLst>
+                  <a:ext uri="{FF2B5EF4-FFF2-40B4-BE49-F238E27FC236}">
+                    <a16:creationId xmlns:a16="http://schemas.microsoft.com/office/drawing/2014/main" id="{572F0968-74E0-4972-B569-5D7067FD2425}"/>
+                  </a:ext>
+                </a:extLst>
+              </p:cNvPr>
+              <p:cNvSpPr/>
+              <p:nvPr/>
+            </p:nvSpPr>
+            <p:spPr>
+              <a:xfrm>
+                <a:off x="5544403" y="3870704"/>
+                <a:ext cx="272955" cy="2393903"/>
+              </a:xfrm>
+              <a:prstGeom prst="roundRect">
+                <a:avLst/>
+              </a:prstGeom>
+            </p:spPr>
+            <p:style>
+              <a:lnRef idx="2">
+                <a:schemeClr val="accent1">
+                  <a:shade val="50000"/>
+                </a:schemeClr>
+              </a:lnRef>
+              <a:fillRef idx="1">
+                <a:schemeClr val="accent1"/>
+              </a:fillRef>
+              <a:effectRef idx="0">
+                <a:schemeClr val="accent1"/>
+              </a:effectRef>
+              <a:fontRef idx="minor">
+                <a:schemeClr val="lt1"/>
+              </a:fontRef>
+            </p:style>
+            <p:txBody>
+              <a:bodyPr rtlCol="0" anchor="ctr"/>
+              <a:lstStyle/>
+              <a:p>
+                <a:pPr algn="ctr"/>
+                <a:endParaRPr lang="en-US"/>
+              </a:p>
+            </p:txBody>
+          </p:sp>
+          <p:sp>
+            <p:nvSpPr>
+              <p:cNvPr id="13" name="Rectangle: Rounded Corners 12">
+                <a:extLst>
+                  <a:ext uri="{FF2B5EF4-FFF2-40B4-BE49-F238E27FC236}">
+                    <a16:creationId xmlns:a16="http://schemas.microsoft.com/office/drawing/2014/main" id="{489A880E-6D2C-44F1-8C28-B0159086EF42}"/>
+                  </a:ext>
+                </a:extLst>
+              </p:cNvPr>
+              <p:cNvSpPr/>
+              <p:nvPr/>
+            </p:nvSpPr>
+            <p:spPr>
+              <a:xfrm>
+                <a:off x="6496334" y="1064525"/>
+                <a:ext cx="272955" cy="2175255"/>
+              </a:xfrm>
+              <a:prstGeom prst="roundRect">
+                <a:avLst/>
+              </a:prstGeom>
+            </p:spPr>
+            <p:style>
+              <a:lnRef idx="2">
+                <a:schemeClr val="accent1">
+                  <a:shade val="50000"/>
+                </a:schemeClr>
+              </a:lnRef>
+              <a:fillRef idx="1">
+                <a:schemeClr val="accent1"/>
+              </a:fillRef>
+              <a:effectRef idx="0">
+                <a:schemeClr val="accent1"/>
+              </a:effectRef>
+              <a:fontRef idx="minor">
+                <a:schemeClr val="lt1"/>
+              </a:fontRef>
+            </p:style>
+            <p:txBody>
+              <a:bodyPr rtlCol="0" anchor="ctr"/>
+              <a:lstStyle/>
+              <a:p>
+                <a:pPr algn="ctr"/>
+                <a:endParaRPr lang="en-US"/>
+              </a:p>
+            </p:txBody>
+          </p:sp>
+          <p:sp>
+            <p:nvSpPr>
+              <p:cNvPr id="14" name="Rectangle: Rounded Corners 13">
+                <a:extLst>
+                  <a:ext uri="{FF2B5EF4-FFF2-40B4-BE49-F238E27FC236}">
+                    <a16:creationId xmlns:a16="http://schemas.microsoft.com/office/drawing/2014/main" id="{C6FB79E8-B244-4967-940A-3E49D706CAD4}"/>
+                  </a:ext>
+                </a:extLst>
+              </p:cNvPr>
+              <p:cNvSpPr/>
+              <p:nvPr/>
+            </p:nvSpPr>
+            <p:spPr>
+              <a:xfrm>
+                <a:off x="6523630" y="3870704"/>
+                <a:ext cx="272955" cy="2175255"/>
+              </a:xfrm>
+              <a:prstGeom prst="roundRect">
+                <a:avLst/>
+              </a:prstGeom>
+            </p:spPr>
+            <p:style>
+              <a:lnRef idx="2">
+                <a:schemeClr val="accent1">
+                  <a:shade val="50000"/>
+                </a:schemeClr>
+              </a:lnRef>
+              <a:fillRef idx="1">
+                <a:schemeClr val="accent1"/>
+              </a:fillRef>
+              <a:effectRef idx="0">
+                <a:schemeClr val="accent1"/>
+              </a:effectRef>
+              <a:fontRef idx="minor">
+                <a:schemeClr val="lt1"/>
+              </a:fontRef>
+            </p:style>
+            <p:txBody>
+              <a:bodyPr rtlCol="0" anchor="ctr"/>
+              <a:lstStyle/>
+              <a:p>
+                <a:pPr algn="ctr"/>
+                <a:endParaRPr lang="en-US"/>
+              </a:p>
+            </p:txBody>
+          </p:sp>
+          <p:sp>
+            <p:nvSpPr>
+              <p:cNvPr id="15" name="Rectangle: Rounded Corners 14">
+                <a:extLst>
+                  <a:ext uri="{FF2B5EF4-FFF2-40B4-BE49-F238E27FC236}">
+                    <a16:creationId xmlns:a16="http://schemas.microsoft.com/office/drawing/2014/main" id="{1265EE2B-16CA-4C0F-8721-4D4F8786DA8B}"/>
+                  </a:ext>
+                </a:extLst>
+              </p:cNvPr>
+              <p:cNvSpPr/>
+              <p:nvPr/>
+            </p:nvSpPr>
+            <p:spPr>
+              <a:xfrm>
+                <a:off x="4618628" y="3870704"/>
+                <a:ext cx="272955" cy="2175255"/>
+              </a:xfrm>
+              <a:prstGeom prst="roundRect">
+                <a:avLst/>
+              </a:prstGeom>
+            </p:spPr>
+            <p:style>
+              <a:lnRef idx="2">
+                <a:schemeClr val="accent1">
+                  <a:shade val="50000"/>
+                </a:schemeClr>
+              </a:lnRef>
+              <a:fillRef idx="1">
+                <a:schemeClr val="accent1"/>
+              </a:fillRef>
+              <a:effectRef idx="0">
+                <a:schemeClr val="accent1"/>
+              </a:effectRef>
+              <a:fontRef idx="minor">
+                <a:schemeClr val="lt1"/>
+              </a:fontRef>
+            </p:style>
+            <p:txBody>
+              <a:bodyPr rtlCol="0" anchor="ctr"/>
+              <a:lstStyle/>
+              <a:p>
+                <a:pPr algn="ctr"/>
+                <a:endParaRPr lang="en-US"/>
+              </a:p>
+            </p:txBody>
+          </p:sp>
+          <p:sp>
+            <p:nvSpPr>
+              <p:cNvPr id="16" name="Rectangle: Rounded Corners 15">
+                <a:extLst>
+                  <a:ext uri="{FF2B5EF4-FFF2-40B4-BE49-F238E27FC236}">
+                    <a16:creationId xmlns:a16="http://schemas.microsoft.com/office/drawing/2014/main" id="{A1FB36C2-31CA-40C7-AFB8-E292CFF1A055}"/>
+                  </a:ext>
+                </a:extLst>
+              </p:cNvPr>
+              <p:cNvSpPr/>
+              <p:nvPr/>
+            </p:nvSpPr>
+            <p:spPr>
+              <a:xfrm>
+                <a:off x="4618629" y="1064525"/>
+                <a:ext cx="272955" cy="2175255"/>
+              </a:xfrm>
+              <a:prstGeom prst="roundRect">
+                <a:avLst/>
+              </a:prstGeom>
+            </p:spPr>
+            <p:style>
+              <a:lnRef idx="2">
+                <a:schemeClr val="accent1">
+                  <a:shade val="50000"/>
+                </a:schemeClr>
+              </a:lnRef>
+              <a:fillRef idx="1">
+                <a:schemeClr val="accent1"/>
+              </a:fillRef>
+              <a:effectRef idx="0">
+                <a:schemeClr val="accent1"/>
+              </a:effectRef>
+              <a:fontRef idx="minor">
+                <a:schemeClr val="lt1"/>
+              </a:fontRef>
+            </p:style>
+            <p:txBody>
+              <a:bodyPr rtlCol="0" anchor="ctr"/>
+              <a:lstStyle/>
+              <a:p>
+                <a:pPr algn="ctr"/>
+                <a:endParaRPr lang="en-US"/>
+              </a:p>
+            </p:txBody>
+          </p:sp>
+        </p:grpSp>
+        <p:cxnSp>
+          <p:nvCxnSpPr>
+            <p:cNvPr id="19" name="Straight Arrow Connector 18">
+              <a:extLst>
+                <a:ext uri="{FF2B5EF4-FFF2-40B4-BE49-F238E27FC236}">
+                  <a16:creationId xmlns:a16="http://schemas.microsoft.com/office/drawing/2014/main" id="{3607274D-E30D-4C74-A103-DDB133B12CAE}"/>
+                </a:ext>
+              </a:extLst>
+            </p:cNvPr>
+            <p:cNvCxnSpPr>
+              <a:cxnSpLocks/>
+              <a:stCxn id="16" idx="3"/>
+            </p:cNvCxnSpPr>
+            <p:nvPr/>
+          </p:nvCxnSpPr>
+          <p:spPr>
+            <a:xfrm>
+              <a:off x="4937645" y="2115123"/>
+              <a:ext cx="652819" cy="0"/>
+            </a:xfrm>
+            <a:prstGeom prst="straightConnector1">
+              <a:avLst/>
+            </a:prstGeom>
+            <a:ln>
+              <a:headEnd type="triangle"/>
+              <a:tailEnd type="triangle"/>
+            </a:ln>
+          </p:spPr>
+          <p:style>
+            <a:lnRef idx="1">
+              <a:schemeClr val="accent1"/>
+            </a:lnRef>
+            <a:fillRef idx="0">
+              <a:schemeClr val="accent1"/>
+            </a:fillRef>
+            <a:effectRef idx="0">
+              <a:schemeClr val="accent1"/>
+            </a:effectRef>
+            <a:fontRef idx="minor">
+              <a:schemeClr val="tx1"/>
+            </a:fontRef>
+          </p:style>
+        </p:cxnSp>
+        <p:cxnSp>
+          <p:nvCxnSpPr>
+            <p:cNvPr id="22" name="Straight Connector 21">
+              <a:extLst>
+                <a:ext uri="{FF2B5EF4-FFF2-40B4-BE49-F238E27FC236}">
+                  <a16:creationId xmlns:a16="http://schemas.microsoft.com/office/drawing/2014/main" id="{3C77BCC9-7876-431C-A039-9DD222885DAF}"/>
+                </a:ext>
+              </a:extLst>
+            </p:cNvPr>
+            <p:cNvCxnSpPr>
+              <a:cxnSpLocks/>
+            </p:cNvCxnSpPr>
+            <p:nvPr/>
+          </p:nvCxnSpPr>
+          <p:spPr>
+            <a:xfrm flipH="1">
+              <a:off x="460612" y="545911"/>
+              <a:ext cx="5356746" cy="0"/>
+            </a:xfrm>
+            <a:prstGeom prst="line">
+              <a:avLst/>
+            </a:prstGeom>
+          </p:spPr>
+          <p:style>
+            <a:lnRef idx="1">
+              <a:schemeClr val="accent1"/>
+            </a:lnRef>
+            <a:fillRef idx="0">
+              <a:schemeClr val="accent1"/>
+            </a:fillRef>
+            <a:effectRef idx="0">
+              <a:schemeClr val="accent1"/>
+            </a:effectRef>
+            <a:fontRef idx="minor">
+              <a:schemeClr val="tx1"/>
+            </a:fontRef>
+          </p:style>
+        </p:cxnSp>
+        <p:grpSp>
+          <p:nvGrpSpPr>
+            <p:cNvPr id="2" name="Group 1">
+              <a:extLst>
+                <a:ext uri="{FF2B5EF4-FFF2-40B4-BE49-F238E27FC236}">
+                  <a16:creationId xmlns:a16="http://schemas.microsoft.com/office/drawing/2014/main" id="{3E0DFCCC-287D-4722-B104-167278479405}"/>
+                </a:ext>
+              </a:extLst>
+            </p:cNvPr>
+            <p:cNvGrpSpPr/>
+            <p:nvPr/>
+          </p:nvGrpSpPr>
+          <p:grpSpPr>
+            <a:xfrm>
+              <a:off x="1645409" y="727170"/>
+              <a:ext cx="4171949" cy="5647666"/>
+              <a:chOff x="1645409" y="727170"/>
+              <a:chExt cx="4171949" cy="5647666"/>
+            </a:xfrm>
+          </p:grpSpPr>
+          <p:cxnSp>
+            <p:nvCxnSpPr>
+              <p:cNvPr id="27" name="Straight Connector 26">
+                <a:extLst>
+                  <a:ext uri="{FF2B5EF4-FFF2-40B4-BE49-F238E27FC236}">
+                    <a16:creationId xmlns:a16="http://schemas.microsoft.com/office/drawing/2014/main" id="{82793B80-2777-457F-B0A8-77D4E134A638}"/>
+                  </a:ext>
+                </a:extLst>
+              </p:cNvPr>
+              <p:cNvCxnSpPr>
+                <a:cxnSpLocks/>
+              </p:cNvCxnSpPr>
+              <p:nvPr/>
+            </p:nvCxnSpPr>
+            <p:spPr>
+              <a:xfrm flipH="1">
+                <a:off x="1695450" y="727170"/>
+                <a:ext cx="4121908" cy="0"/>
+              </a:xfrm>
+              <a:prstGeom prst="line">
+                <a:avLst/>
+              </a:prstGeom>
+            </p:spPr>
+            <p:style>
+              <a:lnRef idx="1">
+                <a:schemeClr val="accent1"/>
+              </a:lnRef>
+              <a:fillRef idx="0">
+                <a:schemeClr val="accent1"/>
+              </a:fillRef>
+              <a:effectRef idx="0">
+                <a:schemeClr val="accent1"/>
+              </a:effectRef>
+              <a:fontRef idx="minor">
+                <a:schemeClr val="tx1"/>
+              </a:fontRef>
+            </p:style>
+          </p:cxnSp>
+          <p:cxnSp>
+            <p:nvCxnSpPr>
+              <p:cNvPr id="29" name="Straight Connector 28">
+                <a:extLst>
+                  <a:ext uri="{FF2B5EF4-FFF2-40B4-BE49-F238E27FC236}">
+                    <a16:creationId xmlns:a16="http://schemas.microsoft.com/office/drawing/2014/main" id="{64A5F1E0-8A2D-40A0-AEFF-E0C4FA005B74}"/>
+                  </a:ext>
+                </a:extLst>
+              </p:cNvPr>
+              <p:cNvCxnSpPr>
+                <a:cxnSpLocks/>
+              </p:cNvCxnSpPr>
+              <p:nvPr/>
+            </p:nvCxnSpPr>
+            <p:spPr>
+              <a:xfrm flipH="1">
+                <a:off x="1645409" y="6374836"/>
+                <a:ext cx="4121908" cy="0"/>
+              </a:xfrm>
+              <a:prstGeom prst="line">
+                <a:avLst/>
+              </a:prstGeom>
+            </p:spPr>
+            <p:style>
+              <a:lnRef idx="1">
+                <a:schemeClr val="accent1"/>
+              </a:lnRef>
+              <a:fillRef idx="0">
+                <a:schemeClr val="accent1"/>
+              </a:fillRef>
+              <a:effectRef idx="0">
+                <a:schemeClr val="accent1"/>
+              </a:effectRef>
+              <a:fontRef idx="minor">
+                <a:schemeClr val="tx1"/>
+              </a:fontRef>
+            </p:style>
+          </p:cxnSp>
+          <p:cxnSp>
+            <p:nvCxnSpPr>
+              <p:cNvPr id="31" name="Straight Arrow Connector 30">
+                <a:extLst>
+                  <a:ext uri="{FF2B5EF4-FFF2-40B4-BE49-F238E27FC236}">
+                    <a16:creationId xmlns:a16="http://schemas.microsoft.com/office/drawing/2014/main" id="{81E8B011-AD7D-4FCA-B6C8-4C060166AD1D}"/>
+                  </a:ext>
+                </a:extLst>
+              </p:cNvPr>
+              <p:cNvCxnSpPr>
+                <a:cxnSpLocks/>
+              </p:cNvCxnSpPr>
+              <p:nvPr/>
+            </p:nvCxnSpPr>
+            <p:spPr>
+              <a:xfrm>
+                <a:off x="1695450" y="727170"/>
+                <a:ext cx="0" cy="5647666"/>
+              </a:xfrm>
+              <a:prstGeom prst="straightConnector1">
+                <a:avLst/>
+              </a:prstGeom>
+              <a:ln w="38100">
+                <a:headEnd type="triangle"/>
+                <a:tailEnd type="triangle"/>
+              </a:ln>
+            </p:spPr>
+            <p:style>
+              <a:lnRef idx="1">
+                <a:schemeClr val="accent1"/>
+              </a:lnRef>
+              <a:fillRef idx="0">
+                <a:schemeClr val="accent1"/>
+              </a:fillRef>
+              <a:effectRef idx="0">
+                <a:schemeClr val="accent1"/>
+              </a:effectRef>
+              <a:fontRef idx="minor">
+                <a:schemeClr val="tx1"/>
+              </a:fontRef>
+            </p:style>
+          </p:cxnSp>
+        </p:grpSp>
+        <p:pic>
+          <p:nvPicPr>
+            <p:cNvPr id="34" name="Picture 33">
+              <a:extLst>
+                <a:ext uri="{FF2B5EF4-FFF2-40B4-BE49-F238E27FC236}">
+                  <a16:creationId xmlns:a16="http://schemas.microsoft.com/office/drawing/2014/main" id="{8959D605-AFDA-4DC4-9963-25A0C8DF5CDA}"/>
+                </a:ext>
+              </a:extLst>
+            </p:cNvPr>
+            <p:cNvPicPr>
+              <a:picLocks noChangeAspect="1"/>
+            </p:cNvPicPr>
+            <p:nvPr>
+              <p:custDataLst>
+                <p:tags r:id="rId1"/>
+              </p:custDataLst>
+            </p:nvPr>
+          </p:nvPicPr>
+          <p:blipFill>
+            <a:blip r:embed="rId7">
+              <a:extLst>
+                <a:ext uri="{28A0092B-C50C-407E-A947-70E740481C1C}">
+                  <a14:useLocalDpi xmlns:a14="http://schemas.microsoft.com/office/drawing/2010/main" val="0"/>
+                </a:ext>
+              </a:extLst>
+            </a:blip>
+            <a:stretch>
+              <a:fillRect/>
+            </a:stretch>
+          </p:blipFill>
+          <p:spPr>
+            <a:xfrm>
+              <a:off x="421161" y="1540911"/>
+              <a:ext cx="615619" cy="216381"/>
+            </a:xfrm>
+            <a:prstGeom prst="rect">
+              <a:avLst/>
+            </a:prstGeom>
+          </p:spPr>
+        </p:pic>
+        <p:pic>
+          <p:nvPicPr>
+            <p:cNvPr id="36" name="Picture 35">
+              <a:extLst>
+                <a:ext uri="{FF2B5EF4-FFF2-40B4-BE49-F238E27FC236}">
+                  <a16:creationId xmlns:a16="http://schemas.microsoft.com/office/drawing/2014/main" id="{1A91A6CD-0E54-43D1-B657-5A6845CC15B6}"/>
+                </a:ext>
+              </a:extLst>
+            </p:cNvPr>
+            <p:cNvPicPr>
+              <a:picLocks noChangeAspect="1"/>
+            </p:cNvPicPr>
+            <p:nvPr>
+              <p:custDataLst>
+                <p:tags r:id="rId2"/>
+              </p:custDataLst>
+            </p:nvPr>
+          </p:nvPicPr>
+          <p:blipFill>
+            <a:blip r:embed="rId8">
+              <a:extLst>
+                <a:ext uri="{28A0092B-C50C-407E-A947-70E740481C1C}">
+                  <a14:useLocalDpi xmlns:a14="http://schemas.microsoft.com/office/drawing/2010/main" val="0"/>
+                </a:ext>
+              </a:extLst>
+            </a:blip>
+            <a:stretch>
+              <a:fillRect/>
+            </a:stretch>
+          </p:blipFill>
+          <p:spPr>
+            <a:xfrm>
+              <a:off x="1800063" y="1556852"/>
+              <a:ext cx="551619" cy="211810"/>
+            </a:xfrm>
+            <a:prstGeom prst="rect">
+              <a:avLst/>
+            </a:prstGeom>
+          </p:spPr>
+        </p:pic>
+        <p:pic>
+          <p:nvPicPr>
+            <p:cNvPr id="38" name="Picture 37">
+              <a:extLst>
+                <a:ext uri="{FF2B5EF4-FFF2-40B4-BE49-F238E27FC236}">
+                  <a16:creationId xmlns:a16="http://schemas.microsoft.com/office/drawing/2014/main" id="{A32F05A1-1158-4EFE-8BDB-090D3037419E}"/>
+                </a:ext>
+              </a:extLst>
+            </p:cNvPr>
+            <p:cNvPicPr>
+              <a:picLocks noChangeAspect="1"/>
+            </p:cNvPicPr>
+            <p:nvPr>
+              <p:custDataLst>
+                <p:tags r:id="rId3"/>
+              </p:custDataLst>
+            </p:nvPr>
+          </p:nvPicPr>
+          <p:blipFill>
+            <a:blip r:embed="rId9">
+              <a:extLst>
+                <a:ext uri="{28A0092B-C50C-407E-A947-70E740481C1C}">
+                  <a14:useLocalDpi xmlns:a14="http://schemas.microsoft.com/office/drawing/2010/main" val="0"/>
+                </a:ext>
+              </a:extLst>
+            </a:blip>
+            <a:stretch>
+              <a:fillRect/>
+            </a:stretch>
+          </p:blipFill>
+          <p:spPr>
+            <a:xfrm>
+              <a:off x="4556952" y="78007"/>
+              <a:ext cx="1539048" cy="273891"/>
+            </a:xfrm>
+            <a:prstGeom prst="rect">
+              <a:avLst/>
+            </a:prstGeom>
+          </p:spPr>
+        </p:pic>
+        <p:cxnSp>
+          <p:nvCxnSpPr>
+            <p:cNvPr id="40" name="Straight Connector 39">
+              <a:extLst>
+                <a:ext uri="{FF2B5EF4-FFF2-40B4-BE49-F238E27FC236}">
+                  <a16:creationId xmlns:a16="http://schemas.microsoft.com/office/drawing/2014/main" id="{43987B40-1192-4E85-8FDE-DAE582D582BD}"/>
+                </a:ext>
+              </a:extLst>
+            </p:cNvPr>
+            <p:cNvCxnSpPr/>
+            <p:nvPr/>
+          </p:nvCxnSpPr>
+          <p:spPr>
+            <a:xfrm flipV="1">
+              <a:off x="5217993" y="383766"/>
+              <a:ext cx="0" cy="1768386"/>
+            </a:xfrm>
+            <a:prstGeom prst="line">
+              <a:avLst/>
+            </a:prstGeom>
+          </p:spPr>
+          <p:style>
+            <a:lnRef idx="1">
+              <a:schemeClr val="accent1"/>
+            </a:lnRef>
+            <a:fillRef idx="0">
+              <a:schemeClr val="accent1"/>
+            </a:fillRef>
+            <a:effectRef idx="0">
+              <a:schemeClr val="accent1"/>
+            </a:effectRef>
+            <a:fontRef idx="minor">
+              <a:schemeClr val="tx1"/>
+            </a:fontRef>
+          </p:style>
+        </p:cxnSp>
+        <p:pic>
+          <p:nvPicPr>
+            <p:cNvPr id="18" name="Picture 17">
+              <a:extLst>
+                <a:ext uri="{FF2B5EF4-FFF2-40B4-BE49-F238E27FC236}">
+                  <a16:creationId xmlns:a16="http://schemas.microsoft.com/office/drawing/2014/main" id="{0C9807BE-F149-4360-9A21-B6F7E33354ED}"/>
+                </a:ext>
+              </a:extLst>
+            </p:cNvPr>
+            <p:cNvPicPr>
+              <a:picLocks noChangeAspect="1"/>
+            </p:cNvPicPr>
+            <p:nvPr>
+              <p:custDataLst>
+                <p:tags r:id="rId4"/>
+              </p:custDataLst>
+            </p:nvPr>
+          </p:nvPicPr>
+          <p:blipFill>
+            <a:blip r:embed="rId10">
+              <a:extLst>
+                <a:ext uri="{28A0092B-C50C-407E-A947-70E740481C1C}">
+                  <a14:useLocalDpi xmlns:a14="http://schemas.microsoft.com/office/drawing/2010/main" val="0"/>
+                </a:ext>
+              </a:extLst>
+            </a:blip>
+            <a:stretch>
+              <a:fillRect/>
+            </a:stretch>
+          </p:blipFill>
+          <p:spPr>
+            <a:xfrm>
+              <a:off x="8305970" y="3421472"/>
+              <a:ext cx="726857" cy="178286"/>
+            </a:xfrm>
+            <a:prstGeom prst="rect">
+              <a:avLst/>
+            </a:prstGeom>
+          </p:spPr>
+        </p:pic>
+        <p:pic>
+          <p:nvPicPr>
+            <p:cNvPr id="21" name="Picture 20">
+              <a:extLst>
+                <a:ext uri="{FF2B5EF4-FFF2-40B4-BE49-F238E27FC236}">
+                  <a16:creationId xmlns:a16="http://schemas.microsoft.com/office/drawing/2014/main" id="{D5E70FC0-57E0-4E81-A892-29F8477C8FA6}"/>
+                </a:ext>
+              </a:extLst>
+            </p:cNvPr>
+            <p:cNvPicPr>
+              <a:picLocks noChangeAspect="1"/>
+            </p:cNvPicPr>
+            <p:nvPr>
+              <p:custDataLst>
+                <p:tags r:id="rId5"/>
+              </p:custDataLst>
+            </p:nvPr>
+          </p:nvPicPr>
+          <p:blipFill>
+            <a:blip r:embed="rId11">
+              <a:extLst>
+                <a:ext uri="{28A0092B-C50C-407E-A947-70E740481C1C}">
+                  <a14:useLocalDpi xmlns:a14="http://schemas.microsoft.com/office/drawing/2010/main" val="0"/>
+                </a:ext>
+              </a:extLst>
+            </a:blip>
+            <a:stretch>
+              <a:fillRect/>
+            </a:stretch>
+          </p:blipFill>
+          <p:spPr>
+            <a:xfrm>
+              <a:off x="5645840" y="4852339"/>
+              <a:ext cx="1083428" cy="178286"/>
+            </a:xfrm>
+            <a:prstGeom prst="rect">
+              <a:avLst/>
+            </a:prstGeom>
+          </p:spPr>
+        </p:pic>
+      </p:grpSp>
     </p:spTree>
     <p:extLst>
       <p:ext uri="{BB962C8B-B14F-4D97-AF65-F5344CB8AC3E}">
@@ -21837,8 +21959,8 @@
           </p:nvSpPr>
           <p:spPr>
             <a:xfrm rot="10800000" flipH="1" flipV="1">
-              <a:off x="7560522" y="763370"/>
-              <a:ext cx="1390598" cy="4135272"/>
+              <a:off x="7560522" y="1810602"/>
+              <a:ext cx="1390598" cy="3088040"/>
             </a:xfrm>
             <a:prstGeom prst="corner">
               <a:avLst>
@@ -21894,8 +22016,8 @@
           </p:nvSpPr>
           <p:spPr>
             <a:xfrm rot="10800000" flipH="1" flipV="1">
-              <a:off x="7778482" y="1365162"/>
-              <a:ext cx="1390598" cy="2647106"/>
+              <a:off x="7778482" y="2511380"/>
+              <a:ext cx="1390598" cy="1500888"/>
             </a:xfrm>
             <a:prstGeom prst="corner">
               <a:avLst>
@@ -48397,6 +48519,44 @@
 <file path=ppt/tags/tag100.xml><?xml version="1.0" encoding="utf-8"?>
 <p:tagLst xmlns:a="http://schemas.openxmlformats.org/drawingml/2006/main" xmlns:r="http://schemas.openxmlformats.org/officeDocument/2006/relationships" xmlns:p="http://schemas.openxmlformats.org/presentationml/2006/main">
   <p:tag name="OUTPUTDPI" val="1200"/>
+  <p:tag name="ORIGINALHEIGHT" val="86.23921"/>
+  <p:tag name="ORIGINALWIDTH" val="341.9572"/>
+  <p:tag name="LATEXADDIN" val="\documentclass{article}&#10;\usepackage{amsmath}&#10;\usepackage{xcolor}&#10;\usepackage{ragged2e}&#10;\pagestyle{empty}&#10;\begin{document}&#10;&#10;\definecolor{Monred}{RGB}{172,0,0}&#10;&#10;$ Drain $&#10;&#10;&#10;\end{document}"/>
+  <p:tag name="IGUANATEXSIZE" val="20"/>
+  <p:tag name="IGUANATEXCURSOR" val="168"/>
+  <p:tag name="TRANSPARENCY" val="True"/>
+  <p:tag name="FILENAME" val=""/>
+  <p:tag name="LATEXENGINEID" val="0"/>
+  <p:tag name="TEMPFOLDER" val="c:\temp\"/>
+  <p:tag name="LATEXFORMHEIGHT" val="312"/>
+  <p:tag name="LATEXFORMWIDTH" val="384"/>
+  <p:tag name="LATEXFORMWRAP" val="True"/>
+  <p:tag name="BITMAPVECTOR" val="0"/>
+</p:tagLst>
+</file>
+
+<file path=ppt/tags/tag101.xml><?xml version="1.0" encoding="utf-8"?>
+<p:tagLst xmlns:a="http://schemas.openxmlformats.org/drawingml/2006/main" xmlns:r="http://schemas.openxmlformats.org/officeDocument/2006/relationships" xmlns:p="http://schemas.openxmlformats.org/presentationml/2006/main">
+  <p:tag name="OUTPUTDPI" val="1200"/>
+  <p:tag name="ORIGINALHEIGHT" val="260.9674"/>
+  <p:tag name="ORIGINALWIDTH" val="1325.834"/>
+  <p:tag name="LATEXADDIN" val="\documentclass{article}&#10;\usepackage{amsmath}&#10;\usepackage{xcolor}&#10;\usepackage{ragged2e}&#10;\pagestyle{empty}&#10;\begin{document}&#10;&#10;\definecolor{Monred}{RGB}{172,0,0}&#10;&#10;$ Exit \ to \ Distribution \\ System $&#10;&#10;&#10;\end{document}"/>
+  <p:tag name="IGUANATEXSIZE" val="20"/>
+  <p:tag name="IGUANATEXCURSOR" val="173"/>
+  <p:tag name="TRANSPARENCY" val="True"/>
+  <p:tag name="FILENAME" val=""/>
+  <p:tag name="LATEXENGINEID" val="0"/>
+  <p:tag name="TEMPFOLDER" val="c:\temp\"/>
+  <p:tag name="LATEXFORMHEIGHT" val="312"/>
+  <p:tag name="LATEXFORMWIDTH" val="384"/>
+  <p:tag name="LATEXFORMWRAP" val="True"/>
+  <p:tag name="BITMAPVECTOR" val="0"/>
+</p:tagLst>
+</file>
+
+<file path=ppt/tags/tag102.xml><?xml version="1.0" encoding="utf-8"?>
+<p:tagLst xmlns:a="http://schemas.openxmlformats.org/drawingml/2006/main" xmlns:r="http://schemas.openxmlformats.org/officeDocument/2006/relationships" xmlns:p="http://schemas.openxmlformats.org/presentationml/2006/main">
+  <p:tag name="OUTPUTDPI" val="1200"/>
   <p:tag name="ORIGINALHEIGHT" val="112.4859"/>
   <p:tag name="ORIGINALWIDTH" val="535.433"/>
   <p:tag name="LATEXADDIN" val="\documentclass{article}&#10;\usepackage{amsmath}&#10;\usepackage{xcolor}&#10;\usepackage{ragged2e}&#10;\pagestyle{empty}&#10;\begin{document}&#10;&#10;\definecolor{Monred}{RGB}{172,0,0}&#10;&#10;$ Overflow $&#10;&#10;&#10;&#10;\end{document}"/>
@@ -48967,11 +49127,11 @@
 <file path=ppt/tags/tag38.xml><?xml version="1.0" encoding="utf-8"?>
 <p:tagLst xmlns:a="http://schemas.openxmlformats.org/drawingml/2006/main" xmlns:r="http://schemas.openxmlformats.org/officeDocument/2006/relationships" xmlns:p="http://schemas.openxmlformats.org/presentationml/2006/main">
   <p:tag name="OUTPUTDPI" val="1200"/>
-  <p:tag name="ORIGINALHEIGHT" val="120.7349"/>
-  <p:tag name="ORIGINALWIDTH" val="479.1901"/>
-  <p:tag name="LATEXADDIN" val="\documentclass{article}&#10;\usepackage{amsmath}&#10;\usepackage{xcolor}&#10;\usepackage{ragged2e}&#10;\pagestyle{empty}&#10;\begin{document}&#10;&#10;\definecolor{Monred}{RGB}{172,0,0}&#10;&#10;$ H_{FiLayer} $&#10;&#10;&#10;\end{document}"/>
+  <p:tag name="ORIGINALHEIGHT" val="87.73905"/>
+  <p:tag name="ORIGINALWIDTH" val="357.7053"/>
+  <p:tag name="LATEXADDIN" val="\documentclass{article}&#10;\usepackage{amsmath}&#10;\usepackage{xcolor}&#10;\usepackage{ragged2e}&#10;\pagestyle{empty}&#10;\begin{document}&#10;&#10;\definecolor{Monred}{RGB}{172,0,0}&#10;&#10;$&#10;Trunk&#10;$&#10;&#10;&#10;\end{document}"/>
   <p:tag name="IGUANATEXSIZE" val="20"/>
-  <p:tag name="IGUANATEXCURSOR" val="174"/>
+  <p:tag name="IGUANATEXCURSOR" val="168"/>
   <p:tag name="TRANSPARENCY" val="True"/>
   <p:tag name="FILENAME" val=""/>
   <p:tag name="LATEXENGINEID" val="0"/>
@@ -48987,10 +49147,10 @@
 <p:tagLst xmlns:a="http://schemas.openxmlformats.org/drawingml/2006/main" xmlns:r="http://schemas.openxmlformats.org/officeDocument/2006/relationships" xmlns:p="http://schemas.openxmlformats.org/presentationml/2006/main">
   <p:tag name="OUTPUTDPI" val="1200"/>
   <p:tag name="ORIGINALHEIGHT" val="87.73905"/>
-  <p:tag name="ORIGINALWIDTH" val="294.7131"/>
-  <p:tag name="LATEXADDIN" val="\documentclass{article}&#10;\usepackage{amsmath}&#10;\usepackage{xcolor}&#10;\usepackage{ragged2e}&#10;\pagestyle{empty}&#10;\begin{document}&#10;&#10;\definecolor{Monred}{RGB}{172,0,0}&#10;&#10;&#10;Inlets&#10;&#10;&#10;&#10;\end{document}"/>
+  <p:tag name="ORIGINALWIDTH" val="533.1833"/>
+  <p:tag name="LATEXADDIN" val="\documentclass{article}&#10;\usepackage{amsmath}&#10;\usepackage{xcolor}&#10;\usepackage{ragged2e}&#10;\pagestyle{empty}&#10;\begin{document}&#10;&#10;\definecolor{Monred}{RGB}{172,0,0}&#10;&#10;$ Branches $&#10;&#10;&#10;&#10;&#10;\end{document}"/>
   <p:tag name="IGUANATEXSIZE" val="20"/>
-  <p:tag name="IGUANATEXCURSOR" val="166"/>
+  <p:tag name="IGUANATEXCURSOR" val="172"/>
   <p:tag name="TRANSPARENCY" val="True"/>
   <p:tag name="FILENAME" val=""/>
   <p:tag name="LATEXENGINEID" val="0"/>
@@ -49024,6 +49184,44 @@
 <file path=ppt/tags/tag40.xml><?xml version="1.0" encoding="utf-8"?>
 <p:tagLst xmlns:a="http://schemas.openxmlformats.org/drawingml/2006/main" xmlns:r="http://schemas.openxmlformats.org/officeDocument/2006/relationships" xmlns:p="http://schemas.openxmlformats.org/presentationml/2006/main">
   <p:tag name="OUTPUTDPI" val="1200"/>
+  <p:tag name="ORIGINALHEIGHT" val="120.7349"/>
+  <p:tag name="ORIGINALWIDTH" val="479.1901"/>
+  <p:tag name="LATEXADDIN" val="\documentclass{article}&#10;\usepackage{amsmath}&#10;\usepackage{xcolor}&#10;\usepackage{ragged2e}&#10;\pagestyle{empty}&#10;\begin{document}&#10;&#10;\definecolor{Monred}{RGB}{172,0,0}&#10;&#10;$ H_{FiLayer} $&#10;&#10;&#10;\end{document}"/>
+  <p:tag name="IGUANATEXSIZE" val="20"/>
+  <p:tag name="IGUANATEXCURSOR" val="174"/>
+  <p:tag name="TRANSPARENCY" val="True"/>
+  <p:tag name="FILENAME" val=""/>
+  <p:tag name="LATEXENGINEID" val="0"/>
+  <p:tag name="TEMPFOLDER" val="c:\temp\"/>
+  <p:tag name="LATEXFORMHEIGHT" val="312"/>
+  <p:tag name="LATEXFORMWIDTH" val="384"/>
+  <p:tag name="LATEXFORMWRAP" val="True"/>
+  <p:tag name="BITMAPVECTOR" val="0"/>
+</p:tagLst>
+</file>
+
+<file path=ppt/tags/tag41.xml><?xml version="1.0" encoding="utf-8"?>
+<p:tagLst xmlns:a="http://schemas.openxmlformats.org/drawingml/2006/main" xmlns:r="http://schemas.openxmlformats.org/officeDocument/2006/relationships" xmlns:p="http://schemas.openxmlformats.org/presentationml/2006/main">
+  <p:tag name="OUTPUTDPI" val="1200"/>
+  <p:tag name="ORIGINALHEIGHT" val="87.73905"/>
+  <p:tag name="ORIGINALWIDTH" val="294.7131"/>
+  <p:tag name="LATEXADDIN" val="\documentclass{article}&#10;\usepackage{amsmath}&#10;\usepackage{xcolor}&#10;\usepackage{ragged2e}&#10;\pagestyle{empty}&#10;\begin{document}&#10;&#10;\definecolor{Monred}{RGB}{172,0,0}&#10;&#10;&#10;Inlets&#10;&#10;&#10;&#10;\end{document}"/>
+  <p:tag name="IGUANATEXSIZE" val="20"/>
+  <p:tag name="IGUANATEXCURSOR" val="166"/>
+  <p:tag name="TRANSPARENCY" val="True"/>
+  <p:tag name="FILENAME" val=""/>
+  <p:tag name="LATEXENGINEID" val="0"/>
+  <p:tag name="TEMPFOLDER" val="c:\temp\"/>
+  <p:tag name="LATEXFORMHEIGHT" val="312"/>
+  <p:tag name="LATEXFORMWIDTH" val="384"/>
+  <p:tag name="LATEXFORMWRAP" val="True"/>
+  <p:tag name="BITMAPVECTOR" val="0"/>
+</p:tagLst>
+</file>
+
+<file path=ppt/tags/tag42.xml><?xml version="1.0" encoding="utf-8"?>
+<p:tagLst xmlns:a="http://schemas.openxmlformats.org/drawingml/2006/main" xmlns:r="http://schemas.openxmlformats.org/officeDocument/2006/relationships" xmlns:p="http://schemas.openxmlformats.org/presentationml/2006/main">
+  <p:tag name="OUTPUTDPI" val="1200"/>
   <p:tag name="ORIGINALHEIGHT" val="90.73866"/>
   <p:tag name="ORIGINALWIDTH" val="391.4511"/>
   <p:tag name="LATEXADDIN" val="\documentclass{article}&#10;\usepackage{amsmath}&#10;\usepackage{xcolor}&#10;\usepackage{ragged2e}&#10;\pagestyle{empty}&#10;\begin{document}&#10;&#10;\definecolor{Monred}{RGB}{172,0,0}&#10;&#10;Outlets&#10;&#10;&#10;&#10;\end{document}"/>
@@ -49040,7 +49238,7 @@
 </p:tagLst>
 </file>
 
-<file path=ppt/tags/tag41.xml><?xml version="1.0" encoding="utf-8"?>
+<file path=ppt/tags/tag43.xml><?xml version="1.0" encoding="utf-8"?>
 <p:tagLst xmlns:a="http://schemas.openxmlformats.org/drawingml/2006/main" xmlns:r="http://schemas.openxmlformats.org/officeDocument/2006/relationships" xmlns:p="http://schemas.openxmlformats.org/presentationml/2006/main">
   <p:tag name="OUTPUTDPI" val="1200"/>
   <p:tag name="ORIGINALHEIGHT" val="124.4844"/>
@@ -49059,7 +49257,7 @@
 </p:tagLst>
 </file>
 
-<file path=ppt/tags/tag42.xml><?xml version="1.0" encoding="utf-8"?>
+<file path=ppt/tags/tag44.xml><?xml version="1.0" encoding="utf-8"?>
 <p:tagLst xmlns:a="http://schemas.openxmlformats.org/drawingml/2006/main" xmlns:r="http://schemas.openxmlformats.org/officeDocument/2006/relationships" xmlns:p="http://schemas.openxmlformats.org/presentationml/2006/main">
   <p:tag name="OUTPUTDPI" val="1200"/>
   <p:tag name="ORIGINALHEIGHT" val="124.4844"/>
@@ -49067,44 +49265,6 @@
   <p:tag name="LATEXADDIN" val="\documentclass{article}&#10;\usepackage{amsmath}&#10;\usepackage{xcolor}&#10;\usepackage{ragged2e}&#10;\pagestyle{empty}&#10;\begin{document}&#10;&#10;\definecolor{Monred}{RGB}{172,0,0}&#10;&#10;$ Q_{FiLayer} $&#10;&#10;&#10;&#10;\end{document}"/>
   <p:tag name="IGUANATEXSIZE" val="20"/>
   <p:tag name="IGUANATEXCURSOR" val="174"/>
-  <p:tag name="TRANSPARENCY" val="True"/>
-  <p:tag name="FILENAME" val=""/>
-  <p:tag name="LATEXENGINEID" val="0"/>
-  <p:tag name="TEMPFOLDER" val="c:\temp\"/>
-  <p:tag name="LATEXFORMHEIGHT" val="312"/>
-  <p:tag name="LATEXFORMWIDTH" val="384"/>
-  <p:tag name="LATEXFORMWRAP" val="True"/>
-  <p:tag name="BITMAPVECTOR" val="0"/>
-</p:tagLst>
-</file>
-
-<file path=ppt/tags/tag43.xml><?xml version="1.0" encoding="utf-8"?>
-<p:tagLst xmlns:a="http://schemas.openxmlformats.org/drawingml/2006/main" xmlns:r="http://schemas.openxmlformats.org/officeDocument/2006/relationships" xmlns:p="http://schemas.openxmlformats.org/presentationml/2006/main">
-  <p:tag name="OUTPUTDPI" val="1200"/>
-  <p:tag name="ORIGINALHEIGHT" val="124.4844"/>
-  <p:tag name="ORIGINALWIDTH" val="534.6832"/>
-  <p:tag name="LATEXADDIN" val="\documentclass{article}&#10;\usepackage{amsmath}&#10;\usepackage{xcolor}&#10;\usepackage{ragged2e}&#10;\pagestyle{empty}&#10;\begin{document}&#10;&#10;\definecolor{Monred}{RGB}{172,0,0}&#10;&#10;&#10;$ 2Q_{FiLayer} $&#10;&#10;\end{document}"/>
-  <p:tag name="IGUANATEXSIZE" val="20"/>
-  <p:tag name="IGUANATEXCURSOR" val="176"/>
-  <p:tag name="TRANSPARENCY" val="True"/>
-  <p:tag name="FILENAME" val=""/>
-  <p:tag name="LATEXENGINEID" val="0"/>
-  <p:tag name="TEMPFOLDER" val="c:\temp\"/>
-  <p:tag name="LATEXFORMHEIGHT" val="312"/>
-  <p:tag name="LATEXFORMWIDTH" val="384"/>
-  <p:tag name="LATEXFORMWRAP" val="True"/>
-  <p:tag name="BITMAPVECTOR" val="0"/>
-</p:tagLst>
-</file>
-
-<file path=ppt/tags/tag44.xml><?xml version="1.0" encoding="utf-8"?>
-<p:tagLst xmlns:a="http://schemas.openxmlformats.org/drawingml/2006/main" xmlns:r="http://schemas.openxmlformats.org/officeDocument/2006/relationships" xmlns:p="http://schemas.openxmlformats.org/presentationml/2006/main">
-  <p:tag name="OUTPUTDPI" val="1200"/>
-  <p:tag name="ORIGINALHEIGHT" val="124.4844"/>
-  <p:tag name="ORIGINALWIDTH" val="534.6832"/>
-  <p:tag name="LATEXADDIN" val="\documentclass{article}&#10;\usepackage{amsmath}&#10;\usepackage{xcolor}&#10;\usepackage{ragged2e}&#10;\pagestyle{empty}&#10;\begin{document}&#10;&#10;\definecolor{Monred}{RGB}{172,0,0}&#10;&#10;&#10;$ 2Q_{FiLayer} $&#10;&#10;\end{document}"/>
-  <p:tag name="IGUANATEXSIZE" val="20"/>
-  <p:tag name="IGUANATEXCURSOR" val="176"/>
   <p:tag name="TRANSPARENCY" val="True"/>
   <p:tag name="FILENAME" val=""/>
   <p:tag name="LATEXENGINEID" val="0"/>
@@ -49177,10 +49337,10 @@
 <p:tagLst xmlns:a="http://schemas.openxmlformats.org/drawingml/2006/main" xmlns:r="http://schemas.openxmlformats.org/officeDocument/2006/relationships" xmlns:p="http://schemas.openxmlformats.org/presentationml/2006/main">
   <p:tag name="OUTPUTDPI" val="1200"/>
   <p:tag name="ORIGINALHEIGHT" val="124.4844"/>
-  <p:tag name="ORIGINALWIDTH" val="360.7049"/>
-  <p:tag name="LATEXADDIN" val="\documentclass{article}&#10;\usepackage{amsmath}&#10;\usepackage{xcolor}&#10;\usepackage{ragged2e}&#10;\pagestyle{empty}&#10;\begin{document}&#10;&#10;\definecolor{Monred}{RGB}{172,0,0}&#10;&#10;$&#10;Q_{Layer}&#10;$&#10;&#10;&#10;&#10;\end{document}"/>
+  <p:tag name="ORIGINALWIDTH" val="534.6832"/>
+  <p:tag name="LATEXADDIN" val="\documentclass{article}&#10;\usepackage{amsmath}&#10;\usepackage{xcolor}&#10;\usepackage{ragged2e}&#10;\pagestyle{empty}&#10;\begin{document}&#10;&#10;\definecolor{Monred}{RGB}{172,0,0}&#10;&#10;&#10;$ 2Q_{FiLayer} $&#10;&#10;\end{document}"/>
   <p:tag name="IGUANATEXSIZE" val="20"/>
-  <p:tag name="IGUANATEXCURSOR" val="173"/>
+  <p:tag name="IGUANATEXCURSOR" val="176"/>
   <p:tag name="TRANSPARENCY" val="True"/>
   <p:tag name="FILENAME" val=""/>
   <p:tag name="LATEXENGINEID" val="0"/>
@@ -49196,10 +49356,10 @@
 <p:tagLst xmlns:a="http://schemas.openxmlformats.org/drawingml/2006/main" xmlns:r="http://schemas.openxmlformats.org/officeDocument/2006/relationships" xmlns:p="http://schemas.openxmlformats.org/presentationml/2006/main">
   <p:tag name="OUTPUTDPI" val="1200"/>
   <p:tag name="ORIGINALHEIGHT" val="124.4844"/>
-  <p:tag name="ORIGINALWIDTH" val="422.9472"/>
-  <p:tag name="LATEXADDIN" val="\documentclass{article}&#10;\usepackage{amsmath}&#10;\usepackage{xcolor}&#10;\usepackage{ragged2e}&#10;\pagestyle{empty}&#10;\begin{document}&#10;&#10;\definecolor{Monred}{RGB}{172,0,0}&#10;&#10;$&#10;2Q_{Layer}&#10;$&#10;&#10;&#10;&#10;\end{document}"/>
+  <p:tag name="ORIGINALWIDTH" val="534.6832"/>
+  <p:tag name="LATEXADDIN" val="\documentclass{article}&#10;\usepackage{amsmath}&#10;\usepackage{xcolor}&#10;\usepackage{ragged2e}&#10;\pagestyle{empty}&#10;\begin{document}&#10;&#10;\definecolor{Monred}{RGB}{172,0,0}&#10;&#10;&#10;$ 2Q_{FiLayer} $&#10;&#10;\end{document}"/>
   <p:tag name="IGUANATEXSIZE" val="20"/>
-  <p:tag name="IGUANATEXCURSOR" val="162"/>
+  <p:tag name="IGUANATEXCURSOR" val="176"/>
   <p:tag name="TRANSPARENCY" val="True"/>
   <p:tag name="FILENAME" val=""/>
   <p:tag name="LATEXENGINEID" val="0"/>
@@ -49253,6 +49413,25 @@
 <p:tagLst xmlns:a="http://schemas.openxmlformats.org/drawingml/2006/main" xmlns:r="http://schemas.openxmlformats.org/officeDocument/2006/relationships" xmlns:p="http://schemas.openxmlformats.org/presentationml/2006/main">
   <p:tag name="OUTPUTDPI" val="1200"/>
   <p:tag name="ORIGINALHEIGHT" val="124.4844"/>
+  <p:tag name="ORIGINALWIDTH" val="422.9472"/>
+  <p:tag name="LATEXADDIN" val="\documentclass{article}&#10;\usepackage{amsmath}&#10;\usepackage{xcolor}&#10;\usepackage{ragged2e}&#10;\pagestyle{empty}&#10;\begin{document}&#10;&#10;\definecolor{Monred}{RGB}{172,0,0}&#10;&#10;$&#10;2Q_{Layer}&#10;$&#10;&#10;&#10;&#10;\end{document}"/>
+  <p:tag name="IGUANATEXSIZE" val="20"/>
+  <p:tag name="IGUANATEXCURSOR" val="162"/>
+  <p:tag name="TRANSPARENCY" val="True"/>
+  <p:tag name="FILENAME" val=""/>
+  <p:tag name="LATEXENGINEID" val="0"/>
+  <p:tag name="TEMPFOLDER" val="c:\temp\"/>
+  <p:tag name="LATEXFORMHEIGHT" val="312"/>
+  <p:tag name="LATEXFORMWIDTH" val="384"/>
+  <p:tag name="LATEXFORMWRAP" val="True"/>
+  <p:tag name="BITMAPVECTOR" val="0"/>
+</p:tagLst>
+</file>
+
+<file path=ppt/tags/tag52.xml><?xml version="1.0" encoding="utf-8"?>
+<p:tagLst xmlns:a="http://schemas.openxmlformats.org/drawingml/2006/main" xmlns:r="http://schemas.openxmlformats.org/officeDocument/2006/relationships" xmlns:p="http://schemas.openxmlformats.org/presentationml/2006/main">
+  <p:tag name="OUTPUTDPI" val="1200"/>
+  <p:tag name="ORIGINALHEIGHT" val="124.4844"/>
   <p:tag name="ORIGINALWIDTH" val="360.7049"/>
   <p:tag name="LATEXADDIN" val="\documentclass{article}&#10;\usepackage{amsmath}&#10;\usepackage{xcolor}&#10;\usepackage{ragged2e}&#10;\pagestyle{empty}&#10;\begin{document}&#10;&#10;\definecolor{Monred}{RGB}{172,0,0}&#10;&#10;$&#10;Q_{Layer}&#10;$&#10;&#10;&#10;&#10;\end{document}"/>
   <p:tag name="IGUANATEXSIZE" val="20"/>
@@ -49268,7 +49447,26 @@
 </p:tagLst>
 </file>
 
-<file path=ppt/tags/tag52.xml><?xml version="1.0" encoding="utf-8"?>
+<file path=ppt/tags/tag53.xml><?xml version="1.0" encoding="utf-8"?>
+<p:tagLst xmlns:a="http://schemas.openxmlformats.org/drawingml/2006/main" xmlns:r="http://schemas.openxmlformats.org/officeDocument/2006/relationships" xmlns:p="http://schemas.openxmlformats.org/presentationml/2006/main">
+  <p:tag name="OUTPUTDPI" val="1200"/>
+  <p:tag name="ORIGINALHEIGHT" val="124.4844"/>
+  <p:tag name="ORIGINALWIDTH" val="360.7049"/>
+  <p:tag name="LATEXADDIN" val="\documentclass{article}&#10;\usepackage{amsmath}&#10;\usepackage{xcolor}&#10;\usepackage{ragged2e}&#10;\pagestyle{empty}&#10;\begin{document}&#10;&#10;\definecolor{Monred}{RGB}{172,0,0}&#10;&#10;$&#10;Q_{Layer}&#10;$&#10;&#10;&#10;&#10;\end{document}"/>
+  <p:tag name="IGUANATEXSIZE" val="20"/>
+  <p:tag name="IGUANATEXCURSOR" val="173"/>
+  <p:tag name="TRANSPARENCY" val="True"/>
+  <p:tag name="FILENAME" val=""/>
+  <p:tag name="LATEXENGINEID" val="0"/>
+  <p:tag name="TEMPFOLDER" val="c:\temp\"/>
+  <p:tag name="LATEXFORMHEIGHT" val="312"/>
+  <p:tag name="LATEXFORMWIDTH" val="384"/>
+  <p:tag name="LATEXFORMWRAP" val="True"/>
+  <p:tag name="BITMAPVECTOR" val="0"/>
+</p:tagLst>
+</file>
+
+<file path=ppt/tags/tag54.xml><?xml version="1.0" encoding="utf-8"?>
 <p:tagLst xmlns:a="http://schemas.openxmlformats.org/drawingml/2006/main" xmlns:r="http://schemas.openxmlformats.org/officeDocument/2006/relationships" xmlns:p="http://schemas.openxmlformats.org/presentationml/2006/main">
   <p:tag name="OUTPUTDPI" val="1200"/>
   <p:tag name="ORIGINALHEIGHT" val="111.7361"/>
@@ -49287,7 +49485,7 @@
 </p:tagLst>
 </file>
 
-<file path=ppt/tags/tag53.xml><?xml version="1.0" encoding="utf-8"?>
+<file path=ppt/tags/tag55.xml><?xml version="1.0" encoding="utf-8"?>
 <p:tagLst xmlns:a="http://schemas.openxmlformats.org/drawingml/2006/main" xmlns:r="http://schemas.openxmlformats.org/officeDocument/2006/relationships" xmlns:p="http://schemas.openxmlformats.org/presentationml/2006/main">
   <p:tag name="OUTPUTDPI" val="1200"/>
   <p:tag name="ORIGINALHEIGHT" val="111.7361"/>
@@ -49306,7 +49504,7 @@
 </p:tagLst>
 </file>
 
-<file path=ppt/tags/tag54.xml><?xml version="1.0" encoding="utf-8"?>
+<file path=ppt/tags/tag56.xml><?xml version="1.0" encoding="utf-8"?>
 <p:tagLst xmlns:a="http://schemas.openxmlformats.org/drawingml/2006/main" xmlns:r="http://schemas.openxmlformats.org/officeDocument/2006/relationships" xmlns:p="http://schemas.openxmlformats.org/presentationml/2006/main">
   <p:tag name="OUTPUTDPI" val="1200"/>
   <p:tag name="ORIGINALHEIGHT" val="125.9843"/>
@@ -49325,7 +49523,7 @@
 </p:tagLst>
 </file>
 
-<file path=ppt/tags/tag55.xml><?xml version="1.0" encoding="utf-8"?>
+<file path=ppt/tags/tag57.xml><?xml version="1.0" encoding="utf-8"?>
 <p:tagLst xmlns:a="http://schemas.openxmlformats.org/drawingml/2006/main" xmlns:r="http://schemas.openxmlformats.org/officeDocument/2006/relationships" xmlns:p="http://schemas.openxmlformats.org/presentationml/2006/main">
   <p:tag name="OUTPUTDPI" val="1200"/>
   <p:tag name="ORIGINALHEIGHT" val="125.9843"/>
@@ -49344,7 +49542,7 @@
 </p:tagLst>
 </file>
 
-<file path=ppt/tags/tag56.xml><?xml version="1.0" encoding="utf-8"?>
+<file path=ppt/tags/tag58.xml><?xml version="1.0" encoding="utf-8"?>
 <p:tagLst xmlns:a="http://schemas.openxmlformats.org/drawingml/2006/main" xmlns:r="http://schemas.openxmlformats.org/officeDocument/2006/relationships" xmlns:p="http://schemas.openxmlformats.org/presentationml/2006/main">
   <p:tag name="OUTPUTDPI" val="1200"/>
   <p:tag name="ORIGINALHEIGHT" val="125.9843"/>
@@ -49363,7 +49561,7 @@
 </p:tagLst>
 </file>
 
-<file path=ppt/tags/tag57.xml><?xml version="1.0" encoding="utf-8"?>
+<file path=ppt/tags/tag59.xml><?xml version="1.0" encoding="utf-8"?>
 <p:tagLst xmlns:a="http://schemas.openxmlformats.org/drawingml/2006/main" xmlns:r="http://schemas.openxmlformats.org/officeDocument/2006/relationships" xmlns:p="http://schemas.openxmlformats.org/presentationml/2006/main">
   <p:tag name="OUTPUTDPI" val="1200"/>
   <p:tag name="ORIGINALHEIGHT" val="109.4863"/>
@@ -49371,44 +49569,6 @@
   <p:tag name="LATEXADDIN" val="\documentclass{article}&#10;\usepackage{amsmath}&#10;\usepackage{xcolor}&#10;\usepackage{ragged2e}&#10;\pagestyle{empty}&#10;\begin{document}&#10;&#10;\definecolor{Monred}{RGB}{172,0,0}&#10;&#10;$&#10;A_{OutletSlots}&#10;$&#10;&#10;\end{document}"/>
   <p:tag name="IGUANATEXSIZE" val="20"/>
   <p:tag name="IGUANATEXCURSOR" val="174"/>
-  <p:tag name="TRANSPARENCY" val="True"/>
-  <p:tag name="FILENAME" val=""/>
-  <p:tag name="LATEXENGINEID" val="0"/>
-  <p:tag name="TEMPFOLDER" val="c:\temp\"/>
-  <p:tag name="LATEXFORMHEIGHT" val="312"/>
-  <p:tag name="LATEXFORMWIDTH" val="384"/>
-  <p:tag name="LATEXFORMWRAP" val="True"/>
-  <p:tag name="BITMAPVECTOR" val="0"/>
-</p:tagLst>
-</file>
-
-<file path=ppt/tags/tag58.xml><?xml version="1.0" encoding="utf-8"?>
-<p:tagLst xmlns:a="http://schemas.openxmlformats.org/drawingml/2006/main" xmlns:r="http://schemas.openxmlformats.org/officeDocument/2006/relationships" xmlns:p="http://schemas.openxmlformats.org/presentationml/2006/main">
-  <p:tag name="OUTPUTDPI" val="1200"/>
-  <p:tag name="ORIGINALHEIGHT" val="125.9843"/>
-  <p:tag name="ORIGINALWIDTH" val="632.171"/>
-  <p:tag name="LATEXADDIN" val="\documentclass{article}&#10;\usepackage{amsmath}&#10;\usepackage{xcolor}&#10;\usepackage{ragged2e}&#10;\pagestyle{empty}&#10;\begin{document}&#10;&#10;\definecolor{Monred}{RGB}{172,0,0}&#10;&#10;$&#10;A_{BwOrifices}&#10;$&#10;&#10;\end{document}"/>
-  <p:tag name="IGUANATEXSIZE" val="20"/>
-  <p:tag name="IGUANATEXCURSOR" val="177"/>
-  <p:tag name="TRANSPARENCY" val="True"/>
-  <p:tag name="FILENAME" val=""/>
-  <p:tag name="LATEXENGINEID" val="0"/>
-  <p:tag name="TEMPFOLDER" val="c:\temp\"/>
-  <p:tag name="LATEXFORMHEIGHT" val="312"/>
-  <p:tag name="LATEXFORMWIDTH" val="384"/>
-  <p:tag name="LATEXFORMWRAP" val="True"/>
-  <p:tag name="BITMAPVECTOR" val="0"/>
-</p:tagLst>
-</file>
-
-<file path=ppt/tags/tag59.xml><?xml version="1.0" encoding="utf-8"?>
-<p:tagLst xmlns:a="http://schemas.openxmlformats.org/drawingml/2006/main" xmlns:r="http://schemas.openxmlformats.org/officeDocument/2006/relationships" xmlns:p="http://schemas.openxmlformats.org/presentationml/2006/main">
-  <p:tag name="OUTPUTDPI" val="1200"/>
-  <p:tag name="ORIGINALHEIGHT" val="89.23882"/>
-  <p:tag name="ORIGINALWIDTH" val="86.23921"/>
-  <p:tag name="LATEXADDIN" val="\documentclass{article}&#10;\usepackage{amsmath}&#10;\usepackage{xcolor}&#10;\usepackage{ragged2e}&#10;\pagestyle{empty}&#10;\begin{document}&#10;&#10;\definecolor{Monred}{RGB}{172,0,0}&#10;&#10;$&#10;A$&#10;&#10;\end{document}"/>
-  <p:tag name="IGUANATEXSIZE" val="20"/>
-  <p:tag name="IGUANATEXCURSOR" val="162"/>
   <p:tag name="TRANSPARENCY" val="True"/>
   <p:tag name="FILENAME" val=""/>
   <p:tag name="LATEXENGINEID" val="0"/>
@@ -49442,6 +49602,44 @@
 <file path=ppt/tags/tag60.xml><?xml version="1.0" encoding="utf-8"?>
 <p:tagLst xmlns:a="http://schemas.openxmlformats.org/drawingml/2006/main" xmlns:r="http://schemas.openxmlformats.org/officeDocument/2006/relationships" xmlns:p="http://schemas.openxmlformats.org/presentationml/2006/main">
   <p:tag name="OUTPUTDPI" val="1200"/>
+  <p:tag name="ORIGINALHEIGHT" val="125.9843"/>
+  <p:tag name="ORIGINALWIDTH" val="632.171"/>
+  <p:tag name="LATEXADDIN" val="\documentclass{article}&#10;\usepackage{amsmath}&#10;\usepackage{xcolor}&#10;\usepackage{ragged2e}&#10;\pagestyle{empty}&#10;\begin{document}&#10;&#10;\definecolor{Monred}{RGB}{172,0,0}&#10;&#10;$&#10;A_{BwOrifices}&#10;$&#10;&#10;\end{document}"/>
+  <p:tag name="IGUANATEXSIZE" val="20"/>
+  <p:tag name="IGUANATEXCURSOR" val="177"/>
+  <p:tag name="TRANSPARENCY" val="True"/>
+  <p:tag name="FILENAME" val=""/>
+  <p:tag name="LATEXENGINEID" val="0"/>
+  <p:tag name="TEMPFOLDER" val="c:\temp\"/>
+  <p:tag name="LATEXFORMHEIGHT" val="312"/>
+  <p:tag name="LATEXFORMWIDTH" val="384"/>
+  <p:tag name="LATEXFORMWRAP" val="True"/>
+  <p:tag name="BITMAPVECTOR" val="0"/>
+</p:tagLst>
+</file>
+
+<file path=ppt/tags/tag61.xml><?xml version="1.0" encoding="utf-8"?>
+<p:tagLst xmlns:a="http://schemas.openxmlformats.org/drawingml/2006/main" xmlns:r="http://schemas.openxmlformats.org/officeDocument/2006/relationships" xmlns:p="http://schemas.openxmlformats.org/presentationml/2006/main">
+  <p:tag name="OUTPUTDPI" val="1200"/>
+  <p:tag name="ORIGINALHEIGHT" val="89.23882"/>
+  <p:tag name="ORIGINALWIDTH" val="86.23921"/>
+  <p:tag name="LATEXADDIN" val="\documentclass{article}&#10;\usepackage{amsmath}&#10;\usepackage{xcolor}&#10;\usepackage{ragged2e}&#10;\pagestyle{empty}&#10;\begin{document}&#10;&#10;\definecolor{Monred}{RGB}{172,0,0}&#10;&#10;$&#10;A$&#10;&#10;\end{document}"/>
+  <p:tag name="IGUANATEXSIZE" val="20"/>
+  <p:tag name="IGUANATEXCURSOR" val="162"/>
+  <p:tag name="TRANSPARENCY" val="True"/>
+  <p:tag name="FILENAME" val=""/>
+  <p:tag name="LATEXENGINEID" val="0"/>
+  <p:tag name="TEMPFOLDER" val="c:\temp\"/>
+  <p:tag name="LATEXFORMHEIGHT" val="312"/>
+  <p:tag name="LATEXFORMWIDTH" val="384"/>
+  <p:tag name="LATEXFORMWRAP" val="True"/>
+  <p:tag name="BITMAPVECTOR" val="0"/>
+</p:tagLst>
+</file>
+
+<file path=ppt/tags/tag62.xml><?xml version="1.0" encoding="utf-8"?>
+<p:tagLst xmlns:a="http://schemas.openxmlformats.org/drawingml/2006/main" xmlns:r="http://schemas.openxmlformats.org/officeDocument/2006/relationships" xmlns:p="http://schemas.openxmlformats.org/presentationml/2006/main">
+  <p:tag name="OUTPUTDPI" val="1200"/>
   <p:tag name="ORIGINALHEIGHT" val="74.24071"/>
   <p:tag name="ORIGINALWIDTH" val="554.1807"/>
   <p:tag name="LATEXADDIN" val="\documentclass{article}&#10;\usepackage{amsmath}&#10;\usepackage{xcolor}&#10;\usepackage{ragged2e}&#10;\pagestyle{empty}&#10;\begin{document}&#10;&#10;\definecolor{Monred}{RGB}{172,0,0}&#10;&#10;$&#10;\epsilon_{FilterSand}&#10;$&#10;&#10;&#10;&#10;\end{document}"/>
@@ -49458,7 +49656,7 @@
 </p:tagLst>
 </file>
 
-<file path=ppt/tags/tag61.xml><?xml version="1.0" encoding="utf-8"?>
+<file path=ppt/tags/tag63.xml><?xml version="1.0" encoding="utf-8"?>
 <p:tagLst xmlns:a="http://schemas.openxmlformats.org/drawingml/2006/main" xmlns:r="http://schemas.openxmlformats.org/officeDocument/2006/relationships" xmlns:p="http://schemas.openxmlformats.org/presentationml/2006/main">
   <p:tag name="OUTPUTDPI" val="1200"/>
   <p:tag name="ORIGINALHEIGHT" val="55.49307"/>
@@ -49466,44 +49664,6 @@
   <p:tag name="LATEXADDIN" val="\documentclass{article}&#10;\usepackage{amsmath}&#10;\usepackage{xcolor}&#10;\usepackage{ragged2e}&#10;\pagestyle{empty}&#10;\begin{document}&#10;&#10;\definecolor{Monred}{RGB}{172,0,0}&#10;&#10;$&#10;\epsilon$&#10;&#10;&#10;&#10;\end{document}"/>
   <p:tag name="IGUANATEXSIZE" val="20"/>
   <p:tag name="IGUANATEXCURSOR" val="169"/>
-  <p:tag name="TRANSPARENCY" val="True"/>
-  <p:tag name="FILENAME" val=""/>
-  <p:tag name="LATEXENGINEID" val="0"/>
-  <p:tag name="TEMPFOLDER" val="c:\temp\"/>
-  <p:tag name="LATEXFORMHEIGHT" val="312"/>
-  <p:tag name="LATEXFORMWIDTH" val="384"/>
-  <p:tag name="LATEXFORMWRAP" val="True"/>
-  <p:tag name="BITMAPVECTOR" val="0"/>
-</p:tagLst>
-</file>
-
-<file path=ppt/tags/tag62.xml><?xml version="1.0" encoding="utf-8"?>
-<p:tagLst xmlns:a="http://schemas.openxmlformats.org/drawingml/2006/main" xmlns:r="http://schemas.openxmlformats.org/officeDocument/2006/relationships" xmlns:p="http://schemas.openxmlformats.org/presentationml/2006/main">
-  <p:tag name="OUTPUTDPI" val="1200"/>
-  <p:tag name="ORIGINALHEIGHT" val="83.23961"/>
-  <p:tag name="ORIGINALWIDTH" val="41.99472"/>
-  <p:tag name="LATEXADDIN" val="\documentclass{article}&#10;\usepackage{amsmath}&#10;\usepackage{xcolor}&#10;\usepackage{ragged2e}&#10;\pagestyle{empty}&#10;\begin{document}&#10;&#10;\definecolor{Monred}{RGB}{172,0,0}&#10;&#10;$ 1 $&#10;&#10;&#10;\end{document}"/>
-  <p:tag name="IGUANATEXSIZE" val="20"/>
-  <p:tag name="IGUANATEXCURSOR" val="164"/>
-  <p:tag name="TRANSPARENCY" val="True"/>
-  <p:tag name="FILENAME" val=""/>
-  <p:tag name="LATEXENGINEID" val="0"/>
-  <p:tag name="TEMPFOLDER" val="c:\temp\"/>
-  <p:tag name="LATEXFORMHEIGHT" val="312"/>
-  <p:tag name="LATEXFORMWIDTH" val="384"/>
-  <p:tag name="LATEXFORMWRAP" val="True"/>
-  <p:tag name="BITMAPVECTOR" val="0"/>
-</p:tagLst>
-</file>
-
-<file path=ppt/tags/tag63.xml><?xml version="1.0" encoding="utf-8"?>
-<p:tagLst xmlns:a="http://schemas.openxmlformats.org/drawingml/2006/main" xmlns:r="http://schemas.openxmlformats.org/officeDocument/2006/relationships" xmlns:p="http://schemas.openxmlformats.org/presentationml/2006/main">
-  <p:tag name="OUTPUTDPI" val="1200"/>
-  <p:tag name="ORIGINALHEIGHT" val="83.23961"/>
-  <p:tag name="ORIGINALWIDTH" val="41.99472"/>
-  <p:tag name="LATEXADDIN" val="\documentclass{article}&#10;\usepackage{amsmath}&#10;\usepackage{xcolor}&#10;\usepackage{ragged2e}&#10;\pagestyle{empty}&#10;\begin{document}&#10;&#10;\definecolor{Monred}{RGB}{172,0,0}&#10;&#10;$ 1 $&#10;&#10;&#10;\end{document}"/>
-  <p:tag name="IGUANATEXSIZE" val="20"/>
-  <p:tag name="IGUANATEXCURSOR" val="164"/>
   <p:tag name="TRANSPARENCY" val="True"/>
   <p:tag name="FILENAME" val=""/>
   <p:tag name="LATEXENGINEID" val="0"/>
@@ -49556,11 +49716,11 @@
 <file path=ppt/tags/tag66.xml><?xml version="1.0" encoding="utf-8"?>
 <p:tagLst xmlns:a="http://schemas.openxmlformats.org/drawingml/2006/main" xmlns:r="http://schemas.openxmlformats.org/officeDocument/2006/relationships" xmlns:p="http://schemas.openxmlformats.org/presentationml/2006/main">
   <p:tag name="OUTPUTDPI" val="1200"/>
-  <p:tag name="ORIGINALHEIGHT" val="122.2347"/>
-  <p:tag name="ORIGINALWIDTH" val="590.9261"/>
-  <p:tag name="LATEXADDIN" val="\documentclass{article}&#10;\usepackage{amsmath}&#10;\usepackage{xcolor}&#10;\usepackage{ragged2e}&#10;\pagestyle{empty}&#10;\begin{document}&#10;&#10;\definecolor{Monred}{RGB}{172,0,0}&#10;&#10;$&#10;\Pi_{VCOrifice}&#10;$&#10;&#10;\end{document}"/>
+  <p:tag name="ORIGINALHEIGHT" val="83.23961"/>
+  <p:tag name="ORIGINALWIDTH" val="41.99472"/>
+  <p:tag name="LATEXADDIN" val="\documentclass{article}&#10;\usepackage{amsmath}&#10;\usepackage{xcolor}&#10;\usepackage{ragged2e}&#10;\pagestyle{empty}&#10;\begin{document}&#10;&#10;\definecolor{Monred}{RGB}{172,0,0}&#10;&#10;$ 1 $&#10;&#10;&#10;\end{document}"/>
   <p:tag name="IGUANATEXSIZE" val="20"/>
-  <p:tag name="IGUANATEXCURSOR" val="178"/>
+  <p:tag name="IGUANATEXCURSOR" val="164"/>
   <p:tag name="TRANSPARENCY" val="True"/>
   <p:tag name="FILENAME" val=""/>
   <p:tag name="LATEXENGINEID" val="0"/>
@@ -49575,11 +49735,11 @@
 <file path=ppt/tags/tag67.xml><?xml version="1.0" encoding="utf-8"?>
 <p:tagLst xmlns:a="http://schemas.openxmlformats.org/drawingml/2006/main" xmlns:r="http://schemas.openxmlformats.org/officeDocument/2006/relationships" xmlns:p="http://schemas.openxmlformats.org/presentationml/2006/main">
   <p:tag name="OUTPUTDPI" val="1200"/>
-  <p:tag name="ORIGINALHEIGHT" val="122.2347"/>
-  <p:tag name="ORIGINALWIDTH" val="590.9261"/>
-  <p:tag name="LATEXADDIN" val="\documentclass{article}&#10;\usepackage{amsmath}&#10;\usepackage{xcolor}&#10;\usepackage{ragged2e}&#10;\pagestyle{empty}&#10;\begin{document}&#10;&#10;\definecolor{Monred}{RGB}{172,0,0}&#10;&#10;$&#10;\Pi_{VCOrifice}&#10;$&#10;&#10;\end{document}"/>
+  <p:tag name="ORIGINALHEIGHT" val="83.23961"/>
+  <p:tag name="ORIGINALWIDTH" val="41.99472"/>
+  <p:tag name="LATEXADDIN" val="\documentclass{article}&#10;\usepackage{amsmath}&#10;\usepackage{xcolor}&#10;\usepackage{ragged2e}&#10;\pagestyle{empty}&#10;\begin{document}&#10;&#10;\definecolor{Monred}{RGB}{172,0,0}&#10;&#10;$ 1 $&#10;&#10;&#10;\end{document}"/>
   <p:tag name="IGUANATEXSIZE" val="20"/>
-  <p:tag name="IGUANATEXCURSOR" val="178"/>
+  <p:tag name="IGUANATEXCURSOR" val="164"/>
   <p:tag name="TRANSPARENCY" val="True"/>
   <p:tag name="FILENAME" val=""/>
   <p:tag name="LATEXENGINEID" val="0"/>
@@ -49670,11 +49830,11 @@
 <file path=ppt/tags/tag71.xml><?xml version="1.0" encoding="utf-8"?>
 <p:tagLst xmlns:a="http://schemas.openxmlformats.org/drawingml/2006/main" xmlns:r="http://schemas.openxmlformats.org/officeDocument/2006/relationships" xmlns:p="http://schemas.openxmlformats.org/presentationml/2006/main">
   <p:tag name="OUTPUTDPI" val="1200"/>
-  <p:tag name="ORIGINALHEIGHT" val="85.48929"/>
-  <p:tag name="ORIGINALWIDTH" val="85.48929"/>
-  <p:tag name="LATEXADDIN" val="\documentclass{article}&#10;\usepackage{amsmath}&#10;\usepackage{xcolor}&#10;\usepackage{ragged2e}&#10;\pagestyle{empty}&#10;\begin{document}&#10;&#10;\definecolor{Monred}{RGB}{172,0,0}&#10;&#10;$&#10;\Pi$&#10;&#10;\end{document}"/>
+  <p:tag name="ORIGINALHEIGHT" val="122.2347"/>
+  <p:tag name="ORIGINALWIDTH" val="590.9261"/>
+  <p:tag name="LATEXADDIN" val="\documentclass{article}&#10;\usepackage{amsmath}&#10;\usepackage{xcolor}&#10;\usepackage{ragged2e}&#10;\pagestyle{empty}&#10;\begin{document}&#10;&#10;\definecolor{Monred}{RGB}{172,0,0}&#10;&#10;$&#10;\Pi_{VCOrifice}&#10;$&#10;&#10;\end{document}"/>
   <p:tag name="IGUANATEXSIZE" val="20"/>
-  <p:tag name="IGUANATEXCURSOR" val="164"/>
+  <p:tag name="IGUANATEXCURSOR" val="178"/>
   <p:tag name="TRANSPARENCY" val="True"/>
   <p:tag name="FILENAME" val=""/>
   <p:tag name="LATEXENGINEID" val="0"/>
@@ -49689,11 +49849,11 @@
 <file path=ppt/tags/tag72.xml><?xml version="1.0" encoding="utf-8"?>
 <p:tagLst xmlns:a="http://schemas.openxmlformats.org/drawingml/2006/main" xmlns:r="http://schemas.openxmlformats.org/officeDocument/2006/relationships" xmlns:p="http://schemas.openxmlformats.org/presentationml/2006/main">
   <p:tag name="OUTPUTDPI" val="1200"/>
-  <p:tag name="ORIGINALHEIGHT" val="80.24"/>
-  <p:tag name="ORIGINALWIDTH" val="57.74276"/>
-  <p:tag name="LATEXADDIN" val="\documentclass{article}&#10;\usepackage{amsmath}&#10;\usepackage{xcolor}&#10;\usepackage{ragged2e}&#10;\pagestyle{empty}&#10;\begin{document}&#10;&#10;\definecolor{Monred}{RGB}{172,0,0}&#10;&#10;&#10;$&#10;g&#10;$&#10;&#10;\end{document}"/>
+  <p:tag name="ORIGINALHEIGHT" val="122.2347"/>
+  <p:tag name="ORIGINALWIDTH" val="590.9261"/>
+  <p:tag name="LATEXADDIN" val="\documentclass{article}&#10;\usepackage{amsmath}&#10;\usepackage{xcolor}&#10;\usepackage{ragged2e}&#10;\pagestyle{empty}&#10;\begin{document}&#10;&#10;\definecolor{Monred}{RGB}{172,0,0}&#10;&#10;$&#10;\Pi_{VCOrifice}&#10;$&#10;&#10;\end{document}"/>
   <p:tag name="IGUANATEXSIZE" val="20"/>
-  <p:tag name="IGUANATEXCURSOR" val="165"/>
+  <p:tag name="IGUANATEXCURSOR" val="178"/>
   <p:tag name="TRANSPARENCY" val="True"/>
   <p:tag name="FILENAME" val=""/>
   <p:tag name="LATEXENGINEID" val="0"/>
@@ -49708,11 +49868,11 @@
 <file path=ppt/tags/tag73.xml><?xml version="1.0" encoding="utf-8"?>
 <p:tagLst xmlns:a="http://schemas.openxmlformats.org/drawingml/2006/main" xmlns:r="http://schemas.openxmlformats.org/officeDocument/2006/relationships" xmlns:p="http://schemas.openxmlformats.org/presentationml/2006/main">
   <p:tag name="OUTPUTDPI" val="1200"/>
-  <p:tag name="ORIGINALHEIGHT" val="80.24"/>
-  <p:tag name="ORIGINALWIDTH" val="57.74276"/>
-  <p:tag name="LATEXADDIN" val="\documentclass{article}&#10;\usepackage{amsmath}&#10;\usepackage{xcolor}&#10;\usepackage{ragged2e}&#10;\pagestyle{empty}&#10;\begin{document}&#10;&#10;\definecolor{Monred}{RGB}{172,0,0}&#10;&#10;&#10;$&#10;g&#10;$&#10;&#10;\end{document}"/>
+  <p:tag name="ORIGINALHEIGHT" val="85.48929"/>
+  <p:tag name="ORIGINALWIDTH" val="85.48929"/>
+  <p:tag name="LATEXADDIN" val="\documentclass{article}&#10;\usepackage{amsmath}&#10;\usepackage{xcolor}&#10;\usepackage{ragged2e}&#10;\pagestyle{empty}&#10;\begin{document}&#10;&#10;\definecolor{Monred}{RGB}{172,0,0}&#10;&#10;$&#10;\Pi$&#10;&#10;\end{document}"/>
   <p:tag name="IGUANATEXSIZE" val="20"/>
-  <p:tag name="IGUANATEXCURSOR" val="165"/>
+  <p:tag name="IGUANATEXCURSOR" val="164"/>
   <p:tag name="TRANSPARENCY" val="True"/>
   <p:tag name="FILENAME" val=""/>
   <p:tag name="LATEXENGINEID" val="0"/>
@@ -49803,11 +49963,11 @@
 <file path=ppt/tags/tag78.xml><?xml version="1.0" encoding="utf-8"?>
 <p:tagLst xmlns:a="http://schemas.openxmlformats.org/drawingml/2006/main" xmlns:r="http://schemas.openxmlformats.org/officeDocument/2006/relationships" xmlns:p="http://schemas.openxmlformats.org/presentationml/2006/main">
   <p:tag name="OUTPUTDPI" val="1200"/>
-  <p:tag name="ORIGINALHEIGHT" val="121.4848"/>
-  <p:tag name="ORIGINALWIDTH" val="1097.863"/>
-  <p:tag name="LATEXADDIN" val="\documentclass{article}&#10;\usepackage{amsmath}&#10;\usepackage{xcolor}&#10;\usepackage{ragged2e}&#10;\pagestyle{empty}&#10;\begin{document}&#10;&#10;\definecolor{Monred}{RGB}{172,0,0}&#10;&#10;$&#10;HL_{BwOrificeForward}&#10;$&#10;&#10;&#10;&#10;\end{document}"/>
+  <p:tag name="ORIGINALHEIGHT" val="80.24"/>
+  <p:tag name="ORIGINALWIDTH" val="57.74276"/>
+  <p:tag name="LATEXADDIN" val="\documentclass{article}&#10;\usepackage{amsmath}&#10;\usepackage{xcolor}&#10;\usepackage{ragged2e}&#10;\pagestyle{empty}&#10;\begin{document}&#10;&#10;\definecolor{Monred}{RGB}{172,0,0}&#10;&#10;&#10;$&#10;g&#10;$&#10;&#10;\end{document}"/>
   <p:tag name="IGUANATEXSIZE" val="20"/>
-  <p:tag name="IGUANATEXCURSOR" val="185"/>
+  <p:tag name="IGUANATEXCURSOR" val="165"/>
   <p:tag name="TRANSPARENCY" val="True"/>
   <p:tag name="FILENAME" val=""/>
   <p:tag name="LATEXENGINEID" val="0"/>
@@ -49822,11 +49982,11 @@
 <file path=ppt/tags/tag79.xml><?xml version="1.0" encoding="utf-8"?>
 <p:tagLst xmlns:a="http://schemas.openxmlformats.org/drawingml/2006/main" xmlns:r="http://schemas.openxmlformats.org/officeDocument/2006/relationships" xmlns:p="http://schemas.openxmlformats.org/presentationml/2006/main">
   <p:tag name="OUTPUTDPI" val="1200"/>
-  <p:tag name="ORIGINALHEIGHT" val="121.4848"/>
-  <p:tag name="ORIGINALWIDTH" val="1172.853"/>
-  <p:tag name="LATEXADDIN" val="\documentclass{article}&#10;\usepackage{amsmath}&#10;\usepackage{xcolor}&#10;\usepackage{ragged2e}&#10;\pagestyle{empty}&#10;\begin{document}&#10;&#10;\definecolor{Monred}{RGB}{172,0,0}&#10;&#10;$&#10;HL_{InletOrificeForward}&#10;$&#10;&#10;&#10;&#10;\end{document}"/>
+  <p:tag name="ORIGINALHEIGHT" val="80.24"/>
+  <p:tag name="ORIGINALWIDTH" val="57.74276"/>
+  <p:tag name="LATEXADDIN" val="\documentclass{article}&#10;\usepackage{amsmath}&#10;\usepackage{xcolor}&#10;\usepackage{ragged2e}&#10;\pagestyle{empty}&#10;\begin{document}&#10;&#10;\definecolor{Monred}{RGB}{172,0,0}&#10;&#10;&#10;$&#10;g&#10;$&#10;&#10;\end{document}"/>
   <p:tag name="IGUANATEXSIZE" val="20"/>
-  <p:tag name="IGUANATEXCURSOR" val="170"/>
+  <p:tag name="IGUANATEXCURSOR" val="165"/>
   <p:tag name="TRANSPARENCY" val="True"/>
   <p:tag name="FILENAME" val=""/>
   <p:tag name="LATEXENGINEID" val="0"/>
@@ -49861,6 +50021,44 @@
 <p:tagLst xmlns:a="http://schemas.openxmlformats.org/drawingml/2006/main" xmlns:r="http://schemas.openxmlformats.org/officeDocument/2006/relationships" xmlns:p="http://schemas.openxmlformats.org/presentationml/2006/main">
   <p:tag name="OUTPUTDPI" val="1200"/>
   <p:tag name="ORIGINALHEIGHT" val="121.4848"/>
+  <p:tag name="ORIGINALWIDTH" val="1097.863"/>
+  <p:tag name="LATEXADDIN" val="\documentclass{article}&#10;\usepackage{amsmath}&#10;\usepackage{xcolor}&#10;\usepackage{ragged2e}&#10;\pagestyle{empty}&#10;\begin{document}&#10;&#10;\definecolor{Monred}{RGB}{172,0,0}&#10;&#10;$&#10;HL_{BwOrificeForward}&#10;$&#10;&#10;&#10;&#10;\end{document}"/>
+  <p:tag name="IGUANATEXSIZE" val="20"/>
+  <p:tag name="IGUANATEXCURSOR" val="185"/>
+  <p:tag name="TRANSPARENCY" val="True"/>
+  <p:tag name="FILENAME" val=""/>
+  <p:tag name="LATEXENGINEID" val="0"/>
+  <p:tag name="TEMPFOLDER" val="c:\temp\"/>
+  <p:tag name="LATEXFORMHEIGHT" val="312"/>
+  <p:tag name="LATEXFORMWIDTH" val="384"/>
+  <p:tag name="LATEXFORMWRAP" val="True"/>
+  <p:tag name="BITMAPVECTOR" val="0"/>
+</p:tagLst>
+</file>
+
+<file path=ppt/tags/tag81.xml><?xml version="1.0" encoding="utf-8"?>
+<p:tagLst xmlns:a="http://schemas.openxmlformats.org/drawingml/2006/main" xmlns:r="http://schemas.openxmlformats.org/officeDocument/2006/relationships" xmlns:p="http://schemas.openxmlformats.org/presentationml/2006/main">
+  <p:tag name="OUTPUTDPI" val="1200"/>
+  <p:tag name="ORIGINALHEIGHT" val="121.4848"/>
+  <p:tag name="ORIGINALWIDTH" val="1172.853"/>
+  <p:tag name="LATEXADDIN" val="\documentclass{article}&#10;\usepackage{amsmath}&#10;\usepackage{xcolor}&#10;\usepackage{ragged2e}&#10;\pagestyle{empty}&#10;\begin{document}&#10;&#10;\definecolor{Monred}{RGB}{172,0,0}&#10;&#10;$&#10;HL_{InletOrificeForward}&#10;$&#10;&#10;&#10;&#10;\end{document}"/>
+  <p:tag name="IGUANATEXSIZE" val="20"/>
+  <p:tag name="IGUANATEXCURSOR" val="170"/>
+  <p:tag name="TRANSPARENCY" val="True"/>
+  <p:tag name="FILENAME" val=""/>
+  <p:tag name="LATEXENGINEID" val="0"/>
+  <p:tag name="TEMPFOLDER" val="c:\temp\"/>
+  <p:tag name="LATEXFORMHEIGHT" val="312"/>
+  <p:tag name="LATEXFORMWIDTH" val="384"/>
+  <p:tag name="LATEXFORMWRAP" val="True"/>
+  <p:tag name="BITMAPVECTOR" val="0"/>
+</p:tagLst>
+</file>
+
+<file path=ppt/tags/tag82.xml><?xml version="1.0" encoding="utf-8"?>
+<p:tagLst xmlns:a="http://schemas.openxmlformats.org/drawingml/2006/main" xmlns:r="http://schemas.openxmlformats.org/officeDocument/2006/relationships" xmlns:p="http://schemas.openxmlformats.org/presentationml/2006/main">
+  <p:tag name="OUTPUTDPI" val="1200"/>
+  <p:tag name="ORIGINALHEIGHT" val="121.4848"/>
   <p:tag name="ORIGINALWIDTH" val="1345.332"/>
   <p:tag name="LATEXADDIN" val="\documentclass{article}&#10;\usepackage{amsmath}&#10;\usepackage{xcolor}&#10;\usepackage{ragged2e}&#10;\pagestyle{empty}&#10;\begin{document}&#10;&#10;\definecolor{Monred}{RGB}{172,0,0}&#10;&#10;$&#10;HL_{TopInletOrificeForward}&#10;$&#10;&#10;&#10;&#10;\end{document}"/>
   <p:tag name="IGUANATEXSIZE" val="20"/>
@@ -49876,7 +50074,7 @@
 </p:tagLst>
 </file>
 
-<file path=ppt/tags/tag81.xml><?xml version="1.0" encoding="utf-8"?>
+<file path=ppt/tags/tag83.xml><?xml version="1.0" encoding="utf-8"?>
 <p:tagLst xmlns:a="http://schemas.openxmlformats.org/drawingml/2006/main" xmlns:r="http://schemas.openxmlformats.org/officeDocument/2006/relationships" xmlns:p="http://schemas.openxmlformats.org/presentationml/2006/main">
   <p:tag name="OUTPUTDPI" val="1200"/>
   <p:tag name="ORIGINALHEIGHT" val="104.9868"/>
@@ -49895,7 +50093,7 @@
 </p:tagLst>
 </file>
 
-<file path=ppt/tags/tag82.xml><?xml version="1.0" encoding="utf-8"?>
+<file path=ppt/tags/tag84.xml><?xml version="1.0" encoding="utf-8"?>
 <p:tagLst xmlns:a="http://schemas.openxmlformats.org/drawingml/2006/main" xmlns:r="http://schemas.openxmlformats.org/officeDocument/2006/relationships" xmlns:p="http://schemas.openxmlformats.org/presentationml/2006/main">
   <p:tag name="OUTPUTDPI" val="1200"/>
   <p:tag name="ORIGINALHEIGHT" val="121.4848"/>
@@ -49914,7 +50112,7 @@
 </p:tagLst>
 </file>
 
-<file path=ppt/tags/tag83.xml><?xml version="1.0" encoding="utf-8"?>
+<file path=ppt/tags/tag85.xml><?xml version="1.0" encoding="utf-8"?>
 <p:tagLst xmlns:a="http://schemas.openxmlformats.org/drawingml/2006/main" xmlns:r="http://schemas.openxmlformats.org/officeDocument/2006/relationships" xmlns:p="http://schemas.openxmlformats.org/presentationml/2006/main">
   <p:tag name="OUTPUTDPI" val="1200"/>
   <p:tag name="ORIGINALHEIGHT" val="87.73905"/>
@@ -49933,7 +50131,7 @@
 </p:tagLst>
 </file>
 
-<file path=ppt/tags/tag84.xml><?xml version="1.0" encoding="utf-8"?>
+<file path=ppt/tags/tag86.xml><?xml version="1.0" encoding="utf-8"?>
 <p:tagLst xmlns:a="http://schemas.openxmlformats.org/drawingml/2006/main" xmlns:r="http://schemas.openxmlformats.org/officeDocument/2006/relationships" xmlns:p="http://schemas.openxmlformats.org/presentationml/2006/main">
   <p:tag name="OUTPUTDPI" val="1200"/>
   <p:tag name="ORIGINALHEIGHT" val="111.7361"/>
@@ -49952,7 +50150,7 @@
 </p:tagLst>
 </file>
 
-<file path=ppt/tags/tag85.xml><?xml version="1.0" encoding="utf-8"?>
+<file path=ppt/tags/tag87.xml><?xml version="1.0" encoding="utf-8"?>
 <p:tagLst xmlns:a="http://schemas.openxmlformats.org/drawingml/2006/main" xmlns:r="http://schemas.openxmlformats.org/officeDocument/2006/relationships" xmlns:p="http://schemas.openxmlformats.org/presentationml/2006/main">
   <p:tag name="OUTPUTDPI" val="1200"/>
   <p:tag name="ORIGINALHEIGHT" val="111.7361"/>
@@ -49971,7 +50169,7 @@
 </p:tagLst>
 </file>
 
-<file path=ppt/tags/tag86.xml><?xml version="1.0" encoding="utf-8"?>
+<file path=ppt/tags/tag88.xml><?xml version="1.0" encoding="utf-8"?>
 <p:tagLst xmlns:a="http://schemas.openxmlformats.org/drawingml/2006/main" xmlns:r="http://schemas.openxmlformats.org/officeDocument/2006/relationships" xmlns:p="http://schemas.openxmlformats.org/presentationml/2006/main">
   <p:tag name="OUTPUTDPI" val="1200"/>
   <p:tag name="ORIGINALHEIGHT" val="86.23921"/>
@@ -49990,7 +50188,7 @@
 </p:tagLst>
 </file>
 
-<file path=ppt/tags/tag87.xml><?xml version="1.0" encoding="utf-8"?>
+<file path=ppt/tags/tag89.xml><?xml version="1.0" encoding="utf-8"?>
 <p:tagLst xmlns:a="http://schemas.openxmlformats.org/drawingml/2006/main" xmlns:r="http://schemas.openxmlformats.org/officeDocument/2006/relationships" xmlns:p="http://schemas.openxmlformats.org/presentationml/2006/main">
   <p:tag name="OUTPUTDPI" val="1200"/>
   <p:tag name="ORIGINALHEIGHT" val="87.73905"/>
@@ -49998,44 +50196,6 @@
   <p:tag name="LATEXADDIN" val="\documentclass{article}&#10;\usepackage{amsmath}&#10;\usepackage{xcolor}&#10;\usepackage{ragged2e}&#10;\pagestyle{empty}&#10;\begin{document}&#10;&#10;\definecolor{Monred}{RGB}{172,0,0}&#10;&#10;$&#10;Backwash \ Trunk&#10;$&#10;&#10;&#10;\end{document}"/>
   <p:tag name="IGUANATEXSIZE" val="20"/>
   <p:tag name="IGUANATEXCURSOR" val="179"/>
-  <p:tag name="TRANSPARENCY" val="True"/>
-  <p:tag name="FILENAME" val=""/>
-  <p:tag name="LATEXENGINEID" val="0"/>
-  <p:tag name="TEMPFOLDER" val="c:\temp\"/>
-  <p:tag name="LATEXFORMHEIGHT" val="312"/>
-  <p:tag name="LATEXFORMWIDTH" val="384"/>
-  <p:tag name="LATEXFORMWRAP" val="True"/>
-  <p:tag name="BITMAPVECTOR" val="0"/>
-</p:tagLst>
-</file>
-
-<file path=ppt/tags/tag88.xml><?xml version="1.0" encoding="utf-8"?>
-<p:tagLst xmlns:a="http://schemas.openxmlformats.org/drawingml/2006/main" xmlns:r="http://schemas.openxmlformats.org/officeDocument/2006/relationships" xmlns:p="http://schemas.openxmlformats.org/presentationml/2006/main">
-  <p:tag name="OUTPUTDPI" val="1200"/>
-  <p:tag name="ORIGINALHEIGHT" val="111.7361"/>
-  <p:tag name="ORIGINALWIDTH" val="784.402"/>
-  <p:tag name="LATEXADDIN" val="\documentclass{article}&#10;\usepackage{amsmath}&#10;\usepackage{xcolor}&#10;\usepackage{ragged2e}&#10;\pagestyle{empty}&#10;\begin{document}&#10;&#10;\definecolor{Monred}{RGB}{172,0,0}&#10;&#10;$Siphon \ Outlet $&#10;&#10;&#10;&#10;\end{document}"/>
-  <p:tag name="IGUANATEXSIZE" val="20"/>
-  <p:tag name="IGUANATEXCURSOR" val="178"/>
-  <p:tag name="TRANSPARENCY" val="True"/>
-  <p:tag name="FILENAME" val=""/>
-  <p:tag name="LATEXENGINEID" val="0"/>
-  <p:tag name="TEMPFOLDER" val="c:\temp\"/>
-  <p:tag name="LATEXFORMHEIGHT" val="312"/>
-  <p:tag name="LATEXFORMWIDTH" val="384"/>
-  <p:tag name="LATEXFORMWRAP" val="True"/>
-  <p:tag name="BITMAPVECTOR" val="0"/>
-</p:tagLst>
-</file>
-
-<file path=ppt/tags/tag89.xml><?xml version="1.0" encoding="utf-8"?>
-<p:tagLst xmlns:a="http://schemas.openxmlformats.org/drawingml/2006/main" xmlns:r="http://schemas.openxmlformats.org/officeDocument/2006/relationships" xmlns:p="http://schemas.openxmlformats.org/presentationml/2006/main">
-  <p:tag name="OUTPUTDPI" val="1200"/>
-  <p:tag name="ORIGINALHEIGHT" val="111.7361"/>
-  <p:tag name="ORIGINALWIDTH" val="688.4139"/>
-  <p:tag name="LATEXADDIN" val="\documentclass{article}&#10;\usepackage{amsmath}&#10;\usepackage{xcolor}&#10;\usepackage{ragged2e}&#10;\pagestyle{empty}&#10;\begin{document}&#10;&#10;\definecolor{Monred}{RGB}{172,0,0}&#10;&#10;$Siphon \ Pipe $&#10;&#10;&#10;&#10;\end{document}"/>
-  <p:tag name="IGUANATEXSIZE" val="20"/>
-  <p:tag name="IGUANATEXCURSOR" val="173"/>
   <p:tag name="TRANSPARENCY" val="True"/>
   <p:tag name="FILENAME" val=""/>
   <p:tag name="LATEXENGINEID" val="0"/>
@@ -50069,6 +50229,44 @@
 <file path=ppt/tags/tag90.xml><?xml version="1.0" encoding="utf-8"?>
 <p:tagLst xmlns:a="http://schemas.openxmlformats.org/drawingml/2006/main" xmlns:r="http://schemas.openxmlformats.org/officeDocument/2006/relationships" xmlns:p="http://schemas.openxmlformats.org/presentationml/2006/main">
   <p:tag name="OUTPUTDPI" val="1200"/>
+  <p:tag name="ORIGINALHEIGHT" val="111.7361"/>
+  <p:tag name="ORIGINALWIDTH" val="784.402"/>
+  <p:tag name="LATEXADDIN" val="\documentclass{article}&#10;\usepackage{amsmath}&#10;\usepackage{xcolor}&#10;\usepackage{ragged2e}&#10;\pagestyle{empty}&#10;\begin{document}&#10;&#10;\definecolor{Monred}{RGB}{172,0,0}&#10;&#10;$Siphon \ Outlet $&#10;&#10;&#10;&#10;\end{document}"/>
+  <p:tag name="IGUANATEXSIZE" val="20"/>
+  <p:tag name="IGUANATEXCURSOR" val="178"/>
+  <p:tag name="TRANSPARENCY" val="True"/>
+  <p:tag name="FILENAME" val=""/>
+  <p:tag name="LATEXENGINEID" val="0"/>
+  <p:tag name="TEMPFOLDER" val="c:\temp\"/>
+  <p:tag name="LATEXFORMHEIGHT" val="312"/>
+  <p:tag name="LATEXFORMWIDTH" val="384"/>
+  <p:tag name="LATEXFORMWRAP" val="True"/>
+  <p:tag name="BITMAPVECTOR" val="0"/>
+</p:tagLst>
+</file>
+
+<file path=ppt/tags/tag91.xml><?xml version="1.0" encoding="utf-8"?>
+<p:tagLst xmlns:a="http://schemas.openxmlformats.org/drawingml/2006/main" xmlns:r="http://schemas.openxmlformats.org/officeDocument/2006/relationships" xmlns:p="http://schemas.openxmlformats.org/presentationml/2006/main">
+  <p:tag name="OUTPUTDPI" val="1200"/>
+  <p:tag name="ORIGINALHEIGHT" val="111.7361"/>
+  <p:tag name="ORIGINALWIDTH" val="688.4139"/>
+  <p:tag name="LATEXADDIN" val="\documentclass{article}&#10;\usepackage{amsmath}&#10;\usepackage{xcolor}&#10;\usepackage{ragged2e}&#10;\pagestyle{empty}&#10;\begin{document}&#10;&#10;\definecolor{Monred}{RGB}{172,0,0}&#10;&#10;$Siphon \ Pipe $&#10;&#10;&#10;&#10;\end{document}"/>
+  <p:tag name="IGUANATEXSIZE" val="20"/>
+  <p:tag name="IGUANATEXCURSOR" val="173"/>
+  <p:tag name="TRANSPARENCY" val="True"/>
+  <p:tag name="FILENAME" val=""/>
+  <p:tag name="LATEXENGINEID" val="0"/>
+  <p:tag name="TEMPFOLDER" val="c:\temp\"/>
+  <p:tag name="LATEXFORMHEIGHT" val="312"/>
+  <p:tag name="LATEXFORMWIDTH" val="384"/>
+  <p:tag name="LATEXFORMWRAP" val="True"/>
+  <p:tag name="BITMAPVECTOR" val="0"/>
+</p:tagLst>
+</file>
+
+<file path=ppt/tags/tag92.xml><?xml version="1.0" encoding="utf-8"?>
+<p:tagLst xmlns:a="http://schemas.openxmlformats.org/drawingml/2006/main" xmlns:r="http://schemas.openxmlformats.org/officeDocument/2006/relationships" xmlns:p="http://schemas.openxmlformats.org/presentationml/2006/main">
+  <p:tag name="OUTPUTDPI" val="1200"/>
   <p:tag name="ORIGINALHEIGHT" val="104.9868"/>
   <p:tag name="ORIGINALWIDTH" val="720.6599"/>
   <p:tag name="LATEXADDIN" val="\documentclass{article}&#10;\usepackage{amsmath}&#10;\usepackage{xcolor}&#10;\usepackage{ragged2e}&#10;\pagestyle{empty}&#10;\begin{document}&#10;&#10;\definecolor{Monred}{RGB}{172,0,0}&#10;&#10;$&#10;HL_{BwTotalSS}&#10;$&#10;&#10;&#10;\end{document}"/>
@@ -50085,7 +50283,7 @@
 </p:tagLst>
 </file>
 
-<file path=ppt/tags/tag91.xml><?xml version="1.0" encoding="utf-8"?>
+<file path=ppt/tags/tag93.xml><?xml version="1.0" encoding="utf-8"?>
 <p:tagLst xmlns:a="http://schemas.openxmlformats.org/drawingml/2006/main" xmlns:r="http://schemas.openxmlformats.org/officeDocument/2006/relationships" xmlns:p="http://schemas.openxmlformats.org/presentationml/2006/main">
   <p:tag name="OUTPUTDPI" val="1200"/>
   <p:tag name="ORIGINALHEIGHT" val="239.2201"/>
@@ -50104,7 +50302,7 @@
 </p:tagLst>
 </file>
 
-<file path=ppt/tags/tag92.xml><?xml version="1.0" encoding="utf-8"?>
+<file path=ppt/tags/tag94.xml><?xml version="1.0" encoding="utf-8"?>
 <p:tagLst xmlns:a="http://schemas.openxmlformats.org/drawingml/2006/main" xmlns:r="http://schemas.openxmlformats.org/officeDocument/2006/relationships" xmlns:p="http://schemas.openxmlformats.org/presentationml/2006/main">
   <p:tag name="OUTPUTDPI" val="1200"/>
   <p:tag name="ORIGINALHEIGHT" val="87.73905"/>
@@ -50123,7 +50321,7 @@
 </p:tagLst>
 </file>
 
-<file path=ppt/tags/tag93.xml><?xml version="1.0" encoding="utf-8"?>
+<file path=ppt/tags/tag95.xml><?xml version="1.0" encoding="utf-8"?>
 <p:tagLst xmlns:a="http://schemas.openxmlformats.org/drawingml/2006/main" xmlns:r="http://schemas.openxmlformats.org/officeDocument/2006/relationships" xmlns:p="http://schemas.openxmlformats.org/presentationml/2006/main">
   <p:tag name="OUTPUTDPI" val="1200"/>
   <p:tag name="ORIGINALHEIGHT" val="111.7361"/>
@@ -50142,7 +50340,7 @@
 </p:tagLst>
 </file>
 
-<file path=ppt/tags/tag94.xml><?xml version="1.0" encoding="utf-8"?>
+<file path=ppt/tags/tag96.xml><?xml version="1.0" encoding="utf-8"?>
 <p:tagLst xmlns:a="http://schemas.openxmlformats.org/drawingml/2006/main" xmlns:r="http://schemas.openxmlformats.org/officeDocument/2006/relationships" xmlns:p="http://schemas.openxmlformats.org/presentationml/2006/main">
   <p:tag name="OUTPUTDPI" val="1200"/>
   <p:tag name="ORIGINALHEIGHT" val="87.73905"/>
@@ -50161,7 +50359,7 @@
 </p:tagLst>
 </file>
 
-<file path=ppt/tags/tag95.xml><?xml version="1.0" encoding="utf-8"?>
+<file path=ppt/tags/tag97.xml><?xml version="1.0" encoding="utf-8"?>
 <p:tagLst xmlns:a="http://schemas.openxmlformats.org/drawingml/2006/main" xmlns:r="http://schemas.openxmlformats.org/officeDocument/2006/relationships" xmlns:p="http://schemas.openxmlformats.org/presentationml/2006/main">
   <p:tag name="OUTPUTDPI" val="1200"/>
   <p:tag name="ORIGINALHEIGHT" val="87.73905"/>
@@ -50180,7 +50378,7 @@
 </p:tagLst>
 </file>
 
-<file path=ppt/tags/tag96.xml><?xml version="1.0" encoding="utf-8"?>
+<file path=ppt/tags/tag98.xml><?xml version="1.0" encoding="utf-8"?>
 <p:tagLst xmlns:a="http://schemas.openxmlformats.org/drawingml/2006/main" xmlns:r="http://schemas.openxmlformats.org/officeDocument/2006/relationships" xmlns:p="http://schemas.openxmlformats.org/presentationml/2006/main">
   <p:tag name="OUTPUTDPI" val="1200"/>
   <p:tag name="ORIGINALHEIGHT" val="87.73905"/>
@@ -50199,7 +50397,7 @@
 </p:tagLst>
 </file>
 
-<file path=ppt/tags/tag97.xml><?xml version="1.0" encoding="utf-8"?>
+<file path=ppt/tags/tag99.xml><?xml version="1.0" encoding="utf-8"?>
 <p:tagLst xmlns:a="http://schemas.openxmlformats.org/drawingml/2006/main" xmlns:r="http://schemas.openxmlformats.org/officeDocument/2006/relationships" xmlns:p="http://schemas.openxmlformats.org/presentationml/2006/main">
   <p:tag name="OUTPUTDPI" val="1200"/>
   <p:tag name="ORIGINALHEIGHT" val="89.98874"/>
@@ -50207,44 +50405,6 @@
   <p:tag name="LATEXADDIN" val="\documentclass{article}&#10;\usepackage{amsmath}&#10;\usepackage{xcolor}&#10;\usepackage{ragged2e}&#10;\pagestyle{empty}&#10;\begin{document}&#10;&#10;\definecolor{Monred}{RGB}{172,0,0}&#10;&#10;$&#10;Oulet \ Trunks&#10;$&#10;&#10;&#10;&#10;\end{document}"/>
   <p:tag name="IGUANATEXSIZE" val="20"/>
   <p:tag name="IGUANATEXCURSOR" val="177"/>
-  <p:tag name="TRANSPARENCY" val="True"/>
-  <p:tag name="FILENAME" val=""/>
-  <p:tag name="LATEXENGINEID" val="0"/>
-  <p:tag name="TEMPFOLDER" val="c:\temp\"/>
-  <p:tag name="LATEXFORMHEIGHT" val="312"/>
-  <p:tag name="LATEXFORMWIDTH" val="384"/>
-  <p:tag name="LATEXFORMWRAP" val="True"/>
-  <p:tag name="BITMAPVECTOR" val="0"/>
-</p:tagLst>
-</file>
-
-<file path=ppt/tags/tag98.xml><?xml version="1.0" encoding="utf-8"?>
-<p:tagLst xmlns:a="http://schemas.openxmlformats.org/drawingml/2006/main" xmlns:r="http://schemas.openxmlformats.org/officeDocument/2006/relationships" xmlns:p="http://schemas.openxmlformats.org/presentationml/2006/main">
-  <p:tag name="OUTPUTDPI" val="1200"/>
-  <p:tag name="ORIGINALHEIGHT" val="86.23921"/>
-  <p:tag name="ORIGINALWIDTH" val="341.9572"/>
-  <p:tag name="LATEXADDIN" val="\documentclass{article}&#10;\usepackage{amsmath}&#10;\usepackage{xcolor}&#10;\usepackage{ragged2e}&#10;\pagestyle{empty}&#10;\begin{document}&#10;&#10;\definecolor{Monred}{RGB}{172,0,0}&#10;&#10;$ Drain $&#10;&#10;&#10;\end{document}"/>
-  <p:tag name="IGUANATEXSIZE" val="20"/>
-  <p:tag name="IGUANATEXCURSOR" val="168"/>
-  <p:tag name="TRANSPARENCY" val="True"/>
-  <p:tag name="FILENAME" val=""/>
-  <p:tag name="LATEXENGINEID" val="0"/>
-  <p:tag name="TEMPFOLDER" val="c:\temp\"/>
-  <p:tag name="LATEXFORMHEIGHT" val="312"/>
-  <p:tag name="LATEXFORMWIDTH" val="384"/>
-  <p:tag name="LATEXFORMWRAP" val="True"/>
-  <p:tag name="BITMAPVECTOR" val="0"/>
-</p:tagLst>
-</file>
-
-<file path=ppt/tags/tag99.xml><?xml version="1.0" encoding="utf-8"?>
-<p:tagLst xmlns:a="http://schemas.openxmlformats.org/drawingml/2006/main" xmlns:r="http://schemas.openxmlformats.org/officeDocument/2006/relationships" xmlns:p="http://schemas.openxmlformats.org/presentationml/2006/main">
-  <p:tag name="OUTPUTDPI" val="1200"/>
-  <p:tag name="ORIGINALHEIGHT" val="260.9674"/>
-  <p:tag name="ORIGINALWIDTH" val="1325.834"/>
-  <p:tag name="LATEXADDIN" val="\documentclass{article}&#10;\usepackage{amsmath}&#10;\usepackage{xcolor}&#10;\usepackage{ragged2e}&#10;\pagestyle{empty}&#10;\begin{document}&#10;&#10;\definecolor{Monred}{RGB}{172,0,0}&#10;&#10;$ Exit \ to \ Distribution \\ System $&#10;&#10;&#10;\end{document}"/>
-  <p:tag name="IGUANATEXSIZE" val="20"/>
-  <p:tag name="IGUANATEXCURSOR" val="173"/>
   <p:tag name="TRANSPARENCY" val="True"/>
   <p:tag name="FILENAME" val=""/>
   <p:tag name="LATEXENGINEID" val="0"/>

</xml_diff>